<commit_message>
Minor tweaks to the talk and slides
</commit_message>
<xml_diff>
--- a/slides/DEV350 Using Windows Runtime and SDK to build Metro style Apps.pptx
+++ b/slides/DEV350 Using Windows Runtime and SDK to build Metro style Apps.pptx
@@ -940,7 +940,11 @@
         <a:p>
           <a:r>
             <a:rPr lang="en-US" dirty="0" smtClean="0"/>
-            <a:t>JavaScript [EZE]</a:t>
+            <a:t>JavaScript </a:t>
+          </a:r>
+          <a:r>
+            <a:rPr lang="en-US" smtClean="0"/>
+            <a:t>[Chakra]</a:t>
           </a:r>
           <a:endParaRPr lang="en-US" dirty="0"/>
         </a:p>
@@ -1486,7 +1490,11 @@
           </a:pPr>
           <a:r>
             <a:rPr lang="en-US" sz="1700" kern="1200" dirty="0" smtClean="0"/>
-            <a:t>JavaScript [EZE]</a:t>
+            <a:t>JavaScript </a:t>
+          </a:r>
+          <a:r>
+            <a:rPr lang="en-US" sz="1700" kern="1200" smtClean="0"/>
+            <a:t>[Chakra]</a:t>
           </a:r>
           <a:endParaRPr lang="en-US" sz="1700" kern="1200" dirty="0"/>
         </a:p>
@@ -3913,7 +3921,7 @@
             <a:fld id="{81331B57-0BE5-4F82-AA58-76F53EFF3ADA}" type="datetime8">
               <a:rPr lang="en-US" smtClean="0"/>
               <a:pPr/>
-              <a:t>6/5/2012 8:12 AM</a:t>
+              <a:t>6/5/2012 2:05 PM</a:t>
             </a:fld>
             <a:endParaRPr lang="en-US" dirty="0"/>
           </a:p>
@@ -4113,7 +4121,7 @@
             <a:fld id="{81331B57-0BE5-4F82-AA58-76F53EFF3ADA}" type="datetime8">
               <a:rPr lang="en-US" smtClean="0"/>
               <a:pPr/>
-              <a:t>6/5/2012 8:12 AM</a:t>
+              <a:t>6/5/2012 2:05 PM</a:t>
             </a:fld>
             <a:endParaRPr lang="en-US" dirty="0"/>
           </a:p>
@@ -4313,7 +4321,7 @@
             <a:fld id="{81331B57-0BE5-4F82-AA58-76F53EFF3ADA}" type="datetime8">
               <a:rPr lang="en-US" smtClean="0"/>
               <a:pPr/>
-              <a:t>6/5/2012 8:12 AM</a:t>
+              <a:t>6/5/2012 2:05 PM</a:t>
             </a:fld>
             <a:endParaRPr lang="en-US"/>
           </a:p>
@@ -4985,7 +4993,7 @@
             <a:fld id="{81331B57-0BE5-4F82-AA58-76F53EFF3ADA}" type="datetime8">
               <a:rPr lang="en-US" smtClean="0"/>
               <a:pPr/>
-              <a:t>6/5/2012 8:12 AM</a:t>
+              <a:t>6/5/2012 2:05 PM</a:t>
             </a:fld>
             <a:endParaRPr lang="en-US"/>
           </a:p>
@@ -20755,7 +20763,7 @@
           <p:nvPr>
             <p:extLst>
               <p:ext uri="{D42A27DB-BD31-4B8C-83A1-F6EECF244321}">
-                <p14:modId xmlns:p14="http://schemas.microsoft.com/office/powerpoint/2010/main" val="1532417462"/>
+                <p14:modId xmlns:p14="http://schemas.microsoft.com/office/powerpoint/2010/main" val="918110536"/>
               </p:ext>
             </p:extLst>
           </p:nvPr>
@@ -32459,70 +32467,12 @@
 </file>
 
 <file path=customXml/item1.xml><?xml version="1.0" encoding="utf-8"?>
-<p:properties xmlns:p="http://schemas.microsoft.com/office/2006/metadata/properties" xmlns:xsi="http://www.w3.org/2001/XMLSchema-instance" xmlns:pc="http://schemas.microsoft.com/office/infopath/2007/PartnerControls">
-  <documentManagement>
-    <TrackTaxHTField0 xmlns="2295e2e7-0eeb-498e-8716-217bb2ee6ee3">
-      <Terms xmlns="http://schemas.microsoft.com/office/infopath/2007/PartnerControls"/>
-    </TrackTaxHTField0>
-    <CampaignTaxHTField0 xmlns="2295e2e7-0eeb-498e-8716-217bb2ee6ee3">
-      <Terms xmlns="http://schemas.microsoft.com/office/infopath/2007/PartnerControls"/>
-    </CampaignTaxHTField0>
-    <Event_x0020_End_x0020_Date xmlns="2295e2e7-0eeb-498e-8716-217bb2ee6ee3">2012-06-29T17:00:00+10:00</Event_x0020_End_x0020_Date>
-    <Event_x0020_Start_x0020_Date xmlns="2295e2e7-0eeb-498e-8716-217bb2ee6ee3">2012-06-26T17:00:00+10:00</Event_x0020_Start_x0020_Date>
-    <MS_x0020_Speaker xmlns="2295e2e7-0eeb-498e-8716-217bb2ee6ee3">
-      <UserInfo>
-        <DisplayName/>
-        <AccountId xsi:nil="true"/>
-        <AccountType/>
-      </UserInfo>
-    </MS_x0020_Speaker>
-    <External_x0020_Speaker xmlns="2295e2e7-0eeb-498e-8716-217bb2ee6ee3" xsi:nil="true"/>
-    <Session_x0020_Code xmlns="2295e2e7-0eeb-498e-8716-217bb2ee6ee3" xsi:nil="true"/>
-    <ProductTaxHTField0 xmlns="2295e2e7-0eeb-498e-8716-217bb2ee6ee3">
-      <Terms xmlns="http://schemas.microsoft.com/office/infopath/2007/PartnerControls"/>
-    </ProductTaxHTField0>
-    <Presentation_x0020_Date xmlns="2295e2e7-0eeb-498e-8716-217bb2ee6ee3" xsi:nil="true"/>
-    <Event_x0020_LocationTaxHTField0 xmlns="2295e2e7-0eeb-498e-8716-217bb2ee6ee3">
-      <Terms xmlns="http://schemas.microsoft.com/office/infopath/2007/PartnerControls">
-        <TermInfo xmlns="http://schemas.microsoft.com/office/infopath/2007/PartnerControls">
-          <TermName xmlns="http://schemas.microsoft.com/office/infopath/2007/PartnerControls">Orlando</TermName>
-          <TermId xmlns="http://schemas.microsoft.com/office/infopath/2007/PartnerControls">99ded043-d247-43a1-9b7a-028ecd66d1eb</TermId>
-        </TermInfo>
-      </Terms>
-    </Event_x0020_LocationTaxHTField0>
-    <Event1TaxHTField0 xmlns="2295e2e7-0eeb-498e-8716-217bb2ee6ee3">
-      <Terms xmlns="http://schemas.microsoft.com/office/infopath/2007/PartnerControls">
-        <TermInfo xmlns="http://schemas.microsoft.com/office/infopath/2007/PartnerControls">
-          <TermName xmlns="http://schemas.microsoft.com/office/infopath/2007/PartnerControls">TechEd</TermName>
-          <TermId xmlns="http://schemas.microsoft.com/office/infopath/2007/PartnerControls">ac8fad57-eb30-43a8-b5bd-05dcf2cf2246</TermId>
-        </TermInfo>
-      </Terms>
-    </Event1TaxHTField0>
-    <AudienceTaxHTField0 xmlns="8b529f77-48ab-4581-b468-93f09345b8aa">
-      <Terms xmlns="http://schemas.microsoft.com/office/infopath/2007/PartnerControls"/>
-    </AudienceTaxHTField0>
-    <MS_x0020_Content_x0020_Owner xmlns="2295e2e7-0eeb-498e-8716-217bb2ee6ee3">
-      <UserInfo>
-        <DisplayName/>
-        <AccountId xsi:nil="true"/>
-        <AccountType/>
-      </UserInfo>
-    </MS_x0020_Content_x0020_Owner>
-    <TaxCatchAll xmlns="2295e2e7-0eeb-498e-8716-217bb2ee6ee3">
-      <Value>126</Value>
-      <Value>232</Value>
-      <Value>231</Value>
-    </TaxCatchAll>
-    <Event_x0020_VenueTaxHTField0 xmlns="2295e2e7-0eeb-498e-8716-217bb2ee6ee3">
-      <Terms xmlns="http://schemas.microsoft.com/office/infopath/2007/PartnerControls">
-        <TermInfo xmlns="http://schemas.microsoft.com/office/infopath/2007/PartnerControls">
-          <TermName xmlns="http://schemas.microsoft.com/office/infopath/2007/PartnerControls">Orange County Convention Center Orlando, FL</TermName>
-          <TermId xmlns="http://schemas.microsoft.com/office/infopath/2007/PartnerControls">bd993e89-aa48-4695-84e0-3b53e88b1a79</TermId>
-        </TermInfo>
-      </Terms>
-    </Event_x0020_VenueTaxHTField0>
-  </documentManagement>
-</p:properties>
+<?mso-contentType ?>
+<FormTemplates xmlns="http://schemas.microsoft.com/sharepoint/v3/contenttype/forms">
+  <Display>DocumentLibraryForm</Display>
+  <Edit>DocumentLibraryForm</Edit>
+  <New>DocumentLibraryForm</New>
+</FormTemplates>
 </file>
 
 <file path=customXml/item2.xml><?xml version="1.0" encoding="utf-8"?>
@@ -32805,27 +32755,76 @@
 </file>
 
 <file path=customXml/item3.xml><?xml version="1.0" encoding="utf-8"?>
-<?mso-contentType ?>
-<FormTemplates xmlns="http://schemas.microsoft.com/sharepoint/v3/contenttype/forms">
-  <Display>DocumentLibraryForm</Display>
-  <Edit>DocumentLibraryForm</Edit>
-  <New>DocumentLibraryForm</New>
-</FormTemplates>
+<p:properties xmlns:p="http://schemas.microsoft.com/office/2006/metadata/properties" xmlns:xsi="http://www.w3.org/2001/XMLSchema-instance" xmlns:pc="http://schemas.microsoft.com/office/infopath/2007/PartnerControls">
+  <documentManagement>
+    <TrackTaxHTField0 xmlns="2295e2e7-0eeb-498e-8716-217bb2ee6ee3">
+      <Terms xmlns="http://schemas.microsoft.com/office/infopath/2007/PartnerControls"/>
+    </TrackTaxHTField0>
+    <CampaignTaxHTField0 xmlns="2295e2e7-0eeb-498e-8716-217bb2ee6ee3">
+      <Terms xmlns="http://schemas.microsoft.com/office/infopath/2007/PartnerControls"/>
+    </CampaignTaxHTField0>
+    <Event_x0020_End_x0020_Date xmlns="2295e2e7-0eeb-498e-8716-217bb2ee6ee3">2012-06-29T17:00:00+10:00</Event_x0020_End_x0020_Date>
+    <Event_x0020_Start_x0020_Date xmlns="2295e2e7-0eeb-498e-8716-217bb2ee6ee3">2012-06-26T17:00:00+10:00</Event_x0020_Start_x0020_Date>
+    <MS_x0020_Speaker xmlns="2295e2e7-0eeb-498e-8716-217bb2ee6ee3">
+      <UserInfo>
+        <DisplayName/>
+        <AccountId xsi:nil="true"/>
+        <AccountType/>
+      </UserInfo>
+    </MS_x0020_Speaker>
+    <External_x0020_Speaker xmlns="2295e2e7-0eeb-498e-8716-217bb2ee6ee3" xsi:nil="true"/>
+    <Session_x0020_Code xmlns="2295e2e7-0eeb-498e-8716-217bb2ee6ee3" xsi:nil="true"/>
+    <ProductTaxHTField0 xmlns="2295e2e7-0eeb-498e-8716-217bb2ee6ee3">
+      <Terms xmlns="http://schemas.microsoft.com/office/infopath/2007/PartnerControls"/>
+    </ProductTaxHTField0>
+    <Presentation_x0020_Date xmlns="2295e2e7-0eeb-498e-8716-217bb2ee6ee3" xsi:nil="true"/>
+    <Event_x0020_LocationTaxHTField0 xmlns="2295e2e7-0eeb-498e-8716-217bb2ee6ee3">
+      <Terms xmlns="http://schemas.microsoft.com/office/infopath/2007/PartnerControls">
+        <TermInfo xmlns="http://schemas.microsoft.com/office/infopath/2007/PartnerControls">
+          <TermName xmlns="http://schemas.microsoft.com/office/infopath/2007/PartnerControls">Orlando</TermName>
+          <TermId xmlns="http://schemas.microsoft.com/office/infopath/2007/PartnerControls">99ded043-d247-43a1-9b7a-028ecd66d1eb</TermId>
+        </TermInfo>
+      </Terms>
+    </Event_x0020_LocationTaxHTField0>
+    <Event1TaxHTField0 xmlns="2295e2e7-0eeb-498e-8716-217bb2ee6ee3">
+      <Terms xmlns="http://schemas.microsoft.com/office/infopath/2007/PartnerControls">
+        <TermInfo xmlns="http://schemas.microsoft.com/office/infopath/2007/PartnerControls">
+          <TermName xmlns="http://schemas.microsoft.com/office/infopath/2007/PartnerControls">TechEd</TermName>
+          <TermId xmlns="http://schemas.microsoft.com/office/infopath/2007/PartnerControls">ac8fad57-eb30-43a8-b5bd-05dcf2cf2246</TermId>
+        </TermInfo>
+      </Terms>
+    </Event1TaxHTField0>
+    <AudienceTaxHTField0 xmlns="8b529f77-48ab-4581-b468-93f09345b8aa">
+      <Terms xmlns="http://schemas.microsoft.com/office/infopath/2007/PartnerControls"/>
+    </AudienceTaxHTField0>
+    <MS_x0020_Content_x0020_Owner xmlns="2295e2e7-0eeb-498e-8716-217bb2ee6ee3">
+      <UserInfo>
+        <DisplayName/>
+        <AccountId xsi:nil="true"/>
+        <AccountType/>
+      </UserInfo>
+    </MS_x0020_Content_x0020_Owner>
+    <TaxCatchAll xmlns="2295e2e7-0eeb-498e-8716-217bb2ee6ee3">
+      <Value>126</Value>
+      <Value>232</Value>
+      <Value>231</Value>
+    </TaxCatchAll>
+    <Event_x0020_VenueTaxHTField0 xmlns="2295e2e7-0eeb-498e-8716-217bb2ee6ee3">
+      <Terms xmlns="http://schemas.microsoft.com/office/infopath/2007/PartnerControls">
+        <TermInfo xmlns="http://schemas.microsoft.com/office/infopath/2007/PartnerControls">
+          <TermName xmlns="http://schemas.microsoft.com/office/infopath/2007/PartnerControls">Orange County Convention Center Orlando, FL</TermName>
+          <TermId xmlns="http://schemas.microsoft.com/office/infopath/2007/PartnerControls">bd993e89-aa48-4695-84e0-3b53e88b1a79</TermId>
+        </TermInfo>
+      </Terms>
+    </Event_x0020_VenueTaxHTField0>
+  </documentManagement>
+</p:properties>
 </file>
 
 <file path=customXml/itemProps1.xml><?xml version="1.0" encoding="utf-8"?>
-<ds:datastoreItem xmlns:ds="http://schemas.openxmlformats.org/officeDocument/2006/customXml" ds:itemID="{76D92E10-3D8B-4831-9584-7BC82972C8E2}">
+<ds:datastoreItem xmlns:ds="http://schemas.openxmlformats.org/officeDocument/2006/customXml" ds:itemID="{EF1FE425-EA36-4D8C-A967-84CE3BED24D2}">
   <ds:schemaRefs>
-    <ds:schemaRef ds:uri="http://schemas.microsoft.com/office/2006/documentManagement/types"/>
-    <ds:schemaRef ds:uri="http://purl.org/dc/terms/"/>
-    <ds:schemaRef ds:uri="http://schemas.microsoft.com/office/2006/metadata/properties"/>
-    <ds:schemaRef ds:uri="http://schemas.openxmlformats.org/package/2006/metadata/core-properties"/>
-    <ds:schemaRef ds:uri="http://www.w3.org/XML/1998/namespace"/>
-    <ds:schemaRef ds:uri="http://schemas.microsoft.com/office/infopath/2007/PartnerControls"/>
-    <ds:schemaRef ds:uri="http://purl.org/dc/elements/1.1/"/>
-    <ds:schemaRef ds:uri="8b529f77-48ab-4581-b468-93f09345b8aa"/>
-    <ds:schemaRef ds:uri="2295e2e7-0eeb-498e-8716-217bb2ee6ee3"/>
-    <ds:schemaRef ds:uri="http://purl.org/dc/dcmitype/"/>
+    <ds:schemaRef ds:uri="http://schemas.microsoft.com/sharepoint/v3/contenttype/forms"/>
   </ds:schemaRefs>
 </ds:datastoreItem>
 </file>
@@ -32850,9 +32849,18 @@
 </file>
 
 <file path=customXml/itemProps3.xml><?xml version="1.0" encoding="utf-8"?>
-<ds:datastoreItem xmlns:ds="http://schemas.openxmlformats.org/officeDocument/2006/customXml" ds:itemID="{EF1FE425-EA36-4D8C-A967-84CE3BED24D2}">
+<ds:datastoreItem xmlns:ds="http://schemas.openxmlformats.org/officeDocument/2006/customXml" ds:itemID="{76D92E10-3D8B-4831-9584-7BC82972C8E2}">
   <ds:schemaRefs>
-    <ds:schemaRef ds:uri="http://schemas.microsoft.com/sharepoint/v3/contenttype/forms"/>
+    <ds:schemaRef ds:uri="http://schemas.microsoft.com/office/2006/documentManagement/types"/>
+    <ds:schemaRef ds:uri="http://purl.org/dc/terms/"/>
+    <ds:schemaRef ds:uri="http://schemas.microsoft.com/office/2006/metadata/properties"/>
+    <ds:schemaRef ds:uri="http://schemas.openxmlformats.org/package/2006/metadata/core-properties"/>
+    <ds:schemaRef ds:uri="http://www.w3.org/XML/1998/namespace"/>
+    <ds:schemaRef ds:uri="http://schemas.microsoft.com/office/infopath/2007/PartnerControls"/>
+    <ds:schemaRef ds:uri="http://purl.org/dc/elements/1.1/"/>
+    <ds:schemaRef ds:uri="8b529f77-48ab-4581-b468-93f09345b8aa"/>
+    <ds:schemaRef ds:uri="2295e2e7-0eeb-498e-8716-217bb2ee6ee3"/>
+    <ds:schemaRef ds:uri="http://purl.org/dc/dcmitype/"/>
   </ds:schemaRefs>
 </ds:datastoreItem>
 </file>
</xml_diff>

<commit_message>
Updated slides to reflect new intro
</commit_message>
<xml_diff>
--- a/slides/DEV350 Using Windows Runtime and SDK to build Metro style Apps.pptx
+++ b/slides/DEV350 Using Windows Runtime and SDK to build Metro style Apps.pptx
@@ -6,10 +6,10 @@
     <p:sldMasterId id="2147483718" r:id="rId5"/>
   </p:sldMasterIdLst>
   <p:notesMasterIdLst>
-    <p:notesMasterId r:id="rId26"/>
+    <p:notesMasterId r:id="rId29"/>
   </p:notesMasterIdLst>
   <p:handoutMasterIdLst>
-    <p:handoutMasterId r:id="rId27"/>
+    <p:handoutMasterId r:id="rId30"/>
   </p:handoutMasterIdLst>
   <p:sldIdLst>
     <p:sldId id="256" r:id="rId6"/>
@@ -23,15 +23,18 @@
     <p:sldId id="329" r:id="rId14"/>
     <p:sldId id="331" r:id="rId15"/>
     <p:sldId id="332" r:id="rId16"/>
-    <p:sldId id="333" r:id="rId17"/>
-    <p:sldId id="266" r:id="rId18"/>
-    <p:sldId id="334" r:id="rId19"/>
-    <p:sldId id="311" r:id="rId20"/>
-    <p:sldId id="312" r:id="rId21"/>
-    <p:sldId id="313" r:id="rId22"/>
-    <p:sldId id="314" r:id="rId23"/>
-    <p:sldId id="315" r:id="rId24"/>
-    <p:sldId id="271" r:id="rId25"/>
+    <p:sldId id="339" r:id="rId17"/>
+    <p:sldId id="340" r:id="rId18"/>
+    <p:sldId id="341" r:id="rId19"/>
+    <p:sldId id="342" r:id="rId20"/>
+    <p:sldId id="266" r:id="rId21"/>
+    <p:sldId id="335" r:id="rId22"/>
+    <p:sldId id="311" r:id="rId23"/>
+    <p:sldId id="312" r:id="rId24"/>
+    <p:sldId id="313" r:id="rId25"/>
+    <p:sldId id="314" r:id="rId26"/>
+    <p:sldId id="315" r:id="rId27"/>
+    <p:sldId id="271" r:id="rId28"/>
   </p:sldIdLst>
   <p:sldSz cx="12188825" cy="6858000"/>
   <p:notesSz cx="6858000" cy="9144000"/>
@@ -3222,7 +3225,7 @@
                 <a:latin typeface="Segoe UI" pitchFamily="34" charset="0"/>
               </a:rPr>
               <a:pPr/>
-              <a:t>6/5/2012</a:t>
+              <a:t>6/7/2012</a:t>
             </a:fld>
             <a:endParaRPr lang="en-US" dirty="0">
               <a:solidFill>
@@ -3472,7 +3475,7 @@
             <a:fld id="{7C3FBCD4-166E-446F-AF18-7D4A0CF9AEF6}" type="datetimeFigureOut">
               <a:rPr lang="en-US" smtClean="0"/>
               <a:pPr/>
-              <a:t>6/5/2012</a:t>
+              <a:t>6/7/2012</a:t>
             </a:fld>
             <a:endParaRPr lang="en-US" dirty="0"/>
           </a:p>
@@ -3921,7 +3924,7 @@
             <a:fld id="{81331B57-0BE5-4F82-AA58-76F53EFF3ADA}" type="datetime8">
               <a:rPr lang="en-US" smtClean="0"/>
               <a:pPr/>
-              <a:t>6/5/2012 2:05 PM</a:t>
+              <a:t>6/7/2012 10:48 AM</a:t>
             </a:fld>
             <a:endParaRPr lang="en-US" dirty="0"/>
           </a:p>
@@ -4121,7 +4124,7 @@
             <a:fld id="{81331B57-0BE5-4F82-AA58-76F53EFF3ADA}" type="datetime8">
               <a:rPr lang="en-US" smtClean="0"/>
               <a:pPr/>
-              <a:t>6/5/2012 2:05 PM</a:t>
+              <a:t>6/7/2012 10:48 AM</a:t>
             </a:fld>
             <a:endParaRPr lang="en-US" dirty="0"/>
           </a:p>
@@ -4321,7 +4324,7 @@
             <a:fld id="{81331B57-0BE5-4F82-AA58-76F53EFF3ADA}" type="datetime8">
               <a:rPr lang="en-US" smtClean="0"/>
               <a:pPr/>
-              <a:t>6/5/2012 2:05 PM</a:t>
+              <a:t>6/7/2012 10:48 AM</a:t>
             </a:fld>
             <a:endParaRPr lang="en-US"/>
           </a:p>
@@ -4405,7 +4408,7 @@
             <a:fld id="{EC87E0CF-87F6-4B58-B8B8-DCAB2DAAF3CA}" type="slidenum">
               <a:rPr lang="en-US" smtClean="0"/>
               <a:pPr/>
-              <a:t>13</a:t>
+              <a:t>16</a:t>
             </a:fld>
             <a:endParaRPr lang="en-US" dirty="0"/>
           </a:p>
@@ -4485,7 +4488,7 @@
             <a:fld id="{8B263312-38AA-4E1E-B2B5-0F8F122B24FE}" type="slidenum">
               <a:rPr lang="en-US" smtClean="0"/>
               <a:pPr/>
-              <a:t>15</a:t>
+              <a:t>18</a:t>
             </a:fld>
             <a:endParaRPr lang="en-US" dirty="0"/>
           </a:p>
@@ -4570,7 +4573,7 @@
             <a:fld id="{8B263312-38AA-4E1E-B2B5-0F8F122B24FE}" type="slidenum">
               <a:rPr lang="en-US" smtClean="0"/>
               <a:pPr/>
-              <a:t>16</a:t>
+              <a:t>19</a:t>
             </a:fld>
             <a:endParaRPr lang="en-US" dirty="0"/>
           </a:p>
@@ -4655,7 +4658,7 @@
             <a:fld id="{8B263312-38AA-4E1E-B2B5-0F8F122B24FE}" type="slidenum">
               <a:rPr lang="en-US" smtClean="0"/>
               <a:pPr/>
-              <a:t>17</a:t>
+              <a:t>20</a:t>
             </a:fld>
             <a:endParaRPr lang="en-US" dirty="0"/>
           </a:p>
@@ -4740,7 +4743,7 @@
             <a:fld id="{8B263312-38AA-4E1E-B2B5-0F8F122B24FE}" type="slidenum">
               <a:rPr lang="en-US" smtClean="0"/>
               <a:pPr/>
-              <a:t>18</a:t>
+              <a:t>21</a:t>
             </a:fld>
             <a:endParaRPr lang="en-US" dirty="0"/>
           </a:p>
@@ -4882,7 +4885,7 @@
             <a:fld id="{8B263312-38AA-4E1E-B2B5-0F8F122B24FE}" type="slidenum">
               <a:rPr lang="en-US" smtClean="0"/>
               <a:pPr/>
-              <a:t>19</a:t>
+              <a:t>22</a:t>
             </a:fld>
             <a:endParaRPr lang="en-US" dirty="0"/>
           </a:p>
@@ -4993,7 +4996,7 @@
             <a:fld id="{81331B57-0BE5-4F82-AA58-76F53EFF3ADA}" type="datetime8">
               <a:rPr lang="en-US" smtClean="0"/>
               <a:pPr/>
-              <a:t>6/5/2012 2:05 PM</a:t>
+              <a:t>6/7/2012 10:48 AM</a:t>
             </a:fld>
             <a:endParaRPr lang="en-US"/>
           </a:p>
@@ -5077,7 +5080,7 @@
             <a:fld id="{EC87E0CF-87F6-4B58-B8B8-DCAB2DAAF3CA}" type="slidenum">
               <a:rPr lang="en-US" smtClean="0"/>
               <a:pPr/>
-              <a:t>20</a:t>
+              <a:t>23</a:t>
             </a:fld>
             <a:endParaRPr lang="en-US" dirty="0"/>
           </a:p>
@@ -20908,7 +20911,7 @@
       </p:grpSpPr>
       <p:sp>
         <p:nvSpPr>
-          <p:cNvPr id="3" name="Title 2"/>
+          <p:cNvPr id="2" name="Title 1"/>
           <p:cNvSpPr>
             <a:spLocks noGrp="1"/>
           </p:cNvSpPr>
@@ -20923,7 +20926,7 @@
           <a:p>
             <a:r>
               <a:rPr lang="en-US" dirty="0" smtClean="0"/>
-              <a:t>8 Things About Building Great Metro style apps</a:t>
+              <a:t>WinRT and the Metro style SDK</a:t>
             </a:r>
             <a:endParaRPr lang="en-US" dirty="0"/>
           </a:p>
@@ -20931,158 +20934,304 @@
       </p:sp>
       <p:sp>
         <p:nvSpPr>
-          <p:cNvPr id="4" name="Text Placeholder 3"/>
-          <p:cNvSpPr>
-            <a:spLocks noGrp="1"/>
-          </p:cNvSpPr>
-          <p:nvPr>
-            <p:ph type="body" sz="quarter" idx="10"/>
-          </p:nvPr>
+          <p:cNvPr id="14" name="Rectangle 13"/>
+          <p:cNvSpPr/>
+          <p:nvPr/>
         </p:nvSpPr>
-        <p:spPr>
+        <p:spPr bwMode="auto">
           <a:xfrm>
-            <a:off x="519112" y="1447799"/>
-            <a:ext cx="11149013" cy="4235006"/>
+            <a:off x="3070076" y="1703057"/>
+            <a:ext cx="1863565" cy="2670464"/>
           </a:xfrm>
+          <a:prstGeom prst="rect">
+            <a:avLst/>
+          </a:prstGeom>
+          <a:solidFill>
+            <a:schemeClr val="accent2"/>
+          </a:solidFill>
+          <a:ln>
+            <a:noFill/>
+            <a:headEnd type="none" w="med" len="med"/>
+            <a:tailEnd type="none" w="med" len="med"/>
+          </a:ln>
+          <a:effectLst/>
         </p:spPr>
+        <p:style>
+          <a:lnRef idx="1">
+            <a:schemeClr val="accent2"/>
+          </a:lnRef>
+          <a:fillRef idx="3">
+            <a:schemeClr val="accent2"/>
+          </a:fillRef>
+          <a:effectRef idx="2">
+            <a:schemeClr val="accent2"/>
+          </a:effectRef>
+          <a:fontRef idx="minor">
+            <a:schemeClr val="lt1"/>
+          </a:fontRef>
+        </p:style>
         <p:txBody>
-          <a:bodyPr/>
+          <a:bodyPr vert="horz" wrap="square" lIns="91436" tIns="822960" rIns="91436" bIns="45718" numCol="1" rtlCol="0" anchor="t" anchorCtr="0" compatLnSpc="1">
+            <a:prstTxWarp prst="textNoShape">
+              <a:avLst/>
+            </a:prstTxWarp>
+          </a:bodyPr>
           <a:lstStyle/>
           <a:p>
-            <a:pPr marL="514350" indent="-514350">
-              <a:buAutoNum type="arabicPeriod"/>
+            <a:pPr algn="ctr" defTabSz="914099" fontAlgn="base">
+              <a:spcBef>
+                <a:spcPct val="0"/>
+              </a:spcBef>
+              <a:spcAft>
+                <a:spcPct val="0"/>
+              </a:spcAft>
             </a:pPr>
             <a:r>
-              <a:rPr lang="en-US" dirty="0">
-                <a:solidFill>
-                  <a:schemeClr val="tx1">
-                    <a:alpha val="99000"/>
-                  </a:schemeClr>
-                </a:solidFill>
+              <a:rPr lang="en-US" sz="2400" dirty="0" smtClean="0">
+                <a:gradFill>
+                  <a:gsLst>
+                    <a:gs pos="0">
+                      <a:schemeClr val="tx1"/>
+                    </a:gs>
+                    <a:gs pos="100000">
+                      <a:schemeClr val="tx1"/>
+                    </a:gs>
+                  </a:gsLst>
+                  <a:lin ang="5400000" scaled="0"/>
+                </a:gradFill>
+                <a:latin typeface="+mj-lt"/>
               </a:rPr>
-              <a:t>Use what you know</a:t>
+              <a:t>Apps that are easy to create</a:t>
             </a:r>
+            <a:endParaRPr lang="en-US" sz="2400" dirty="0" smtClean="0">
+              <a:gradFill>
+                <a:gsLst>
+                  <a:gs pos="0">
+                    <a:schemeClr val="tx1"/>
+                  </a:gs>
+                  <a:gs pos="100000">
+                    <a:schemeClr val="tx1"/>
+                  </a:gs>
+                </a:gsLst>
+                <a:lin ang="5400000" scaled="0"/>
+              </a:gradFill>
+              <a:latin typeface="+mj-lt"/>
+            </a:endParaRPr>
           </a:p>
+        </p:txBody>
+      </p:sp>
+      <p:sp>
+        <p:nvSpPr>
+          <p:cNvPr id="35" name="Rectangle 34"/>
+          <p:cNvSpPr/>
+          <p:nvPr/>
+        </p:nvSpPr>
+        <p:spPr bwMode="auto">
+          <a:xfrm>
+            <a:off x="5387270" y="1674482"/>
+            <a:ext cx="1863565" cy="2670464"/>
+          </a:xfrm>
+          <a:prstGeom prst="rect">
+            <a:avLst/>
+          </a:prstGeom>
+          <a:solidFill>
+            <a:schemeClr val="accent4"/>
+          </a:solidFill>
+          <a:ln>
+            <a:noFill/>
+            <a:headEnd type="none" w="med" len="med"/>
+            <a:tailEnd type="none" w="med" len="med"/>
+          </a:ln>
+          <a:effectLst/>
+        </p:spPr>
+        <p:style>
+          <a:lnRef idx="1">
+            <a:schemeClr val="accent2"/>
+          </a:lnRef>
+          <a:fillRef idx="3">
+            <a:schemeClr val="accent2"/>
+          </a:fillRef>
+          <a:effectRef idx="2">
+            <a:schemeClr val="accent2"/>
+          </a:effectRef>
+          <a:fontRef idx="minor">
+            <a:schemeClr val="lt1"/>
+          </a:fontRef>
+        </p:style>
+        <p:txBody>
+          <a:bodyPr vert="horz" wrap="square" lIns="91436" tIns="822960" rIns="91436" bIns="45718" numCol="1" rtlCol="0" anchor="t" anchorCtr="0" compatLnSpc="1">
+            <a:prstTxWarp prst="textNoShape">
+              <a:avLst/>
+            </a:prstTxWarp>
+          </a:bodyPr>
+          <a:lstStyle/>
           <a:p>
-            <a:pPr marL="514350" indent="-514350">
-              <a:buAutoNum type="arabicPeriod"/>
+            <a:pPr algn="ctr" defTabSz="914099" fontAlgn="base">
+              <a:spcBef>
+                <a:spcPct val="0"/>
+              </a:spcBef>
+              <a:spcAft>
+                <a:spcPct val="0"/>
+              </a:spcAft>
             </a:pPr>
             <a:r>
-              <a:rPr lang="en-US" dirty="0">
+              <a:rPr lang="en-US" sz="2400" dirty="0" smtClean="0">
                 <a:solidFill>
-                  <a:schemeClr val="tx1">
-                    <a:alpha val="99000"/>
-                  </a:schemeClr>
+                  <a:schemeClr val="bg1"/>
                 </a:solidFill>
+                <a:latin typeface="+mj-lt"/>
               </a:rPr>
-              <a:t>Use what you have</a:t>
+              <a:t>Apps that are deeply integrated</a:t>
             </a:r>
+            <a:endParaRPr lang="en-US" sz="2400" dirty="0" smtClean="0">
+              <a:solidFill>
+                <a:schemeClr val="bg1"/>
+              </a:solidFill>
+              <a:latin typeface="+mj-lt"/>
+            </a:endParaRPr>
           </a:p>
+        </p:txBody>
+      </p:sp>
+      <p:sp>
+        <p:nvSpPr>
+          <p:cNvPr id="36" name="Rectangle 35"/>
+          <p:cNvSpPr/>
+          <p:nvPr/>
+        </p:nvSpPr>
+        <p:spPr bwMode="auto">
+          <a:xfrm>
+            <a:off x="7704464" y="1674482"/>
+            <a:ext cx="1863565" cy="2670464"/>
+          </a:xfrm>
+          <a:prstGeom prst="rect">
+            <a:avLst/>
+          </a:prstGeom>
+          <a:solidFill>
+            <a:schemeClr val="accent6"/>
+          </a:solidFill>
+          <a:ln>
+            <a:noFill/>
+            <a:headEnd type="none" w="med" len="med"/>
+            <a:tailEnd type="none" w="med" len="med"/>
+          </a:ln>
+          <a:effectLst/>
+        </p:spPr>
+        <p:style>
+          <a:lnRef idx="1">
+            <a:schemeClr val="accent2"/>
+          </a:lnRef>
+          <a:fillRef idx="3">
+            <a:schemeClr val="accent2"/>
+          </a:fillRef>
+          <a:effectRef idx="2">
+            <a:schemeClr val="accent2"/>
+          </a:effectRef>
+          <a:fontRef idx="minor">
+            <a:schemeClr val="lt1"/>
+          </a:fontRef>
+        </p:style>
+        <p:txBody>
+          <a:bodyPr vert="horz" wrap="square" lIns="91436" tIns="822960" rIns="91436" bIns="45718" numCol="1" rtlCol="0" anchor="t" anchorCtr="0" compatLnSpc="1">
+            <a:prstTxWarp prst="textNoShape">
+              <a:avLst/>
+            </a:prstTxWarp>
+          </a:bodyPr>
+          <a:lstStyle/>
           <a:p>
-            <a:pPr marL="514350" indent="-514350">
-              <a:buAutoNum type="arabicPeriod"/>
+            <a:pPr algn="ctr" defTabSz="914099" fontAlgn="base">
+              <a:spcBef>
+                <a:spcPct val="0"/>
+              </a:spcBef>
+              <a:spcAft>
+                <a:spcPct val="0"/>
+              </a:spcAft>
             </a:pPr>
             <a:r>
-              <a:rPr lang="en-US" dirty="0">
+              <a:rPr lang="en-US" sz="2400" dirty="0" smtClean="0">
                 <a:solidFill>
-                  <a:schemeClr val="tx1">
-                    <a:alpha val="99000"/>
-                  </a:schemeClr>
+                  <a:schemeClr val="bg1"/>
                 </a:solidFill>
+                <a:latin typeface="+mj-lt"/>
               </a:rPr>
-              <a:t>Light up on the OS</a:t>
+              <a:t>Apps that are high quality</a:t>
             </a:r>
+            <a:endParaRPr lang="en-US" sz="2400" dirty="0" smtClean="0">
+              <a:solidFill>
+                <a:schemeClr val="bg1"/>
+              </a:solidFill>
+              <a:latin typeface="+mj-lt"/>
+            </a:endParaRPr>
           </a:p>
+        </p:txBody>
+      </p:sp>
+      <p:sp>
+        <p:nvSpPr>
+          <p:cNvPr id="7" name="Rectangle 6"/>
+          <p:cNvSpPr/>
+          <p:nvPr/>
+        </p:nvSpPr>
+        <p:spPr bwMode="auto">
+          <a:xfrm>
+            <a:off x="3087460" y="4637695"/>
+            <a:ext cx="6480570" cy="838200"/>
+          </a:xfrm>
+          <a:prstGeom prst="rect">
+            <a:avLst/>
+          </a:prstGeom>
+          <a:solidFill>
+            <a:schemeClr val="accent5"/>
+          </a:solidFill>
+          <a:ln>
+            <a:noFill/>
+            <a:headEnd type="none" w="med" len="med"/>
+            <a:tailEnd type="none" w="med" len="med"/>
+          </a:ln>
+          <a:effectLst/>
+        </p:spPr>
+        <p:style>
+          <a:lnRef idx="1">
+            <a:schemeClr val="accent2"/>
+          </a:lnRef>
+          <a:fillRef idx="3">
+            <a:schemeClr val="accent2"/>
+          </a:fillRef>
+          <a:effectRef idx="2">
+            <a:schemeClr val="accent2"/>
+          </a:effectRef>
+          <a:fontRef idx="minor">
+            <a:schemeClr val="lt1"/>
+          </a:fontRef>
+        </p:style>
+        <p:txBody>
+          <a:bodyPr vert="horz" wrap="square" lIns="91436" tIns="45718" rIns="91436" bIns="45718" numCol="1" rtlCol="0" anchor="ctr" anchorCtr="0" compatLnSpc="1">
+            <a:prstTxWarp prst="textNoShape">
+              <a:avLst/>
+            </a:prstTxWarp>
+          </a:bodyPr>
+          <a:lstStyle/>
           <a:p>
-            <a:pPr marL="514350" indent="-514350">
-              <a:buAutoNum type="arabicPeriod"/>
+            <a:pPr algn="ctr" defTabSz="914099" fontAlgn="base">
+              <a:spcBef>
+                <a:spcPct val="0"/>
+              </a:spcBef>
+              <a:spcAft>
+                <a:spcPct val="0"/>
+              </a:spcAft>
             </a:pPr>
             <a:r>
-              <a:rPr lang="en-US" dirty="0">
+              <a:rPr lang="en-US" sz="2400" dirty="0" smtClean="0">
                 <a:solidFill>
-                  <a:schemeClr val="tx1">
-                    <a:alpha val="99000"/>
-                  </a:schemeClr>
+                  <a:schemeClr val="bg1"/>
                 </a:solidFill>
+                <a:latin typeface="+mj-lt"/>
               </a:rPr>
-              <a:t>Mix and match your languages</a:t>
+              <a:t>WinRT and the Metro style SDK</a:t>
             </a:r>
-          </a:p>
-          <a:p>
-            <a:pPr marL="514350" indent="-514350">
-              <a:buAutoNum type="arabicPeriod"/>
-            </a:pPr>
-            <a:r>
-              <a:rPr lang="en-US" dirty="0">
-                <a:solidFill>
-                  <a:schemeClr val="tx1">
-                    <a:alpha val="99000"/>
-                  </a:schemeClr>
-                </a:solidFill>
-              </a:rPr>
-              <a:t>When bad things happen</a:t>
-            </a:r>
-          </a:p>
-          <a:p>
-            <a:pPr marL="514350" indent="-514350">
-              <a:buAutoNum type="arabicPeriod"/>
-            </a:pPr>
-            <a:r>
-              <a:rPr lang="en-US" dirty="0">
-                <a:solidFill>
-                  <a:schemeClr val="tx1">
-                    <a:alpha val="99000"/>
-                  </a:schemeClr>
-                </a:solidFill>
-              </a:rPr>
-              <a:t>Use what others know</a:t>
-            </a:r>
-          </a:p>
-          <a:p>
-            <a:pPr marL="514350" indent="-514350">
-              <a:buAutoNum type="arabicPeriod"/>
-            </a:pPr>
-            <a:r>
-              <a:rPr lang="en-US" dirty="0">
-                <a:solidFill>
-                  <a:schemeClr val="tx1">
-                    <a:alpha val="99000"/>
-                  </a:schemeClr>
-                </a:solidFill>
-              </a:rPr>
-              <a:t>Getting it right</a:t>
-            </a:r>
-          </a:p>
-          <a:p>
-            <a:pPr marL="514350" indent="-514350">
-              <a:buAutoNum type="arabicPeriod"/>
-            </a:pPr>
-            <a:r>
-              <a:rPr lang="en-US" dirty="0">
-                <a:solidFill>
-                  <a:schemeClr val="tx1">
-                    <a:alpha val="99000"/>
-                  </a:schemeClr>
-                </a:solidFill>
-              </a:rPr>
-              <a:t>Ship it</a:t>
-            </a:r>
-            <a:r>
-              <a:rPr lang="en-US" dirty="0" smtClean="0">
-                <a:solidFill>
-                  <a:schemeClr val="tx1">
-                    <a:alpha val="99000"/>
-                  </a:schemeClr>
-                </a:solidFill>
-              </a:rPr>
-              <a:t>!</a:t>
-            </a:r>
-            <a:endParaRPr lang="en-US" dirty="0">
+            <a:endParaRPr lang="en-US" sz="2400" dirty="0" smtClean="0">
               <a:solidFill>
-                <a:schemeClr val="tx1">
-                  <a:alpha val="99000"/>
-                </a:schemeClr>
+                <a:schemeClr val="bg1"/>
               </a:solidFill>
+              <a:latin typeface="+mj-lt"/>
             </a:endParaRPr>
           </a:p>
         </p:txBody>
@@ -21090,7 +21239,7 @@
     </p:spTree>
     <p:extLst>
       <p:ext uri="{BB962C8B-B14F-4D97-AF65-F5344CB8AC3E}">
-        <p14:creationId xmlns:p14="http://schemas.microsoft.com/office/powerpoint/2010/main" val="2104477324"/>
+        <p14:creationId xmlns:p14="http://schemas.microsoft.com/office/powerpoint/2010/main" val="1175934106"/>
       </p:ext>
     </p:extLst>
   </p:cSld>
@@ -21121,7 +21270,7 @@
                             </p:stCondLst>
                             <p:childTnLst>
                               <p:par>
-                                <p:cTn id="5" presetID="1" presetClass="entr" presetSubtype="0" fill="hold" nodeType="clickEffect">
+                                <p:cTn id="5" presetID="1" presetClass="entr" presetSubtype="0" fill="hold" grpId="0" nodeType="clickEffect">
                                   <p:stCondLst>
                                     <p:cond delay="0"/>
                                   </p:stCondLst>
@@ -21134,11 +21283,935 @@
                                           </p:stCondLst>
                                         </p:cTn>
                                         <p:tgtEl>
-                                          <p:spTgt spid="4">
-                                            <p:txEl>
-                                              <p:pRg st="0" end="0"/>
-                                            </p:txEl>
-                                          </p:spTgt>
+                                          <p:spTgt spid="14"/>
+                                        </p:tgtEl>
+                                        <p:attrNameLst>
+                                          <p:attrName>style.visibility</p:attrName>
+                                        </p:attrNameLst>
+                                      </p:cBhvr>
+                                      <p:to>
+                                        <p:strVal val="visible"/>
+                                      </p:to>
+                                    </p:set>
+                                  </p:childTnLst>
+                                </p:cTn>
+                              </p:par>
+                            </p:childTnLst>
+                          </p:cTn>
+                        </p:par>
+                      </p:childTnLst>
+                    </p:cTn>
+                  </p:par>
+                  <p:par>
+                    <p:cTn id="7" fill="hold">
+                      <p:stCondLst>
+                        <p:cond delay="indefinite"/>
+                      </p:stCondLst>
+                      <p:childTnLst>
+                        <p:par>
+                          <p:cTn id="8" fill="hold">
+                            <p:stCondLst>
+                              <p:cond delay="0"/>
+                            </p:stCondLst>
+                            <p:childTnLst>
+                              <p:par>
+                                <p:cTn id="9" presetID="1" presetClass="entr" presetSubtype="0" fill="hold" grpId="0" nodeType="clickEffect">
+                                  <p:stCondLst>
+                                    <p:cond delay="0"/>
+                                  </p:stCondLst>
+                                  <p:childTnLst>
+                                    <p:set>
+                                      <p:cBhvr>
+                                        <p:cTn id="10" dur="1" fill="hold">
+                                          <p:stCondLst>
+                                            <p:cond delay="0"/>
+                                          </p:stCondLst>
+                                        </p:cTn>
+                                        <p:tgtEl>
+                                          <p:spTgt spid="35"/>
+                                        </p:tgtEl>
+                                        <p:attrNameLst>
+                                          <p:attrName>style.visibility</p:attrName>
+                                        </p:attrNameLst>
+                                      </p:cBhvr>
+                                      <p:to>
+                                        <p:strVal val="visible"/>
+                                      </p:to>
+                                    </p:set>
+                                  </p:childTnLst>
+                                </p:cTn>
+                              </p:par>
+                            </p:childTnLst>
+                          </p:cTn>
+                        </p:par>
+                      </p:childTnLst>
+                    </p:cTn>
+                  </p:par>
+                  <p:par>
+                    <p:cTn id="11" fill="hold">
+                      <p:stCondLst>
+                        <p:cond delay="indefinite"/>
+                      </p:stCondLst>
+                      <p:childTnLst>
+                        <p:par>
+                          <p:cTn id="12" fill="hold">
+                            <p:stCondLst>
+                              <p:cond delay="0"/>
+                            </p:stCondLst>
+                            <p:childTnLst>
+                              <p:par>
+                                <p:cTn id="13" presetID="1" presetClass="entr" presetSubtype="0" fill="hold" grpId="0" nodeType="clickEffect">
+                                  <p:stCondLst>
+                                    <p:cond delay="0"/>
+                                  </p:stCondLst>
+                                  <p:childTnLst>
+                                    <p:set>
+                                      <p:cBhvr>
+                                        <p:cTn id="14" dur="1" fill="hold">
+                                          <p:stCondLst>
+                                            <p:cond delay="0"/>
+                                          </p:stCondLst>
+                                        </p:cTn>
+                                        <p:tgtEl>
+                                          <p:spTgt spid="36"/>
+                                        </p:tgtEl>
+                                        <p:attrNameLst>
+                                          <p:attrName>style.visibility</p:attrName>
+                                        </p:attrNameLst>
+                                      </p:cBhvr>
+                                      <p:to>
+                                        <p:strVal val="visible"/>
+                                      </p:to>
+                                    </p:set>
+                                  </p:childTnLst>
+                                </p:cTn>
+                              </p:par>
+                            </p:childTnLst>
+                          </p:cTn>
+                        </p:par>
+                      </p:childTnLst>
+                    </p:cTn>
+                  </p:par>
+                  <p:par>
+                    <p:cTn id="15" fill="hold">
+                      <p:stCondLst>
+                        <p:cond delay="indefinite"/>
+                      </p:stCondLst>
+                      <p:childTnLst>
+                        <p:par>
+                          <p:cTn id="16" fill="hold">
+                            <p:stCondLst>
+                              <p:cond delay="0"/>
+                            </p:stCondLst>
+                            <p:childTnLst>
+                              <p:par>
+                                <p:cTn id="17" presetID="1" presetClass="entr" presetSubtype="0" fill="hold" grpId="0" nodeType="clickEffect">
+                                  <p:stCondLst>
+                                    <p:cond delay="0"/>
+                                  </p:stCondLst>
+                                  <p:childTnLst>
+                                    <p:set>
+                                      <p:cBhvr>
+                                        <p:cTn id="18" dur="1" fill="hold">
+                                          <p:stCondLst>
+                                            <p:cond delay="0"/>
+                                          </p:stCondLst>
+                                        </p:cTn>
+                                        <p:tgtEl>
+                                          <p:spTgt spid="7"/>
+                                        </p:tgtEl>
+                                        <p:attrNameLst>
+                                          <p:attrName>style.visibility</p:attrName>
+                                        </p:attrNameLst>
+                                      </p:cBhvr>
+                                      <p:to>
+                                        <p:strVal val="visible"/>
+                                      </p:to>
+                                    </p:set>
+                                  </p:childTnLst>
+                                </p:cTn>
+                              </p:par>
+                            </p:childTnLst>
+                          </p:cTn>
+                        </p:par>
+                      </p:childTnLst>
+                    </p:cTn>
+                  </p:par>
+                </p:childTnLst>
+              </p:cTn>
+              <p:prevCondLst>
+                <p:cond evt="onPrev" delay="0">
+                  <p:tgtEl>
+                    <p:sldTgt/>
+                  </p:tgtEl>
+                </p:cond>
+              </p:prevCondLst>
+              <p:nextCondLst>
+                <p:cond evt="onNext" delay="0">
+                  <p:tgtEl>
+                    <p:sldTgt/>
+                  </p:tgtEl>
+                </p:cond>
+              </p:nextCondLst>
+            </p:seq>
+          </p:childTnLst>
+        </p:cTn>
+      </p:par>
+    </p:tnLst>
+    <p:bldLst>
+      <p:bldP spid="14" grpId="0" animBg="1"/>
+      <p:bldP spid="35" grpId="0" animBg="1"/>
+      <p:bldP spid="36" grpId="0" animBg="1"/>
+      <p:bldP spid="7" grpId="0" animBg="1"/>
+    </p:bldLst>
+  </p:timing>
+</p:sld>
+</file>
+
+<file path=ppt/slides/slide13.xml><?xml version="1.0" encoding="utf-8"?>
+<p:sld xmlns:a="http://schemas.openxmlformats.org/drawingml/2006/main" xmlns:r="http://schemas.openxmlformats.org/officeDocument/2006/relationships" xmlns:p="http://schemas.openxmlformats.org/presentationml/2006/main">
+  <p:cSld>
+    <p:spTree>
+      <p:nvGrpSpPr>
+        <p:cNvPr id="1" name=""/>
+        <p:cNvGrpSpPr/>
+        <p:nvPr/>
+      </p:nvGrpSpPr>
+      <p:grpSpPr>
+        <a:xfrm>
+          <a:off x="0" y="0"/>
+          <a:ext cx="0" cy="0"/>
+          <a:chOff x="0" y="0"/>
+          <a:chExt cx="0" cy="0"/>
+        </a:xfrm>
+      </p:grpSpPr>
+      <p:sp>
+        <p:nvSpPr>
+          <p:cNvPr id="2" name="Title 1"/>
+          <p:cNvSpPr>
+            <a:spLocks noGrp="1"/>
+          </p:cNvSpPr>
+          <p:nvPr>
+            <p:ph type="title"/>
+          </p:nvPr>
+        </p:nvSpPr>
+        <p:spPr/>
+        <p:txBody>
+          <a:bodyPr/>
+          <a:lstStyle/>
+          <a:p>
+            <a:r>
+              <a:rPr lang="en-US" dirty="0" smtClean="0"/>
+              <a:t>WinRT and the Metro style SDK</a:t>
+            </a:r>
+            <a:endParaRPr lang="en-US" dirty="0"/>
+          </a:p>
+        </p:txBody>
+      </p:sp>
+      <p:sp>
+        <p:nvSpPr>
+          <p:cNvPr id="14" name="Rectangle 13"/>
+          <p:cNvSpPr/>
+          <p:nvPr/>
+        </p:nvSpPr>
+        <p:spPr bwMode="auto">
+          <a:xfrm>
+            <a:off x="668168" y="2395053"/>
+            <a:ext cx="1863565" cy="2670464"/>
+          </a:xfrm>
+          <a:prstGeom prst="rect">
+            <a:avLst/>
+          </a:prstGeom>
+          <a:solidFill>
+            <a:schemeClr val="accent2"/>
+          </a:solidFill>
+          <a:ln>
+            <a:noFill/>
+            <a:headEnd type="none" w="med" len="med"/>
+            <a:tailEnd type="none" w="med" len="med"/>
+          </a:ln>
+          <a:effectLst/>
+        </p:spPr>
+        <p:style>
+          <a:lnRef idx="1">
+            <a:schemeClr val="accent2"/>
+          </a:lnRef>
+          <a:fillRef idx="3">
+            <a:schemeClr val="accent2"/>
+          </a:fillRef>
+          <a:effectRef idx="2">
+            <a:schemeClr val="accent2"/>
+          </a:effectRef>
+          <a:fontRef idx="minor">
+            <a:schemeClr val="lt1"/>
+          </a:fontRef>
+        </p:style>
+        <p:txBody>
+          <a:bodyPr vert="horz" wrap="square" lIns="91436" tIns="822960" rIns="91436" bIns="45718" numCol="1" rtlCol="0" anchor="t" anchorCtr="0" compatLnSpc="1">
+            <a:prstTxWarp prst="textNoShape">
+              <a:avLst/>
+            </a:prstTxWarp>
+          </a:bodyPr>
+          <a:lstStyle/>
+          <a:p>
+            <a:pPr algn="ctr" defTabSz="914099" fontAlgn="base">
+              <a:spcBef>
+                <a:spcPct val="0"/>
+              </a:spcBef>
+              <a:spcAft>
+                <a:spcPct val="0"/>
+              </a:spcAft>
+            </a:pPr>
+            <a:r>
+              <a:rPr lang="en-US" sz="2400" dirty="0" smtClean="0">
+                <a:gradFill>
+                  <a:gsLst>
+                    <a:gs pos="0">
+                      <a:schemeClr val="tx1"/>
+                    </a:gs>
+                    <a:gs pos="100000">
+                      <a:schemeClr val="tx1"/>
+                    </a:gs>
+                  </a:gsLst>
+                  <a:lin ang="5400000" scaled="0"/>
+                </a:gradFill>
+                <a:latin typeface="+mj-lt"/>
+              </a:rPr>
+              <a:t>Apps that are easy to create</a:t>
+            </a:r>
+            <a:endParaRPr lang="en-US" sz="2400" dirty="0" smtClean="0">
+              <a:gradFill>
+                <a:gsLst>
+                  <a:gs pos="0">
+                    <a:schemeClr val="tx1"/>
+                  </a:gs>
+                  <a:gs pos="100000">
+                    <a:schemeClr val="tx1"/>
+                  </a:gs>
+                </a:gsLst>
+                <a:lin ang="5400000" scaled="0"/>
+              </a:gradFill>
+              <a:latin typeface="+mj-lt"/>
+            </a:endParaRPr>
+          </a:p>
+        </p:txBody>
+      </p:sp>
+      <p:grpSp>
+        <p:nvGrpSpPr>
+          <p:cNvPr id="7" name="Group 6"/>
+          <p:cNvGrpSpPr/>
+          <p:nvPr/>
+        </p:nvGrpSpPr>
+        <p:grpSpPr>
+          <a:xfrm>
+            <a:off x="3874897" y="1663526"/>
+            <a:ext cx="2867587" cy="4380657"/>
+            <a:chOff x="3874897" y="1663526"/>
+            <a:chExt cx="2867587" cy="4380657"/>
+          </a:xfrm>
+        </p:grpSpPr>
+        <p:sp>
+          <p:nvSpPr>
+            <p:cNvPr id="3" name="Rectangle 2"/>
+            <p:cNvSpPr/>
+            <p:nvPr/>
+          </p:nvSpPr>
+          <p:spPr bwMode="auto">
+            <a:xfrm>
+              <a:off x="3874897" y="1663526"/>
+              <a:ext cx="2867587" cy="1463055"/>
+            </a:xfrm>
+            <a:prstGeom prst="rect">
+              <a:avLst/>
+            </a:prstGeom>
+            <a:solidFill>
+              <a:schemeClr val="accent1"/>
+            </a:solidFill>
+            <a:ln>
+              <a:noFill/>
+              <a:headEnd type="none" w="med" len="med"/>
+              <a:tailEnd type="none" w="med" len="med"/>
+            </a:ln>
+            <a:effectLst/>
+          </p:spPr>
+          <p:style>
+            <a:lnRef idx="1">
+              <a:schemeClr val="accent1"/>
+            </a:lnRef>
+            <a:fillRef idx="3">
+              <a:schemeClr val="accent1"/>
+            </a:fillRef>
+            <a:effectRef idx="2">
+              <a:schemeClr val="accent1"/>
+            </a:effectRef>
+            <a:fontRef idx="minor">
+              <a:schemeClr val="lt1"/>
+            </a:fontRef>
+          </p:style>
+          <p:txBody>
+            <a:bodyPr vert="horz" wrap="square" lIns="91436" tIns="45718" rIns="91436" bIns="45718" numCol="1" rtlCol="0" anchor="ctr" anchorCtr="0" compatLnSpc="1">
+              <a:prstTxWarp prst="textNoShape">
+                <a:avLst/>
+              </a:prstTxWarp>
+            </a:bodyPr>
+            <a:lstStyle/>
+            <a:p>
+              <a:pPr algn="ctr" defTabSz="914099"/>
+              <a:r>
+                <a:rPr lang="en-US" sz="2200" dirty="0" smtClean="0">
+                  <a:solidFill>
+                    <a:srgbClr val="FFFFFF">
+                      <a:alpha val="98824"/>
+                    </a:srgbClr>
+                  </a:solidFill>
+                  <a:latin typeface="Segoe UI" pitchFamily="34" charset="0"/>
+                  <a:ea typeface="Segoe UI" pitchFamily="34" charset="0"/>
+                  <a:cs typeface="Segoe UI" pitchFamily="34" charset="0"/>
+                </a:rPr>
+                <a:t>Use what you know</a:t>
+              </a:r>
+            </a:p>
+          </p:txBody>
+        </p:sp>
+        <p:sp>
+          <p:nvSpPr>
+            <p:cNvPr id="8" name="Rectangle 7"/>
+            <p:cNvSpPr/>
+            <p:nvPr/>
+          </p:nvSpPr>
+          <p:spPr bwMode="auto">
+            <a:xfrm>
+              <a:off x="3874897" y="4581128"/>
+              <a:ext cx="2867587" cy="1463055"/>
+            </a:xfrm>
+            <a:prstGeom prst="rect">
+              <a:avLst/>
+            </a:prstGeom>
+            <a:solidFill>
+              <a:schemeClr val="accent1"/>
+            </a:solidFill>
+            <a:ln>
+              <a:noFill/>
+              <a:headEnd type="none" w="med" len="med"/>
+              <a:tailEnd type="none" w="med" len="med"/>
+            </a:ln>
+            <a:effectLst/>
+          </p:spPr>
+          <p:style>
+            <a:lnRef idx="1">
+              <a:schemeClr val="accent1"/>
+            </a:lnRef>
+            <a:fillRef idx="3">
+              <a:schemeClr val="accent1"/>
+            </a:fillRef>
+            <a:effectRef idx="2">
+              <a:schemeClr val="accent1"/>
+            </a:effectRef>
+            <a:fontRef idx="minor">
+              <a:schemeClr val="lt1"/>
+            </a:fontRef>
+          </p:style>
+          <p:txBody>
+            <a:bodyPr vert="horz" wrap="square" lIns="91436" tIns="45718" rIns="91436" bIns="45718" numCol="1" rtlCol="0" anchor="ctr" anchorCtr="0" compatLnSpc="1">
+              <a:prstTxWarp prst="textNoShape">
+                <a:avLst/>
+              </a:prstTxWarp>
+            </a:bodyPr>
+            <a:lstStyle/>
+            <a:p>
+              <a:pPr algn="ctr" defTabSz="914099"/>
+              <a:r>
+                <a:rPr lang="en-US" sz="2200" dirty="0" smtClean="0">
+                  <a:solidFill>
+                    <a:srgbClr val="FFFFFF">
+                      <a:alpha val="98824"/>
+                    </a:srgbClr>
+                  </a:solidFill>
+                  <a:latin typeface="Segoe UI" pitchFamily="34" charset="0"/>
+                  <a:ea typeface="Segoe UI" pitchFamily="34" charset="0"/>
+                  <a:cs typeface="Segoe UI" pitchFamily="34" charset="0"/>
+                </a:rPr>
+                <a:t>Use what you have</a:t>
+              </a:r>
+            </a:p>
+          </p:txBody>
+        </p:sp>
+      </p:grpSp>
+      <p:grpSp>
+        <p:nvGrpSpPr>
+          <p:cNvPr id="11" name="Group 10"/>
+          <p:cNvGrpSpPr/>
+          <p:nvPr/>
+        </p:nvGrpSpPr>
+        <p:grpSpPr>
+          <a:xfrm>
+            <a:off x="8034901" y="1124744"/>
+            <a:ext cx="3244087" cy="2767599"/>
+            <a:chOff x="8034901" y="1124744"/>
+            <a:chExt cx="3244087" cy="2767599"/>
+          </a:xfrm>
+        </p:grpSpPr>
+        <p:sp>
+          <p:nvSpPr>
+            <p:cNvPr id="4" name="Rectangle 3"/>
+            <p:cNvSpPr/>
+            <p:nvPr/>
+          </p:nvSpPr>
+          <p:spPr bwMode="auto">
+            <a:xfrm>
+              <a:off x="8038627" y="1124744"/>
+              <a:ext cx="3240361" cy="767858"/>
+            </a:xfrm>
+            <a:prstGeom prst="rect">
+              <a:avLst/>
+            </a:prstGeom>
+            <a:solidFill>
+              <a:schemeClr val="accent4"/>
+            </a:solidFill>
+            <a:ln>
+              <a:noFill/>
+              <a:headEnd type="none" w="med" len="med"/>
+              <a:tailEnd type="none" w="med" len="med"/>
+            </a:ln>
+            <a:effectLst/>
+          </p:spPr>
+          <p:style>
+            <a:lnRef idx="1">
+              <a:schemeClr val="accent1"/>
+            </a:lnRef>
+            <a:fillRef idx="3">
+              <a:schemeClr val="accent1"/>
+            </a:fillRef>
+            <a:effectRef idx="2">
+              <a:schemeClr val="accent1"/>
+            </a:effectRef>
+            <a:fontRef idx="minor">
+              <a:schemeClr val="lt1"/>
+            </a:fontRef>
+          </p:style>
+          <p:txBody>
+            <a:bodyPr vert="horz" wrap="square" lIns="91436" tIns="45718" rIns="91436" bIns="45718" numCol="1" rtlCol="0" anchor="ctr" anchorCtr="0" compatLnSpc="1">
+              <a:prstTxWarp prst="textNoShape">
+                <a:avLst/>
+              </a:prstTxWarp>
+            </a:bodyPr>
+            <a:lstStyle/>
+            <a:p>
+              <a:pPr algn="ctr" defTabSz="914099"/>
+              <a:r>
+                <a:rPr lang="en-US" sz="2200" dirty="0">
+                  <a:solidFill>
+                    <a:srgbClr val="FFFFFF">
+                      <a:alpha val="98824"/>
+                    </a:srgbClr>
+                  </a:solidFill>
+                  <a:latin typeface="Segoe UI" pitchFamily="34" charset="0"/>
+                  <a:ea typeface="Segoe UI" pitchFamily="34" charset="0"/>
+                  <a:cs typeface="Segoe UI" pitchFamily="34" charset="0"/>
+                </a:rPr>
+                <a:t>HTML/CSS/JavaScript</a:t>
+              </a:r>
+            </a:p>
+          </p:txBody>
+        </p:sp>
+        <p:sp>
+          <p:nvSpPr>
+            <p:cNvPr id="5" name="Rectangle 4"/>
+            <p:cNvSpPr/>
+            <p:nvPr/>
+          </p:nvSpPr>
+          <p:spPr bwMode="auto">
+            <a:xfrm>
+              <a:off x="8038628" y="2125282"/>
+              <a:ext cx="3240360" cy="767858"/>
+            </a:xfrm>
+            <a:prstGeom prst="rect">
+              <a:avLst/>
+            </a:prstGeom>
+            <a:solidFill>
+              <a:schemeClr val="accent4"/>
+            </a:solidFill>
+            <a:ln>
+              <a:noFill/>
+              <a:headEnd type="none" w="med" len="med"/>
+              <a:tailEnd type="none" w="med" len="med"/>
+            </a:ln>
+            <a:effectLst/>
+          </p:spPr>
+          <p:style>
+            <a:lnRef idx="1">
+              <a:schemeClr val="accent1"/>
+            </a:lnRef>
+            <a:fillRef idx="3">
+              <a:schemeClr val="accent1"/>
+            </a:fillRef>
+            <a:effectRef idx="2">
+              <a:schemeClr val="accent1"/>
+            </a:effectRef>
+            <a:fontRef idx="minor">
+              <a:schemeClr val="lt1"/>
+            </a:fontRef>
+          </p:style>
+          <p:txBody>
+            <a:bodyPr vert="horz" wrap="square" lIns="91436" tIns="45718" rIns="91436" bIns="45718" numCol="1" rtlCol="0" anchor="ctr" anchorCtr="0" compatLnSpc="1">
+              <a:prstTxWarp prst="textNoShape">
+                <a:avLst/>
+              </a:prstTxWarp>
+            </a:bodyPr>
+            <a:lstStyle/>
+            <a:p>
+              <a:pPr algn="ctr" defTabSz="914099"/>
+              <a:r>
+                <a:rPr lang="en-US" sz="2200" dirty="0">
+                  <a:solidFill>
+                    <a:srgbClr val="FFFFFF">
+                      <a:alpha val="98824"/>
+                    </a:srgbClr>
+                  </a:solidFill>
+                  <a:latin typeface="Segoe UI" pitchFamily="34" charset="0"/>
+                  <a:ea typeface="Segoe UI" pitchFamily="34" charset="0"/>
+                  <a:cs typeface="Segoe UI" pitchFamily="34" charset="0"/>
+                </a:rPr>
+                <a:t>C#/VB/C++/XAML</a:t>
+              </a:r>
+            </a:p>
+          </p:txBody>
+        </p:sp>
+        <p:sp>
+          <p:nvSpPr>
+            <p:cNvPr id="6" name="Rectangle 5"/>
+            <p:cNvSpPr/>
+            <p:nvPr/>
+          </p:nvSpPr>
+          <p:spPr bwMode="auto">
+            <a:xfrm>
+              <a:off x="8034901" y="3112370"/>
+              <a:ext cx="3244087" cy="779973"/>
+            </a:xfrm>
+            <a:prstGeom prst="rect">
+              <a:avLst/>
+            </a:prstGeom>
+            <a:solidFill>
+              <a:schemeClr val="accent4"/>
+            </a:solidFill>
+            <a:ln>
+              <a:noFill/>
+              <a:headEnd type="none" w="med" len="med"/>
+              <a:tailEnd type="none" w="med" len="med"/>
+            </a:ln>
+            <a:effectLst/>
+          </p:spPr>
+          <p:style>
+            <a:lnRef idx="1">
+              <a:schemeClr val="accent1"/>
+            </a:lnRef>
+            <a:fillRef idx="3">
+              <a:schemeClr val="accent1"/>
+            </a:fillRef>
+            <a:effectRef idx="2">
+              <a:schemeClr val="accent1"/>
+            </a:effectRef>
+            <a:fontRef idx="minor">
+              <a:schemeClr val="lt1"/>
+            </a:fontRef>
+          </p:style>
+          <p:txBody>
+            <a:bodyPr vert="horz" wrap="square" lIns="91436" tIns="45718" rIns="91436" bIns="45718" numCol="1" rtlCol="0" anchor="ctr" anchorCtr="0" compatLnSpc="1">
+              <a:prstTxWarp prst="textNoShape">
+                <a:avLst/>
+              </a:prstTxWarp>
+            </a:bodyPr>
+            <a:lstStyle/>
+            <a:p>
+              <a:pPr algn="ctr" defTabSz="914099"/>
+              <a:r>
+                <a:rPr lang="en-US" sz="2200" dirty="0">
+                  <a:solidFill>
+                    <a:srgbClr val="FFFFFF">
+                      <a:alpha val="98824"/>
+                    </a:srgbClr>
+                  </a:solidFill>
+                  <a:latin typeface="Segoe UI" pitchFamily="34" charset="0"/>
+                  <a:ea typeface="Segoe UI" pitchFamily="34" charset="0"/>
+                  <a:cs typeface="Segoe UI" pitchFamily="34" charset="0"/>
+                </a:rPr>
+                <a:t>C++/DirectX</a:t>
+              </a:r>
+              <a:endParaRPr lang="en-US" sz="2200" dirty="0">
+                <a:solidFill>
+                  <a:srgbClr val="FFFFFF">
+                    <a:alpha val="98824"/>
+                  </a:srgbClr>
+                </a:solidFill>
+                <a:latin typeface="Segoe UI" pitchFamily="34" charset="0"/>
+                <a:ea typeface="Segoe UI" pitchFamily="34" charset="0"/>
+                <a:cs typeface="Segoe UI" pitchFamily="34" charset="0"/>
+              </a:endParaRPr>
+            </a:p>
+          </p:txBody>
+        </p:sp>
+      </p:grpSp>
+      <p:grpSp>
+        <p:nvGrpSpPr>
+          <p:cNvPr id="12" name="Group 11"/>
+          <p:cNvGrpSpPr/>
+          <p:nvPr/>
+        </p:nvGrpSpPr>
+        <p:grpSpPr>
+          <a:xfrm>
+            <a:off x="8038628" y="4428422"/>
+            <a:ext cx="3240360" cy="1808890"/>
+            <a:chOff x="8038628" y="4428422"/>
+            <a:chExt cx="3240360" cy="1808890"/>
+          </a:xfrm>
+        </p:grpSpPr>
+        <p:sp>
+          <p:nvSpPr>
+            <p:cNvPr id="9" name="Rectangle 8"/>
+            <p:cNvSpPr/>
+            <p:nvPr/>
+          </p:nvSpPr>
+          <p:spPr bwMode="auto">
+            <a:xfrm>
+              <a:off x="8038628" y="5445224"/>
+              <a:ext cx="3240360" cy="792088"/>
+            </a:xfrm>
+            <a:prstGeom prst="rect">
+              <a:avLst/>
+            </a:prstGeom>
+            <a:solidFill>
+              <a:schemeClr val="accent4"/>
+            </a:solidFill>
+            <a:ln>
+              <a:noFill/>
+              <a:headEnd type="none" w="med" len="med"/>
+              <a:tailEnd type="none" w="med" len="med"/>
+            </a:ln>
+            <a:effectLst/>
+          </p:spPr>
+          <p:style>
+            <a:lnRef idx="1">
+              <a:schemeClr val="accent1"/>
+            </a:lnRef>
+            <a:fillRef idx="3">
+              <a:schemeClr val="accent1"/>
+            </a:fillRef>
+            <a:effectRef idx="2">
+              <a:schemeClr val="accent1"/>
+            </a:effectRef>
+            <a:fontRef idx="minor">
+              <a:schemeClr val="lt1"/>
+            </a:fontRef>
+          </p:style>
+          <p:txBody>
+            <a:bodyPr vert="horz" wrap="square" lIns="91436" tIns="45718" rIns="91436" bIns="45718" numCol="1" rtlCol="0" anchor="ctr" anchorCtr="0" compatLnSpc="1">
+              <a:prstTxWarp prst="textNoShape">
+                <a:avLst/>
+              </a:prstTxWarp>
+            </a:bodyPr>
+            <a:lstStyle/>
+            <a:p>
+              <a:pPr algn="ctr" defTabSz="914099"/>
+              <a:r>
+                <a:rPr lang="en-US" sz="2200" dirty="0">
+                  <a:solidFill>
+                    <a:srgbClr val="FFFFFF">
+                      <a:alpha val="98824"/>
+                    </a:srgbClr>
+                  </a:solidFill>
+                  <a:latin typeface="Segoe UI" pitchFamily="34" charset="0"/>
+                  <a:ea typeface="Segoe UI" pitchFamily="34" charset="0"/>
+                  <a:cs typeface="Segoe UI" pitchFamily="34" charset="0"/>
+                </a:rPr>
+                <a:t>Your existing </a:t>
+              </a:r>
+              <a:r>
+                <a:rPr lang="en-US" sz="2200" dirty="0" smtClean="0">
+                  <a:solidFill>
+                    <a:srgbClr val="FFFFFF">
+                      <a:alpha val="98824"/>
+                    </a:srgbClr>
+                  </a:solidFill>
+                  <a:latin typeface="Segoe UI" pitchFamily="34" charset="0"/>
+                  <a:ea typeface="Segoe UI" pitchFamily="34" charset="0"/>
+                  <a:cs typeface="Segoe UI" pitchFamily="34" charset="0"/>
+                </a:rPr>
+                <a:t>code</a:t>
+              </a:r>
+              <a:endParaRPr lang="en-US" sz="2200" dirty="0">
+                <a:solidFill>
+                  <a:srgbClr val="FFFFFF">
+                    <a:alpha val="98824"/>
+                  </a:srgbClr>
+                </a:solidFill>
+                <a:latin typeface="Segoe UI" pitchFamily="34" charset="0"/>
+                <a:ea typeface="Segoe UI" pitchFamily="34" charset="0"/>
+                <a:cs typeface="Segoe UI" pitchFamily="34" charset="0"/>
+              </a:endParaRPr>
+            </a:p>
+          </p:txBody>
+        </p:sp>
+        <p:sp>
+          <p:nvSpPr>
+            <p:cNvPr id="10" name="Rectangle 9"/>
+            <p:cNvSpPr/>
+            <p:nvPr/>
+          </p:nvSpPr>
+          <p:spPr bwMode="auto">
+            <a:xfrm>
+              <a:off x="8038628" y="4428422"/>
+              <a:ext cx="3240360" cy="767858"/>
+            </a:xfrm>
+            <a:prstGeom prst="rect">
+              <a:avLst/>
+            </a:prstGeom>
+            <a:solidFill>
+              <a:schemeClr val="accent4"/>
+            </a:solidFill>
+            <a:ln>
+              <a:noFill/>
+              <a:headEnd type="none" w="med" len="med"/>
+              <a:tailEnd type="none" w="med" len="med"/>
+            </a:ln>
+            <a:effectLst/>
+          </p:spPr>
+          <p:style>
+            <a:lnRef idx="1">
+              <a:schemeClr val="accent1"/>
+            </a:lnRef>
+            <a:fillRef idx="3">
+              <a:schemeClr val="accent1"/>
+            </a:fillRef>
+            <a:effectRef idx="2">
+              <a:schemeClr val="accent1"/>
+            </a:effectRef>
+            <a:fontRef idx="minor">
+              <a:schemeClr val="lt1"/>
+            </a:fontRef>
+          </p:style>
+          <p:txBody>
+            <a:bodyPr vert="horz" wrap="square" lIns="91436" tIns="45718" rIns="91436" bIns="45718" numCol="1" rtlCol="0" anchor="ctr" anchorCtr="0" compatLnSpc="1">
+              <a:prstTxWarp prst="textNoShape">
+                <a:avLst/>
+              </a:prstTxWarp>
+            </a:bodyPr>
+            <a:lstStyle/>
+            <a:p>
+              <a:pPr algn="ctr" defTabSz="914099"/>
+              <a:r>
+                <a:rPr lang="en-US" sz="2200" dirty="0">
+                  <a:solidFill>
+                    <a:srgbClr val="FFFFFF">
+                      <a:alpha val="98824"/>
+                    </a:srgbClr>
+                  </a:solidFill>
+                  <a:latin typeface="Segoe UI" pitchFamily="34" charset="0"/>
+                  <a:ea typeface="Segoe UI" pitchFamily="34" charset="0"/>
+                  <a:cs typeface="Segoe UI" pitchFamily="34" charset="0"/>
+                </a:rPr>
+                <a:t>3</a:t>
+              </a:r>
+              <a:r>
+                <a:rPr lang="en-US" sz="2200" baseline="30000" dirty="0">
+                  <a:solidFill>
+                    <a:srgbClr val="FFFFFF">
+                      <a:alpha val="98824"/>
+                    </a:srgbClr>
+                  </a:solidFill>
+                  <a:latin typeface="Segoe UI" pitchFamily="34" charset="0"/>
+                  <a:ea typeface="Segoe UI" pitchFamily="34" charset="0"/>
+                  <a:cs typeface="Segoe UI" pitchFamily="34" charset="0"/>
+                </a:rPr>
+                <a:t>rd</a:t>
+              </a:r>
+              <a:r>
+                <a:rPr lang="en-US" sz="2200" dirty="0">
+                  <a:solidFill>
+                    <a:srgbClr val="FFFFFF">
+                      <a:alpha val="98824"/>
+                    </a:srgbClr>
+                  </a:solidFill>
+                  <a:latin typeface="Segoe UI" pitchFamily="34" charset="0"/>
+                  <a:ea typeface="Segoe UI" pitchFamily="34" charset="0"/>
+                  <a:cs typeface="Segoe UI" pitchFamily="34" charset="0"/>
+                </a:rPr>
+                <a:t> party existing </a:t>
+              </a:r>
+              <a:r>
+                <a:rPr lang="en-US" sz="2200" dirty="0" smtClean="0">
+                  <a:solidFill>
+                    <a:srgbClr val="FFFFFF">
+                      <a:alpha val="98824"/>
+                    </a:srgbClr>
+                  </a:solidFill>
+                  <a:latin typeface="Segoe UI" pitchFamily="34" charset="0"/>
+                  <a:ea typeface="Segoe UI" pitchFamily="34" charset="0"/>
+                  <a:cs typeface="Segoe UI" pitchFamily="34" charset="0"/>
+                </a:rPr>
+                <a:t>code</a:t>
+              </a:r>
+              <a:endParaRPr lang="en-US" sz="2200" dirty="0">
+                <a:solidFill>
+                  <a:srgbClr val="FFFFFF">
+                    <a:alpha val="98824"/>
+                  </a:srgbClr>
+                </a:solidFill>
+                <a:latin typeface="Segoe UI" pitchFamily="34" charset="0"/>
+                <a:ea typeface="Segoe UI" pitchFamily="34" charset="0"/>
+                <a:cs typeface="Segoe UI" pitchFamily="34" charset="0"/>
+              </a:endParaRPr>
+            </a:p>
+          </p:txBody>
+        </p:sp>
+      </p:grpSp>
+    </p:spTree>
+    <p:extLst>
+      <p:ext uri="{BB962C8B-B14F-4D97-AF65-F5344CB8AC3E}">
+        <p14:creationId xmlns:p14="http://schemas.microsoft.com/office/powerpoint/2010/main" val="807416573"/>
+      </p:ext>
+    </p:extLst>
+  </p:cSld>
+  <p:clrMapOvr>
+    <a:masterClrMapping/>
+  </p:clrMapOvr>
+  <p:transition>
+    <p:fade/>
+  </p:transition>
+  <p:timing>
+    <p:tnLst>
+      <p:par>
+        <p:cTn id="1" dur="indefinite" restart="never" nodeType="tmRoot">
+          <p:childTnLst>
+            <p:seq concurrent="1" nextAc="seek">
+              <p:cTn id="2" dur="indefinite" nodeType="mainSeq">
+                <p:childTnLst>
+                  <p:par>
+                    <p:cTn id="3" fill="hold">
+                      <p:stCondLst>
+                        <p:cond delay="indefinite"/>
+                      </p:stCondLst>
+                      <p:childTnLst>
+                        <p:par>
+                          <p:cTn id="4" fill="hold">
+                            <p:stCondLst>
+                              <p:cond delay="0"/>
+                            </p:stCondLst>
+                            <p:childTnLst>
+                              <p:par>
+                                <p:cTn id="5" presetID="1" presetClass="entr" presetSubtype="0" fill="hold" grpId="0" nodeType="clickEffect">
+                                  <p:stCondLst>
+                                    <p:cond delay="0"/>
+                                  </p:stCondLst>
+                                  <p:childTnLst>
+                                    <p:set>
+                                      <p:cBhvr>
+                                        <p:cTn id="6" dur="1" fill="hold">
+                                          <p:stCondLst>
+                                            <p:cond delay="0"/>
+                                          </p:stCondLst>
+                                        </p:cTn>
+                                        <p:tgtEl>
+                                          <p:spTgt spid="14"/>
                                         </p:tgtEl>
                                         <p:attrNameLst>
                                           <p:attrName>style.visibility</p:attrName>
@@ -21183,11 +22256,7 @@
                                           </p:stCondLst>
                                         </p:cTn>
                                         <p:tgtEl>
-                                          <p:spTgt spid="4">
-                                            <p:txEl>
-                                              <p:pRg st="1" end="1"/>
-                                            </p:txEl>
-                                          </p:spTgt>
+                                          <p:spTgt spid="7"/>
                                         </p:tgtEl>
                                         <p:attrNameLst>
                                           <p:attrName>style.visibility</p:attrName>
@@ -21232,11 +22301,7 @@
                                           </p:stCondLst>
                                         </p:cTn>
                                         <p:tgtEl>
-                                          <p:spTgt spid="4">
-                                            <p:txEl>
-                                              <p:pRg st="2" end="2"/>
-                                            </p:txEl>
-                                          </p:spTgt>
+                                          <p:spTgt spid="11"/>
                                         </p:tgtEl>
                                         <p:attrNameLst>
                                           <p:attrName>style.visibility</p:attrName>
@@ -21281,207 +22346,7 @@
                                           </p:stCondLst>
                                         </p:cTn>
                                         <p:tgtEl>
-                                          <p:spTgt spid="4">
-                                            <p:txEl>
-                                              <p:pRg st="3" end="3"/>
-                                            </p:txEl>
-                                          </p:spTgt>
-                                        </p:tgtEl>
-                                        <p:attrNameLst>
-                                          <p:attrName>style.visibility</p:attrName>
-                                        </p:attrNameLst>
-                                      </p:cBhvr>
-                                      <p:to>
-                                        <p:strVal val="visible"/>
-                                      </p:to>
-                                    </p:set>
-                                  </p:childTnLst>
-                                </p:cTn>
-                              </p:par>
-                            </p:childTnLst>
-                          </p:cTn>
-                        </p:par>
-                      </p:childTnLst>
-                    </p:cTn>
-                  </p:par>
-                  <p:par>
-                    <p:cTn id="19" fill="hold">
-                      <p:stCondLst>
-                        <p:cond delay="indefinite"/>
-                      </p:stCondLst>
-                      <p:childTnLst>
-                        <p:par>
-                          <p:cTn id="20" fill="hold">
-                            <p:stCondLst>
-                              <p:cond delay="0"/>
-                            </p:stCondLst>
-                            <p:childTnLst>
-                              <p:par>
-                                <p:cTn id="21" presetID="1" presetClass="entr" presetSubtype="0" fill="hold" nodeType="clickEffect">
-                                  <p:stCondLst>
-                                    <p:cond delay="0"/>
-                                  </p:stCondLst>
-                                  <p:childTnLst>
-                                    <p:set>
-                                      <p:cBhvr>
-                                        <p:cTn id="22" dur="1" fill="hold">
-                                          <p:stCondLst>
-                                            <p:cond delay="0"/>
-                                          </p:stCondLst>
-                                        </p:cTn>
-                                        <p:tgtEl>
-                                          <p:spTgt spid="4">
-                                            <p:txEl>
-                                              <p:pRg st="4" end="4"/>
-                                            </p:txEl>
-                                          </p:spTgt>
-                                        </p:tgtEl>
-                                        <p:attrNameLst>
-                                          <p:attrName>style.visibility</p:attrName>
-                                        </p:attrNameLst>
-                                      </p:cBhvr>
-                                      <p:to>
-                                        <p:strVal val="visible"/>
-                                      </p:to>
-                                    </p:set>
-                                  </p:childTnLst>
-                                </p:cTn>
-                              </p:par>
-                            </p:childTnLst>
-                          </p:cTn>
-                        </p:par>
-                      </p:childTnLst>
-                    </p:cTn>
-                  </p:par>
-                  <p:par>
-                    <p:cTn id="23" fill="hold">
-                      <p:stCondLst>
-                        <p:cond delay="indefinite"/>
-                      </p:stCondLst>
-                      <p:childTnLst>
-                        <p:par>
-                          <p:cTn id="24" fill="hold">
-                            <p:stCondLst>
-                              <p:cond delay="0"/>
-                            </p:stCondLst>
-                            <p:childTnLst>
-                              <p:par>
-                                <p:cTn id="25" presetID="1" presetClass="entr" presetSubtype="0" fill="hold" nodeType="clickEffect">
-                                  <p:stCondLst>
-                                    <p:cond delay="0"/>
-                                  </p:stCondLst>
-                                  <p:childTnLst>
-                                    <p:set>
-                                      <p:cBhvr>
-                                        <p:cTn id="26" dur="1" fill="hold">
-                                          <p:stCondLst>
-                                            <p:cond delay="0"/>
-                                          </p:stCondLst>
-                                        </p:cTn>
-                                        <p:tgtEl>
-                                          <p:spTgt spid="4">
-                                            <p:txEl>
-                                              <p:pRg st="5" end="5"/>
-                                            </p:txEl>
-                                          </p:spTgt>
-                                        </p:tgtEl>
-                                        <p:attrNameLst>
-                                          <p:attrName>style.visibility</p:attrName>
-                                        </p:attrNameLst>
-                                      </p:cBhvr>
-                                      <p:to>
-                                        <p:strVal val="visible"/>
-                                      </p:to>
-                                    </p:set>
-                                  </p:childTnLst>
-                                </p:cTn>
-                              </p:par>
-                            </p:childTnLst>
-                          </p:cTn>
-                        </p:par>
-                      </p:childTnLst>
-                    </p:cTn>
-                  </p:par>
-                  <p:par>
-                    <p:cTn id="27" fill="hold">
-                      <p:stCondLst>
-                        <p:cond delay="indefinite"/>
-                      </p:stCondLst>
-                      <p:childTnLst>
-                        <p:par>
-                          <p:cTn id="28" fill="hold">
-                            <p:stCondLst>
-                              <p:cond delay="0"/>
-                            </p:stCondLst>
-                            <p:childTnLst>
-                              <p:par>
-                                <p:cTn id="29" presetID="1" presetClass="entr" presetSubtype="0" fill="hold" nodeType="clickEffect">
-                                  <p:stCondLst>
-                                    <p:cond delay="0"/>
-                                  </p:stCondLst>
-                                  <p:childTnLst>
-                                    <p:set>
-                                      <p:cBhvr>
-                                        <p:cTn id="30" dur="1" fill="hold">
-                                          <p:stCondLst>
-                                            <p:cond delay="0"/>
-                                          </p:stCondLst>
-                                        </p:cTn>
-                                        <p:tgtEl>
-                                          <p:spTgt spid="4">
-                                            <p:txEl>
-                                              <p:pRg st="6" end="6"/>
-                                            </p:txEl>
-                                          </p:spTgt>
-                                        </p:tgtEl>
-                                        <p:attrNameLst>
-                                          <p:attrName>style.visibility</p:attrName>
-                                        </p:attrNameLst>
-                                      </p:cBhvr>
-                                      <p:to>
-                                        <p:strVal val="visible"/>
-                                      </p:to>
-                                    </p:set>
-                                  </p:childTnLst>
-                                </p:cTn>
-                              </p:par>
-                            </p:childTnLst>
-                          </p:cTn>
-                        </p:par>
-                      </p:childTnLst>
-                    </p:cTn>
-                  </p:par>
-                  <p:par>
-                    <p:cTn id="31" fill="hold">
-                      <p:stCondLst>
-                        <p:cond delay="indefinite"/>
-                      </p:stCondLst>
-                      <p:childTnLst>
-                        <p:par>
-                          <p:cTn id="32" fill="hold">
-                            <p:stCondLst>
-                              <p:cond delay="0"/>
-                            </p:stCondLst>
-                            <p:childTnLst>
-                              <p:par>
-                                <p:cTn id="33" presetID="1" presetClass="entr" presetSubtype="0" fill="hold" nodeType="clickEffect">
-                                  <p:stCondLst>
-                                    <p:cond delay="0"/>
-                                  </p:stCondLst>
-                                  <p:childTnLst>
-                                    <p:set>
-                                      <p:cBhvr>
-                                        <p:cTn id="34" dur="1" fill="hold">
-                                          <p:stCondLst>
-                                            <p:cond delay="0"/>
-                                          </p:stCondLst>
-                                        </p:cTn>
-                                        <p:tgtEl>
-                                          <p:spTgt spid="4">
-                                            <p:txEl>
-                                              <p:pRg st="7" end="7"/>
-                                            </p:txEl>
-                                          </p:spTgt>
+                                          <p:spTgt spid="12"/>
                                         </p:tgtEl>
                                         <p:attrNameLst>
                                           <p:attrName>style.visibility</p:attrName>
@@ -21521,11 +22386,1073 @@
         </p:cTn>
       </p:par>
     </p:tnLst>
+    <p:bldLst>
+      <p:bldP spid="14" grpId="0" animBg="1"/>
+    </p:bldLst>
   </p:timing>
 </p:sld>
 </file>
 
-<file path=ppt/slides/slide13.xml><?xml version="1.0" encoding="utf-8"?>
+<file path=ppt/slides/slide14.xml><?xml version="1.0" encoding="utf-8"?>
+<p:sld xmlns:a="http://schemas.openxmlformats.org/drawingml/2006/main" xmlns:r="http://schemas.openxmlformats.org/officeDocument/2006/relationships" xmlns:p="http://schemas.openxmlformats.org/presentationml/2006/main">
+  <p:cSld>
+    <p:spTree>
+      <p:nvGrpSpPr>
+        <p:cNvPr id="1" name=""/>
+        <p:cNvGrpSpPr/>
+        <p:nvPr/>
+      </p:nvGrpSpPr>
+      <p:grpSpPr>
+        <a:xfrm>
+          <a:off x="0" y="0"/>
+          <a:ext cx="0" cy="0"/>
+          <a:chOff x="0" y="0"/>
+          <a:chExt cx="0" cy="0"/>
+        </a:xfrm>
+      </p:grpSpPr>
+      <p:sp>
+        <p:nvSpPr>
+          <p:cNvPr id="2" name="Title 1"/>
+          <p:cNvSpPr>
+            <a:spLocks noGrp="1"/>
+          </p:cNvSpPr>
+          <p:nvPr>
+            <p:ph type="title"/>
+          </p:nvPr>
+        </p:nvSpPr>
+        <p:spPr/>
+        <p:txBody>
+          <a:bodyPr/>
+          <a:lstStyle/>
+          <a:p>
+            <a:r>
+              <a:rPr lang="en-US" dirty="0" smtClean="0"/>
+              <a:t>WinRT and the Metro style SDK</a:t>
+            </a:r>
+            <a:endParaRPr lang="en-US" dirty="0"/>
+          </a:p>
+        </p:txBody>
+      </p:sp>
+      <p:sp>
+        <p:nvSpPr>
+          <p:cNvPr id="11" name="Rectangle 10"/>
+          <p:cNvSpPr/>
+          <p:nvPr/>
+        </p:nvSpPr>
+        <p:spPr bwMode="auto">
+          <a:xfrm>
+            <a:off x="1629916" y="2276872"/>
+            <a:ext cx="1863565" cy="2670464"/>
+          </a:xfrm>
+          <a:prstGeom prst="rect">
+            <a:avLst/>
+          </a:prstGeom>
+          <a:solidFill>
+            <a:schemeClr val="accent4"/>
+          </a:solidFill>
+          <a:ln>
+            <a:noFill/>
+            <a:headEnd type="none" w="med" len="med"/>
+            <a:tailEnd type="none" w="med" len="med"/>
+          </a:ln>
+          <a:effectLst/>
+        </p:spPr>
+        <p:style>
+          <a:lnRef idx="1">
+            <a:schemeClr val="accent2"/>
+          </a:lnRef>
+          <a:fillRef idx="3">
+            <a:schemeClr val="accent2"/>
+          </a:fillRef>
+          <a:effectRef idx="2">
+            <a:schemeClr val="accent2"/>
+          </a:effectRef>
+          <a:fontRef idx="minor">
+            <a:schemeClr val="lt1"/>
+          </a:fontRef>
+        </p:style>
+        <p:txBody>
+          <a:bodyPr vert="horz" wrap="square" lIns="91436" tIns="822960" rIns="91436" bIns="45718" numCol="1" rtlCol="0" anchor="t" anchorCtr="0" compatLnSpc="1">
+            <a:prstTxWarp prst="textNoShape">
+              <a:avLst/>
+            </a:prstTxWarp>
+          </a:bodyPr>
+          <a:lstStyle/>
+          <a:p>
+            <a:pPr algn="ctr" defTabSz="914099" fontAlgn="base">
+              <a:spcBef>
+                <a:spcPct val="0"/>
+              </a:spcBef>
+              <a:spcAft>
+                <a:spcPct val="0"/>
+              </a:spcAft>
+            </a:pPr>
+            <a:r>
+              <a:rPr lang="en-US" sz="2400" dirty="0" smtClean="0">
+                <a:solidFill>
+                  <a:schemeClr val="bg1"/>
+                </a:solidFill>
+                <a:latin typeface="+mj-lt"/>
+              </a:rPr>
+              <a:t>Apps that are deeply integrated</a:t>
+            </a:r>
+            <a:endParaRPr lang="en-US" sz="2400" dirty="0" smtClean="0">
+              <a:solidFill>
+                <a:schemeClr val="bg1"/>
+              </a:solidFill>
+              <a:latin typeface="+mj-lt"/>
+            </a:endParaRPr>
+          </a:p>
+        </p:txBody>
+      </p:sp>
+      <p:grpSp>
+        <p:nvGrpSpPr>
+          <p:cNvPr id="4" name="Group 3"/>
+          <p:cNvGrpSpPr/>
+          <p:nvPr/>
+        </p:nvGrpSpPr>
+        <p:grpSpPr>
+          <a:xfrm>
+            <a:off x="4654251" y="2060847"/>
+            <a:ext cx="6035939" cy="3242029"/>
+            <a:chOff x="4654251" y="2060847"/>
+            <a:chExt cx="6035939" cy="3242029"/>
+          </a:xfrm>
+        </p:grpSpPr>
+        <p:sp>
+          <p:nvSpPr>
+            <p:cNvPr id="3" name="Rectangle 2"/>
+            <p:cNvSpPr/>
+            <p:nvPr/>
+          </p:nvSpPr>
+          <p:spPr bwMode="auto">
+            <a:xfrm>
+              <a:off x="4654251" y="2060847"/>
+              <a:ext cx="2867587" cy="1463055"/>
+            </a:xfrm>
+            <a:prstGeom prst="rect">
+              <a:avLst/>
+            </a:prstGeom>
+            <a:solidFill>
+              <a:schemeClr val="accent1"/>
+            </a:solidFill>
+            <a:ln>
+              <a:noFill/>
+              <a:headEnd type="none" w="med" len="med"/>
+              <a:tailEnd type="none" w="med" len="med"/>
+            </a:ln>
+            <a:effectLst/>
+          </p:spPr>
+          <p:style>
+            <a:lnRef idx="1">
+              <a:schemeClr val="accent1"/>
+            </a:lnRef>
+            <a:fillRef idx="3">
+              <a:schemeClr val="accent1"/>
+            </a:fillRef>
+            <a:effectRef idx="2">
+              <a:schemeClr val="accent1"/>
+            </a:effectRef>
+            <a:fontRef idx="minor">
+              <a:schemeClr val="lt1"/>
+            </a:fontRef>
+          </p:style>
+          <p:txBody>
+            <a:bodyPr vert="horz" wrap="square" lIns="91436" tIns="45718" rIns="91436" bIns="45718" numCol="1" rtlCol="0" anchor="ctr" anchorCtr="0" compatLnSpc="1">
+              <a:prstTxWarp prst="textNoShape">
+                <a:avLst/>
+              </a:prstTxWarp>
+            </a:bodyPr>
+            <a:lstStyle/>
+            <a:p>
+              <a:pPr algn="ctr" defTabSz="914099"/>
+              <a:r>
+                <a:rPr lang="en-US" sz="2200" dirty="0" smtClean="0">
+                  <a:solidFill>
+                    <a:srgbClr val="FFFFFF">
+                      <a:alpha val="98824"/>
+                    </a:srgbClr>
+                  </a:solidFill>
+                  <a:latin typeface="Segoe UI" pitchFamily="34" charset="0"/>
+                  <a:ea typeface="Segoe UI" pitchFamily="34" charset="0"/>
+                  <a:cs typeface="Segoe UI" pitchFamily="34" charset="0"/>
+                </a:rPr>
+                <a:t>Contracts</a:t>
+              </a:r>
+            </a:p>
+          </p:txBody>
+        </p:sp>
+        <p:sp>
+          <p:nvSpPr>
+            <p:cNvPr id="8" name="Rectangle 7"/>
+            <p:cNvSpPr/>
+            <p:nvPr/>
+          </p:nvSpPr>
+          <p:spPr bwMode="auto">
+            <a:xfrm>
+              <a:off x="4661047" y="3839820"/>
+              <a:ext cx="2867587" cy="1463055"/>
+            </a:xfrm>
+            <a:prstGeom prst="rect">
+              <a:avLst/>
+            </a:prstGeom>
+            <a:solidFill>
+              <a:schemeClr val="accent1"/>
+            </a:solidFill>
+            <a:ln>
+              <a:noFill/>
+              <a:headEnd type="none" w="med" len="med"/>
+              <a:tailEnd type="none" w="med" len="med"/>
+            </a:ln>
+            <a:effectLst/>
+          </p:spPr>
+          <p:style>
+            <a:lnRef idx="1">
+              <a:schemeClr val="accent1"/>
+            </a:lnRef>
+            <a:fillRef idx="3">
+              <a:schemeClr val="accent1"/>
+            </a:fillRef>
+            <a:effectRef idx="2">
+              <a:schemeClr val="accent1"/>
+            </a:effectRef>
+            <a:fontRef idx="minor">
+              <a:schemeClr val="lt1"/>
+            </a:fontRef>
+          </p:style>
+          <p:txBody>
+            <a:bodyPr vert="horz" wrap="square" lIns="91436" tIns="45718" rIns="91436" bIns="45718" numCol="1" rtlCol="0" anchor="ctr" anchorCtr="0" compatLnSpc="1">
+              <a:prstTxWarp prst="textNoShape">
+                <a:avLst/>
+              </a:prstTxWarp>
+            </a:bodyPr>
+            <a:lstStyle/>
+            <a:p>
+              <a:pPr algn="ctr" defTabSz="914099"/>
+              <a:r>
+                <a:rPr lang="en-US" sz="2200" dirty="0" smtClean="0">
+                  <a:solidFill>
+                    <a:srgbClr val="FFFFFF">
+                      <a:alpha val="98824"/>
+                    </a:srgbClr>
+                  </a:solidFill>
+                  <a:latin typeface="Segoe UI" pitchFamily="34" charset="0"/>
+                  <a:ea typeface="Segoe UI" pitchFamily="34" charset="0"/>
+                  <a:cs typeface="Segoe UI" pitchFamily="34" charset="0"/>
+                </a:rPr>
+                <a:t>Capabilities</a:t>
+              </a:r>
+            </a:p>
+          </p:txBody>
+        </p:sp>
+        <p:sp>
+          <p:nvSpPr>
+            <p:cNvPr id="12" name="Rectangle 11"/>
+            <p:cNvSpPr/>
+            <p:nvPr/>
+          </p:nvSpPr>
+          <p:spPr bwMode="auto">
+            <a:xfrm>
+              <a:off x="7822603" y="3839821"/>
+              <a:ext cx="2867587" cy="1463055"/>
+            </a:xfrm>
+            <a:prstGeom prst="rect">
+              <a:avLst/>
+            </a:prstGeom>
+            <a:solidFill>
+              <a:schemeClr val="accent1"/>
+            </a:solidFill>
+            <a:ln>
+              <a:noFill/>
+              <a:headEnd type="none" w="med" len="med"/>
+              <a:tailEnd type="none" w="med" len="med"/>
+            </a:ln>
+            <a:effectLst/>
+          </p:spPr>
+          <p:style>
+            <a:lnRef idx="1">
+              <a:schemeClr val="accent1"/>
+            </a:lnRef>
+            <a:fillRef idx="3">
+              <a:schemeClr val="accent1"/>
+            </a:fillRef>
+            <a:effectRef idx="2">
+              <a:schemeClr val="accent1"/>
+            </a:effectRef>
+            <a:fontRef idx="minor">
+              <a:schemeClr val="lt1"/>
+            </a:fontRef>
+          </p:style>
+          <p:txBody>
+            <a:bodyPr vert="horz" wrap="square" lIns="91436" tIns="45718" rIns="91436" bIns="45718" numCol="1" rtlCol="0" anchor="ctr" anchorCtr="0" compatLnSpc="1">
+              <a:prstTxWarp prst="textNoShape">
+                <a:avLst/>
+              </a:prstTxWarp>
+            </a:bodyPr>
+            <a:lstStyle/>
+            <a:p>
+              <a:pPr algn="ctr" defTabSz="914099"/>
+              <a:r>
+                <a:rPr lang="en-US" sz="2200" dirty="0" smtClean="0">
+                  <a:solidFill>
+                    <a:srgbClr val="FFFFFF">
+                      <a:alpha val="98824"/>
+                    </a:srgbClr>
+                  </a:solidFill>
+                  <a:latin typeface="Segoe UI" pitchFamily="34" charset="0"/>
+                  <a:ea typeface="Segoe UI" pitchFamily="34" charset="0"/>
+                  <a:cs typeface="Segoe UI" pitchFamily="34" charset="0"/>
+                </a:rPr>
+                <a:t>APIs</a:t>
+              </a:r>
+            </a:p>
+          </p:txBody>
+        </p:sp>
+        <p:sp>
+          <p:nvSpPr>
+            <p:cNvPr id="13" name="Rectangle 12"/>
+            <p:cNvSpPr/>
+            <p:nvPr/>
+          </p:nvSpPr>
+          <p:spPr bwMode="auto">
+            <a:xfrm>
+              <a:off x="7822602" y="2060848"/>
+              <a:ext cx="2867587" cy="1463055"/>
+            </a:xfrm>
+            <a:prstGeom prst="rect">
+              <a:avLst/>
+            </a:prstGeom>
+            <a:solidFill>
+              <a:schemeClr val="accent1"/>
+            </a:solidFill>
+            <a:ln>
+              <a:noFill/>
+              <a:headEnd type="none" w="med" len="med"/>
+              <a:tailEnd type="none" w="med" len="med"/>
+            </a:ln>
+            <a:effectLst/>
+          </p:spPr>
+          <p:style>
+            <a:lnRef idx="1">
+              <a:schemeClr val="accent1"/>
+            </a:lnRef>
+            <a:fillRef idx="3">
+              <a:schemeClr val="accent1"/>
+            </a:fillRef>
+            <a:effectRef idx="2">
+              <a:schemeClr val="accent1"/>
+            </a:effectRef>
+            <a:fontRef idx="minor">
+              <a:schemeClr val="lt1"/>
+            </a:fontRef>
+          </p:style>
+          <p:txBody>
+            <a:bodyPr vert="horz" wrap="square" lIns="91436" tIns="45718" rIns="91436" bIns="45718" numCol="1" rtlCol="0" anchor="ctr" anchorCtr="0" compatLnSpc="1">
+              <a:prstTxWarp prst="textNoShape">
+                <a:avLst/>
+              </a:prstTxWarp>
+            </a:bodyPr>
+            <a:lstStyle/>
+            <a:p>
+              <a:pPr algn="ctr" defTabSz="914099"/>
+              <a:r>
+                <a:rPr lang="en-US" sz="2200" dirty="0" smtClean="0">
+                  <a:solidFill>
+                    <a:srgbClr val="FFFFFF">
+                      <a:alpha val="98824"/>
+                    </a:srgbClr>
+                  </a:solidFill>
+                  <a:latin typeface="Segoe UI" pitchFamily="34" charset="0"/>
+                  <a:ea typeface="Segoe UI" pitchFamily="34" charset="0"/>
+                  <a:cs typeface="Segoe UI" pitchFamily="34" charset="0"/>
+                </a:rPr>
+                <a:t>Samples</a:t>
+              </a:r>
+            </a:p>
+          </p:txBody>
+        </p:sp>
+      </p:grpSp>
+    </p:spTree>
+    <p:extLst>
+      <p:ext uri="{BB962C8B-B14F-4D97-AF65-F5344CB8AC3E}">
+        <p14:creationId xmlns:p14="http://schemas.microsoft.com/office/powerpoint/2010/main" val="1857472774"/>
+      </p:ext>
+    </p:extLst>
+  </p:cSld>
+  <p:clrMapOvr>
+    <a:masterClrMapping/>
+  </p:clrMapOvr>
+  <p:transition>
+    <p:fade/>
+  </p:transition>
+  <p:timing>
+    <p:tnLst>
+      <p:par>
+        <p:cTn id="1" dur="indefinite" restart="never" nodeType="tmRoot">
+          <p:childTnLst>
+            <p:seq concurrent="1" nextAc="seek">
+              <p:cTn id="2" dur="indefinite" nodeType="mainSeq">
+                <p:childTnLst>
+                  <p:par>
+                    <p:cTn id="3" fill="hold">
+                      <p:stCondLst>
+                        <p:cond delay="indefinite"/>
+                      </p:stCondLst>
+                      <p:childTnLst>
+                        <p:par>
+                          <p:cTn id="4" fill="hold">
+                            <p:stCondLst>
+                              <p:cond delay="0"/>
+                            </p:stCondLst>
+                            <p:childTnLst>
+                              <p:par>
+                                <p:cTn id="5" presetID="1" presetClass="entr" presetSubtype="0" fill="hold" grpId="0" nodeType="clickEffect">
+                                  <p:stCondLst>
+                                    <p:cond delay="0"/>
+                                  </p:stCondLst>
+                                  <p:childTnLst>
+                                    <p:set>
+                                      <p:cBhvr>
+                                        <p:cTn id="6" dur="1" fill="hold">
+                                          <p:stCondLst>
+                                            <p:cond delay="0"/>
+                                          </p:stCondLst>
+                                        </p:cTn>
+                                        <p:tgtEl>
+                                          <p:spTgt spid="11"/>
+                                        </p:tgtEl>
+                                        <p:attrNameLst>
+                                          <p:attrName>style.visibility</p:attrName>
+                                        </p:attrNameLst>
+                                      </p:cBhvr>
+                                      <p:to>
+                                        <p:strVal val="visible"/>
+                                      </p:to>
+                                    </p:set>
+                                  </p:childTnLst>
+                                </p:cTn>
+                              </p:par>
+                            </p:childTnLst>
+                          </p:cTn>
+                        </p:par>
+                      </p:childTnLst>
+                    </p:cTn>
+                  </p:par>
+                  <p:par>
+                    <p:cTn id="7" fill="hold">
+                      <p:stCondLst>
+                        <p:cond delay="indefinite"/>
+                      </p:stCondLst>
+                      <p:childTnLst>
+                        <p:par>
+                          <p:cTn id="8" fill="hold">
+                            <p:stCondLst>
+                              <p:cond delay="0"/>
+                            </p:stCondLst>
+                            <p:childTnLst>
+                              <p:par>
+                                <p:cTn id="9" presetID="1" presetClass="entr" presetSubtype="0" fill="hold" nodeType="clickEffect">
+                                  <p:stCondLst>
+                                    <p:cond delay="0"/>
+                                  </p:stCondLst>
+                                  <p:childTnLst>
+                                    <p:set>
+                                      <p:cBhvr>
+                                        <p:cTn id="10" dur="1" fill="hold">
+                                          <p:stCondLst>
+                                            <p:cond delay="0"/>
+                                          </p:stCondLst>
+                                        </p:cTn>
+                                        <p:tgtEl>
+                                          <p:spTgt spid="4"/>
+                                        </p:tgtEl>
+                                        <p:attrNameLst>
+                                          <p:attrName>style.visibility</p:attrName>
+                                        </p:attrNameLst>
+                                      </p:cBhvr>
+                                      <p:to>
+                                        <p:strVal val="visible"/>
+                                      </p:to>
+                                    </p:set>
+                                  </p:childTnLst>
+                                </p:cTn>
+                              </p:par>
+                            </p:childTnLst>
+                          </p:cTn>
+                        </p:par>
+                      </p:childTnLst>
+                    </p:cTn>
+                  </p:par>
+                </p:childTnLst>
+              </p:cTn>
+              <p:prevCondLst>
+                <p:cond evt="onPrev" delay="0">
+                  <p:tgtEl>
+                    <p:sldTgt/>
+                  </p:tgtEl>
+                </p:cond>
+              </p:prevCondLst>
+              <p:nextCondLst>
+                <p:cond evt="onNext" delay="0">
+                  <p:tgtEl>
+                    <p:sldTgt/>
+                  </p:tgtEl>
+                </p:cond>
+              </p:nextCondLst>
+            </p:seq>
+          </p:childTnLst>
+        </p:cTn>
+      </p:par>
+    </p:tnLst>
+    <p:bldLst>
+      <p:bldP spid="11" grpId="0" animBg="1"/>
+    </p:bldLst>
+  </p:timing>
+</p:sld>
+</file>
+
+<file path=ppt/slides/slide15.xml><?xml version="1.0" encoding="utf-8"?>
+<p:sld xmlns:a="http://schemas.openxmlformats.org/drawingml/2006/main" xmlns:r="http://schemas.openxmlformats.org/officeDocument/2006/relationships" xmlns:p="http://schemas.openxmlformats.org/presentationml/2006/main">
+  <p:cSld>
+    <p:spTree>
+      <p:nvGrpSpPr>
+        <p:cNvPr id="1" name=""/>
+        <p:cNvGrpSpPr/>
+        <p:nvPr/>
+      </p:nvGrpSpPr>
+      <p:grpSpPr>
+        <a:xfrm>
+          <a:off x="0" y="0"/>
+          <a:ext cx="0" cy="0"/>
+          <a:chOff x="0" y="0"/>
+          <a:chExt cx="0" cy="0"/>
+        </a:xfrm>
+      </p:grpSpPr>
+      <p:sp>
+        <p:nvSpPr>
+          <p:cNvPr id="2" name="Title 1"/>
+          <p:cNvSpPr>
+            <a:spLocks noGrp="1"/>
+          </p:cNvSpPr>
+          <p:nvPr>
+            <p:ph type="title"/>
+          </p:nvPr>
+        </p:nvSpPr>
+        <p:spPr/>
+        <p:txBody>
+          <a:bodyPr/>
+          <a:lstStyle/>
+          <a:p>
+            <a:r>
+              <a:rPr lang="en-US" dirty="0" smtClean="0"/>
+              <a:t>WinRT and the Metro style SDK</a:t>
+            </a:r>
+            <a:endParaRPr lang="en-US" dirty="0"/>
+          </a:p>
+        </p:txBody>
+      </p:sp>
+      <p:grpSp>
+        <p:nvGrpSpPr>
+          <p:cNvPr id="4" name="Group 3"/>
+          <p:cNvGrpSpPr/>
+          <p:nvPr/>
+        </p:nvGrpSpPr>
+        <p:grpSpPr>
+          <a:xfrm>
+            <a:off x="4654251" y="2060847"/>
+            <a:ext cx="6035939" cy="3242029"/>
+            <a:chOff x="4654251" y="2060847"/>
+            <a:chExt cx="6035939" cy="3242029"/>
+          </a:xfrm>
+        </p:grpSpPr>
+        <p:sp>
+          <p:nvSpPr>
+            <p:cNvPr id="3" name="Rectangle 2"/>
+            <p:cNvSpPr/>
+            <p:nvPr/>
+          </p:nvSpPr>
+          <p:spPr bwMode="auto">
+            <a:xfrm>
+              <a:off x="4654251" y="2060847"/>
+              <a:ext cx="2867587" cy="1463055"/>
+            </a:xfrm>
+            <a:prstGeom prst="rect">
+              <a:avLst/>
+            </a:prstGeom>
+            <a:solidFill>
+              <a:schemeClr val="accent1"/>
+            </a:solidFill>
+            <a:ln>
+              <a:noFill/>
+              <a:headEnd type="none" w="med" len="med"/>
+              <a:tailEnd type="none" w="med" len="med"/>
+            </a:ln>
+            <a:effectLst/>
+          </p:spPr>
+          <p:style>
+            <a:lnRef idx="1">
+              <a:schemeClr val="accent1"/>
+            </a:lnRef>
+            <a:fillRef idx="3">
+              <a:schemeClr val="accent1"/>
+            </a:fillRef>
+            <a:effectRef idx="2">
+              <a:schemeClr val="accent1"/>
+            </a:effectRef>
+            <a:fontRef idx="minor">
+              <a:schemeClr val="lt1"/>
+            </a:fontRef>
+          </p:style>
+          <p:txBody>
+            <a:bodyPr vert="horz" wrap="square" lIns="91436" tIns="45718" rIns="91436" bIns="45718" numCol="1" rtlCol="0" anchor="ctr" anchorCtr="0" compatLnSpc="1">
+              <a:prstTxWarp prst="textNoShape">
+                <a:avLst/>
+              </a:prstTxWarp>
+            </a:bodyPr>
+            <a:lstStyle/>
+            <a:p>
+              <a:pPr algn="ctr" defTabSz="914099"/>
+              <a:r>
+                <a:rPr lang="en-US" sz="2200" dirty="0" err="1" smtClean="0">
+                  <a:solidFill>
+                    <a:srgbClr val="FFFFFF">
+                      <a:alpha val="98824"/>
+                    </a:srgbClr>
+                  </a:solidFill>
+                  <a:latin typeface="Segoe UI" pitchFamily="34" charset="0"/>
+                  <a:ea typeface="Segoe UI" pitchFamily="34" charset="0"/>
+                  <a:cs typeface="Segoe UI" pitchFamily="34" charset="0"/>
+                </a:rPr>
+                <a:t>Async</a:t>
+              </a:r>
+              <a:r>
+                <a:rPr lang="en-US" sz="2200" dirty="0" smtClean="0">
+                  <a:solidFill>
+                    <a:srgbClr val="FFFFFF">
+                      <a:alpha val="98824"/>
+                    </a:srgbClr>
+                  </a:solidFill>
+                  <a:latin typeface="Segoe UI" pitchFamily="34" charset="0"/>
+                  <a:ea typeface="Segoe UI" pitchFamily="34" charset="0"/>
+                  <a:cs typeface="Segoe UI" pitchFamily="34" charset="0"/>
+                </a:rPr>
+                <a:t> everywhere</a:t>
+              </a:r>
+            </a:p>
+          </p:txBody>
+        </p:sp>
+        <p:sp>
+          <p:nvSpPr>
+            <p:cNvPr id="8" name="Rectangle 7"/>
+            <p:cNvSpPr/>
+            <p:nvPr/>
+          </p:nvSpPr>
+          <p:spPr bwMode="auto">
+            <a:xfrm>
+              <a:off x="4661047" y="3839820"/>
+              <a:ext cx="2867587" cy="1463055"/>
+            </a:xfrm>
+            <a:prstGeom prst="rect">
+              <a:avLst/>
+            </a:prstGeom>
+            <a:solidFill>
+              <a:schemeClr val="accent1"/>
+            </a:solidFill>
+            <a:ln>
+              <a:noFill/>
+              <a:headEnd type="none" w="med" len="med"/>
+              <a:tailEnd type="none" w="med" len="med"/>
+            </a:ln>
+            <a:effectLst/>
+          </p:spPr>
+          <p:style>
+            <a:lnRef idx="1">
+              <a:schemeClr val="accent1"/>
+            </a:lnRef>
+            <a:fillRef idx="3">
+              <a:schemeClr val="accent1"/>
+            </a:fillRef>
+            <a:effectRef idx="2">
+              <a:schemeClr val="accent1"/>
+            </a:effectRef>
+            <a:fontRef idx="minor">
+              <a:schemeClr val="lt1"/>
+            </a:fontRef>
+          </p:style>
+          <p:txBody>
+            <a:bodyPr vert="horz" wrap="square" lIns="91436" tIns="45718" rIns="91436" bIns="45718" numCol="1" rtlCol="0" anchor="ctr" anchorCtr="0" compatLnSpc="1">
+              <a:prstTxWarp prst="textNoShape">
+                <a:avLst/>
+              </a:prstTxWarp>
+            </a:bodyPr>
+            <a:lstStyle/>
+            <a:p>
+              <a:pPr algn="ctr" defTabSz="914099"/>
+              <a:r>
+                <a:rPr lang="en-US" sz="2200" dirty="0" smtClean="0">
+                  <a:solidFill>
+                    <a:srgbClr val="FFFFFF">
+                      <a:alpha val="98824"/>
+                    </a:srgbClr>
+                  </a:solidFill>
+                  <a:latin typeface="Segoe UI" pitchFamily="34" charset="0"/>
+                  <a:ea typeface="Segoe UI" pitchFamily="34" charset="0"/>
+                  <a:cs typeface="Segoe UI" pitchFamily="34" charset="0"/>
+                </a:rPr>
+                <a:t>Onboarding to Store</a:t>
+              </a:r>
+            </a:p>
+          </p:txBody>
+        </p:sp>
+        <p:sp>
+          <p:nvSpPr>
+            <p:cNvPr id="12" name="Rectangle 11"/>
+            <p:cNvSpPr/>
+            <p:nvPr/>
+          </p:nvSpPr>
+          <p:spPr bwMode="auto">
+            <a:xfrm>
+              <a:off x="7822603" y="3839821"/>
+              <a:ext cx="2867587" cy="1463055"/>
+            </a:xfrm>
+            <a:prstGeom prst="rect">
+              <a:avLst/>
+            </a:prstGeom>
+            <a:solidFill>
+              <a:schemeClr val="accent1"/>
+            </a:solidFill>
+            <a:ln>
+              <a:noFill/>
+              <a:headEnd type="none" w="med" len="med"/>
+              <a:tailEnd type="none" w="med" len="med"/>
+            </a:ln>
+            <a:effectLst/>
+          </p:spPr>
+          <p:style>
+            <a:lnRef idx="1">
+              <a:schemeClr val="accent1"/>
+            </a:lnRef>
+            <a:fillRef idx="3">
+              <a:schemeClr val="accent1"/>
+            </a:fillRef>
+            <a:effectRef idx="2">
+              <a:schemeClr val="accent1"/>
+            </a:effectRef>
+            <a:fontRef idx="minor">
+              <a:schemeClr val="lt1"/>
+            </a:fontRef>
+          </p:style>
+          <p:txBody>
+            <a:bodyPr vert="horz" wrap="square" lIns="91436" tIns="45718" rIns="91436" bIns="45718" numCol="1" rtlCol="0" anchor="ctr" anchorCtr="0" compatLnSpc="1">
+              <a:prstTxWarp prst="textNoShape">
+                <a:avLst/>
+              </a:prstTxWarp>
+            </a:bodyPr>
+            <a:lstStyle/>
+            <a:p>
+              <a:pPr algn="ctr" defTabSz="914099"/>
+              <a:r>
+                <a:rPr lang="en-US" sz="2200" smtClean="0">
+                  <a:solidFill>
+                    <a:srgbClr val="FFFFFF">
+                      <a:alpha val="98824"/>
+                    </a:srgbClr>
+                  </a:solidFill>
+                  <a:latin typeface="Segoe UI" pitchFamily="34" charset="0"/>
+                  <a:ea typeface="Segoe UI" pitchFamily="34" charset="0"/>
+                  <a:cs typeface="Segoe UI" pitchFamily="34" charset="0"/>
+                </a:rPr>
+                <a:t>Trustworthy</a:t>
+              </a:r>
+              <a:endParaRPr lang="en-US" sz="2200" dirty="0" smtClean="0">
+                <a:solidFill>
+                  <a:srgbClr val="FFFFFF">
+                    <a:alpha val="98824"/>
+                  </a:srgbClr>
+                </a:solidFill>
+                <a:latin typeface="Segoe UI" pitchFamily="34" charset="0"/>
+                <a:ea typeface="Segoe UI" pitchFamily="34" charset="0"/>
+                <a:cs typeface="Segoe UI" pitchFamily="34" charset="0"/>
+              </a:endParaRPr>
+            </a:p>
+          </p:txBody>
+        </p:sp>
+        <p:sp>
+          <p:nvSpPr>
+            <p:cNvPr id="13" name="Rectangle 12"/>
+            <p:cNvSpPr/>
+            <p:nvPr/>
+          </p:nvSpPr>
+          <p:spPr bwMode="auto">
+            <a:xfrm>
+              <a:off x="7822602" y="2060848"/>
+              <a:ext cx="2867587" cy="1463055"/>
+            </a:xfrm>
+            <a:prstGeom prst="rect">
+              <a:avLst/>
+            </a:prstGeom>
+            <a:solidFill>
+              <a:schemeClr val="accent1"/>
+            </a:solidFill>
+            <a:ln>
+              <a:noFill/>
+              <a:headEnd type="none" w="med" len="med"/>
+              <a:tailEnd type="none" w="med" len="med"/>
+            </a:ln>
+            <a:effectLst/>
+          </p:spPr>
+          <p:style>
+            <a:lnRef idx="1">
+              <a:schemeClr val="accent1"/>
+            </a:lnRef>
+            <a:fillRef idx="3">
+              <a:schemeClr val="accent1"/>
+            </a:fillRef>
+            <a:effectRef idx="2">
+              <a:schemeClr val="accent1"/>
+            </a:effectRef>
+            <a:fontRef idx="minor">
+              <a:schemeClr val="lt1"/>
+            </a:fontRef>
+          </p:style>
+          <p:txBody>
+            <a:bodyPr vert="horz" wrap="square" lIns="91436" tIns="45718" rIns="91436" bIns="45718" numCol="1" rtlCol="0" anchor="ctr" anchorCtr="0" compatLnSpc="1">
+              <a:prstTxWarp prst="textNoShape">
+                <a:avLst/>
+              </a:prstTxWarp>
+            </a:bodyPr>
+            <a:lstStyle/>
+            <a:p>
+              <a:pPr algn="ctr" defTabSz="914099"/>
+              <a:r>
+                <a:rPr lang="en-US" sz="2200" dirty="0" smtClean="0">
+                  <a:solidFill>
+                    <a:srgbClr val="FFFFFF">
+                      <a:alpha val="98824"/>
+                    </a:srgbClr>
+                  </a:solidFill>
+                  <a:latin typeface="Segoe UI" pitchFamily="34" charset="0"/>
+                  <a:ea typeface="Segoe UI" pitchFamily="34" charset="0"/>
+                  <a:cs typeface="Segoe UI" pitchFamily="34" charset="0"/>
+                </a:rPr>
+                <a:t>Debugging</a:t>
+              </a:r>
+            </a:p>
+          </p:txBody>
+        </p:sp>
+      </p:grpSp>
+      <p:sp>
+        <p:nvSpPr>
+          <p:cNvPr id="9" name="Rectangle 8"/>
+          <p:cNvSpPr/>
+          <p:nvPr/>
+        </p:nvSpPr>
+        <p:spPr bwMode="auto">
+          <a:xfrm>
+            <a:off x="1197868" y="2285612"/>
+            <a:ext cx="1863565" cy="2670464"/>
+          </a:xfrm>
+          <a:prstGeom prst="rect">
+            <a:avLst/>
+          </a:prstGeom>
+          <a:solidFill>
+            <a:schemeClr val="accent6"/>
+          </a:solidFill>
+          <a:ln>
+            <a:noFill/>
+            <a:headEnd type="none" w="med" len="med"/>
+            <a:tailEnd type="none" w="med" len="med"/>
+          </a:ln>
+          <a:effectLst/>
+        </p:spPr>
+        <p:style>
+          <a:lnRef idx="1">
+            <a:schemeClr val="accent2"/>
+          </a:lnRef>
+          <a:fillRef idx="3">
+            <a:schemeClr val="accent2"/>
+          </a:fillRef>
+          <a:effectRef idx="2">
+            <a:schemeClr val="accent2"/>
+          </a:effectRef>
+          <a:fontRef idx="minor">
+            <a:schemeClr val="lt1"/>
+          </a:fontRef>
+        </p:style>
+        <p:txBody>
+          <a:bodyPr vert="horz" wrap="square" lIns="91436" tIns="822960" rIns="91436" bIns="45718" numCol="1" rtlCol="0" anchor="t" anchorCtr="0" compatLnSpc="1">
+            <a:prstTxWarp prst="textNoShape">
+              <a:avLst/>
+            </a:prstTxWarp>
+          </a:bodyPr>
+          <a:lstStyle/>
+          <a:p>
+            <a:pPr algn="ctr" defTabSz="914099" fontAlgn="base">
+              <a:spcBef>
+                <a:spcPct val="0"/>
+              </a:spcBef>
+              <a:spcAft>
+                <a:spcPct val="0"/>
+              </a:spcAft>
+            </a:pPr>
+            <a:r>
+              <a:rPr lang="en-US" sz="2400" dirty="0" smtClean="0">
+                <a:solidFill>
+                  <a:schemeClr val="bg1"/>
+                </a:solidFill>
+                <a:latin typeface="+mj-lt"/>
+              </a:rPr>
+              <a:t>Apps that are high quality</a:t>
+            </a:r>
+            <a:endParaRPr lang="en-US" sz="2400" dirty="0" smtClean="0">
+              <a:solidFill>
+                <a:schemeClr val="bg1"/>
+              </a:solidFill>
+              <a:latin typeface="+mj-lt"/>
+            </a:endParaRPr>
+          </a:p>
+        </p:txBody>
+      </p:sp>
+    </p:spTree>
+    <p:extLst>
+      <p:ext uri="{BB962C8B-B14F-4D97-AF65-F5344CB8AC3E}">
+        <p14:creationId xmlns:p14="http://schemas.microsoft.com/office/powerpoint/2010/main" val="2626507793"/>
+      </p:ext>
+    </p:extLst>
+  </p:cSld>
+  <p:clrMapOvr>
+    <a:masterClrMapping/>
+  </p:clrMapOvr>
+  <p:transition>
+    <p:fade/>
+  </p:transition>
+  <p:timing>
+    <p:tnLst>
+      <p:par>
+        <p:cTn id="1" dur="indefinite" restart="never" nodeType="tmRoot">
+          <p:childTnLst>
+            <p:seq concurrent="1" nextAc="seek">
+              <p:cTn id="2" dur="indefinite" nodeType="mainSeq">
+                <p:childTnLst>
+                  <p:par>
+                    <p:cTn id="3" fill="hold">
+                      <p:stCondLst>
+                        <p:cond delay="indefinite"/>
+                      </p:stCondLst>
+                      <p:childTnLst>
+                        <p:par>
+                          <p:cTn id="4" fill="hold">
+                            <p:stCondLst>
+                              <p:cond delay="0"/>
+                            </p:stCondLst>
+                            <p:childTnLst>
+                              <p:par>
+                                <p:cTn id="5" presetID="1" presetClass="entr" presetSubtype="0" fill="hold" grpId="0" nodeType="clickEffect">
+                                  <p:stCondLst>
+                                    <p:cond delay="0"/>
+                                  </p:stCondLst>
+                                  <p:childTnLst>
+                                    <p:set>
+                                      <p:cBhvr>
+                                        <p:cTn id="6" dur="1" fill="hold">
+                                          <p:stCondLst>
+                                            <p:cond delay="0"/>
+                                          </p:stCondLst>
+                                        </p:cTn>
+                                        <p:tgtEl>
+                                          <p:spTgt spid="9"/>
+                                        </p:tgtEl>
+                                        <p:attrNameLst>
+                                          <p:attrName>style.visibility</p:attrName>
+                                        </p:attrNameLst>
+                                      </p:cBhvr>
+                                      <p:to>
+                                        <p:strVal val="visible"/>
+                                      </p:to>
+                                    </p:set>
+                                  </p:childTnLst>
+                                </p:cTn>
+                              </p:par>
+                            </p:childTnLst>
+                          </p:cTn>
+                        </p:par>
+                      </p:childTnLst>
+                    </p:cTn>
+                  </p:par>
+                  <p:par>
+                    <p:cTn id="7" fill="hold">
+                      <p:stCondLst>
+                        <p:cond delay="indefinite"/>
+                      </p:stCondLst>
+                      <p:childTnLst>
+                        <p:par>
+                          <p:cTn id="8" fill="hold">
+                            <p:stCondLst>
+                              <p:cond delay="0"/>
+                            </p:stCondLst>
+                            <p:childTnLst>
+                              <p:par>
+                                <p:cTn id="9" presetID="1" presetClass="entr" presetSubtype="0" fill="hold" nodeType="clickEffect">
+                                  <p:stCondLst>
+                                    <p:cond delay="0"/>
+                                  </p:stCondLst>
+                                  <p:childTnLst>
+                                    <p:set>
+                                      <p:cBhvr>
+                                        <p:cTn id="10" dur="1" fill="hold">
+                                          <p:stCondLst>
+                                            <p:cond delay="0"/>
+                                          </p:stCondLst>
+                                        </p:cTn>
+                                        <p:tgtEl>
+                                          <p:spTgt spid="4"/>
+                                        </p:tgtEl>
+                                        <p:attrNameLst>
+                                          <p:attrName>style.visibility</p:attrName>
+                                        </p:attrNameLst>
+                                      </p:cBhvr>
+                                      <p:to>
+                                        <p:strVal val="visible"/>
+                                      </p:to>
+                                    </p:set>
+                                  </p:childTnLst>
+                                </p:cTn>
+                              </p:par>
+                            </p:childTnLst>
+                          </p:cTn>
+                        </p:par>
+                      </p:childTnLst>
+                    </p:cTn>
+                  </p:par>
+                </p:childTnLst>
+              </p:cTn>
+              <p:prevCondLst>
+                <p:cond evt="onPrev" delay="0">
+                  <p:tgtEl>
+                    <p:sldTgt/>
+                  </p:tgtEl>
+                </p:cond>
+              </p:prevCondLst>
+              <p:nextCondLst>
+                <p:cond evt="onNext" delay="0">
+                  <p:tgtEl>
+                    <p:sldTgt/>
+                  </p:tgtEl>
+                </p:cond>
+              </p:nextCondLst>
+            </p:seq>
+          </p:childTnLst>
+        </p:cTn>
+      </p:par>
+    </p:tnLst>
+    <p:bldLst>
+      <p:bldP spid="9" grpId="0" animBg="1"/>
+    </p:bldLst>
+  </p:timing>
+</p:sld>
+</file>
+
+<file path=ppt/slides/slide16.xml><?xml version="1.0" encoding="utf-8"?>
 <p:sld xmlns:a="http://schemas.openxmlformats.org/drawingml/2006/main" xmlns:r="http://schemas.openxmlformats.org/officeDocument/2006/relationships" xmlns:p="http://schemas.openxmlformats.org/presentationml/2006/main">
   <p:cSld>
     <p:spTree>
@@ -21740,7 +23667,7 @@
 </p:sld>
 </file>
 
-<file path=ppt/slides/slide14.xml><?xml version="1.0" encoding="utf-8"?>
+<file path=ppt/slides/slide17.xml><?xml version="1.0" encoding="utf-8"?>
 <p:sld xmlns:a="http://schemas.openxmlformats.org/drawingml/2006/main" xmlns:r="http://schemas.openxmlformats.org/officeDocument/2006/relationships" xmlns:p="http://schemas.openxmlformats.org/presentationml/2006/main">
   <p:cSld>
     <p:spTree>
@@ -21759,7 +23686,7 @@
       </p:grpSpPr>
       <p:sp>
         <p:nvSpPr>
-          <p:cNvPr id="3" name="Title 2"/>
+          <p:cNvPr id="2" name="Title 1"/>
           <p:cNvSpPr>
             <a:spLocks noGrp="1"/>
           </p:cNvSpPr>
@@ -21773,166 +23700,313 @@
           <a:lstStyle/>
           <a:p>
             <a:r>
-              <a:rPr lang="en-US" dirty="0"/>
-              <a:t>8 Things About Building Great Metro style apps</a:t>
+              <a:rPr lang="en-US" dirty="0" smtClean="0"/>
+              <a:t>WinRT and the Metro style SDK</a:t>
             </a:r>
+            <a:endParaRPr lang="en-US" dirty="0"/>
           </a:p>
         </p:txBody>
       </p:sp>
       <p:sp>
         <p:nvSpPr>
-          <p:cNvPr id="4" name="Text Placeholder 3"/>
-          <p:cNvSpPr>
-            <a:spLocks noGrp="1"/>
-          </p:cNvSpPr>
-          <p:nvPr>
-            <p:ph type="body" sz="quarter" idx="10"/>
-          </p:nvPr>
+          <p:cNvPr id="14" name="Rectangle 13"/>
+          <p:cNvSpPr/>
+          <p:nvPr/>
         </p:nvSpPr>
-        <p:spPr>
+        <p:spPr bwMode="auto">
           <a:xfrm>
-            <a:off x="519112" y="1447799"/>
-            <a:ext cx="11149013" cy="4235006"/>
+            <a:off x="3070076" y="1703057"/>
+            <a:ext cx="1863565" cy="2670464"/>
           </a:xfrm>
+          <a:prstGeom prst="rect">
+            <a:avLst/>
+          </a:prstGeom>
+          <a:solidFill>
+            <a:schemeClr val="accent2"/>
+          </a:solidFill>
+          <a:ln>
+            <a:noFill/>
+            <a:headEnd type="none" w="med" len="med"/>
+            <a:tailEnd type="none" w="med" len="med"/>
+          </a:ln>
+          <a:effectLst/>
         </p:spPr>
+        <p:style>
+          <a:lnRef idx="1">
+            <a:schemeClr val="accent2"/>
+          </a:lnRef>
+          <a:fillRef idx="3">
+            <a:schemeClr val="accent2"/>
+          </a:fillRef>
+          <a:effectRef idx="2">
+            <a:schemeClr val="accent2"/>
+          </a:effectRef>
+          <a:fontRef idx="minor">
+            <a:schemeClr val="lt1"/>
+          </a:fontRef>
+        </p:style>
         <p:txBody>
-          <a:bodyPr/>
+          <a:bodyPr vert="horz" wrap="square" lIns="91436" tIns="822960" rIns="91436" bIns="45718" numCol="1" rtlCol="0" anchor="t" anchorCtr="0" compatLnSpc="1">
+            <a:prstTxWarp prst="textNoShape">
+              <a:avLst/>
+            </a:prstTxWarp>
+          </a:bodyPr>
           <a:lstStyle/>
           <a:p>
-            <a:pPr marL="514350" indent="-514350">
-              <a:buAutoNum type="arabicPeriod"/>
+            <a:pPr algn="ctr" defTabSz="914099" fontAlgn="base">
+              <a:spcBef>
+                <a:spcPct val="0"/>
+              </a:spcBef>
+              <a:spcAft>
+                <a:spcPct val="0"/>
+              </a:spcAft>
             </a:pPr>
             <a:r>
-              <a:rPr lang="en-US" dirty="0">
-                <a:solidFill>
-                  <a:schemeClr val="tx1">
-                    <a:alpha val="99000"/>
-                  </a:schemeClr>
-                </a:solidFill>
+              <a:rPr lang="en-US" sz="2400" dirty="0" smtClean="0">
+                <a:gradFill>
+                  <a:gsLst>
+                    <a:gs pos="0">
+                      <a:schemeClr val="tx1"/>
+                    </a:gs>
+                    <a:gs pos="100000">
+                      <a:schemeClr val="tx1"/>
+                    </a:gs>
+                  </a:gsLst>
+                  <a:lin ang="5400000" scaled="0"/>
+                </a:gradFill>
+                <a:latin typeface="+mj-lt"/>
               </a:rPr>
-              <a:t>Use what you know</a:t>
+              <a:t>Apps that are easy to create</a:t>
             </a:r>
+            <a:endParaRPr lang="en-US" sz="2400" dirty="0" smtClean="0">
+              <a:gradFill>
+                <a:gsLst>
+                  <a:gs pos="0">
+                    <a:schemeClr val="tx1"/>
+                  </a:gs>
+                  <a:gs pos="100000">
+                    <a:schemeClr val="tx1"/>
+                  </a:gs>
+                </a:gsLst>
+                <a:lin ang="5400000" scaled="0"/>
+              </a:gradFill>
+              <a:latin typeface="+mj-lt"/>
+            </a:endParaRPr>
           </a:p>
+        </p:txBody>
+      </p:sp>
+      <p:sp>
+        <p:nvSpPr>
+          <p:cNvPr id="35" name="Rectangle 34"/>
+          <p:cNvSpPr/>
+          <p:nvPr/>
+        </p:nvSpPr>
+        <p:spPr bwMode="auto">
+          <a:xfrm>
+            <a:off x="5387270" y="1674482"/>
+            <a:ext cx="1863565" cy="2670464"/>
+          </a:xfrm>
+          <a:prstGeom prst="rect">
+            <a:avLst/>
+          </a:prstGeom>
+          <a:solidFill>
+            <a:schemeClr val="accent4"/>
+          </a:solidFill>
+          <a:ln>
+            <a:noFill/>
+            <a:headEnd type="none" w="med" len="med"/>
+            <a:tailEnd type="none" w="med" len="med"/>
+          </a:ln>
+          <a:effectLst/>
+        </p:spPr>
+        <p:style>
+          <a:lnRef idx="1">
+            <a:schemeClr val="accent2"/>
+          </a:lnRef>
+          <a:fillRef idx="3">
+            <a:schemeClr val="accent2"/>
+          </a:fillRef>
+          <a:effectRef idx="2">
+            <a:schemeClr val="accent2"/>
+          </a:effectRef>
+          <a:fontRef idx="minor">
+            <a:schemeClr val="lt1"/>
+          </a:fontRef>
+        </p:style>
+        <p:txBody>
+          <a:bodyPr vert="horz" wrap="square" lIns="91436" tIns="822960" rIns="91436" bIns="45718" numCol="1" rtlCol="0" anchor="t" anchorCtr="0" compatLnSpc="1">
+            <a:prstTxWarp prst="textNoShape">
+              <a:avLst/>
+            </a:prstTxWarp>
+          </a:bodyPr>
+          <a:lstStyle/>
           <a:p>
-            <a:pPr marL="514350" indent="-514350">
-              <a:buAutoNum type="arabicPeriod"/>
+            <a:pPr algn="ctr" defTabSz="914099" fontAlgn="base">
+              <a:spcBef>
+                <a:spcPct val="0"/>
+              </a:spcBef>
+              <a:spcAft>
+                <a:spcPct val="0"/>
+              </a:spcAft>
             </a:pPr>
             <a:r>
-              <a:rPr lang="en-US" dirty="0">
+              <a:rPr lang="en-US" sz="2400" dirty="0" smtClean="0">
                 <a:solidFill>
-                  <a:schemeClr val="tx1">
-                    <a:alpha val="99000"/>
-                  </a:schemeClr>
+                  <a:schemeClr val="bg1"/>
                 </a:solidFill>
+                <a:latin typeface="+mj-lt"/>
               </a:rPr>
-              <a:t>Use what you have</a:t>
+              <a:t>Apps that are deeply integrated</a:t>
             </a:r>
+            <a:endParaRPr lang="en-US" sz="2400" dirty="0" smtClean="0">
+              <a:solidFill>
+                <a:schemeClr val="bg1"/>
+              </a:solidFill>
+              <a:latin typeface="+mj-lt"/>
+            </a:endParaRPr>
           </a:p>
+        </p:txBody>
+      </p:sp>
+      <p:sp>
+        <p:nvSpPr>
+          <p:cNvPr id="36" name="Rectangle 35"/>
+          <p:cNvSpPr/>
+          <p:nvPr/>
+        </p:nvSpPr>
+        <p:spPr bwMode="auto">
+          <a:xfrm>
+            <a:off x="7704464" y="1674482"/>
+            <a:ext cx="1863565" cy="2670464"/>
+          </a:xfrm>
+          <a:prstGeom prst="rect">
+            <a:avLst/>
+          </a:prstGeom>
+          <a:solidFill>
+            <a:schemeClr val="accent6"/>
+          </a:solidFill>
+          <a:ln>
+            <a:noFill/>
+            <a:headEnd type="none" w="med" len="med"/>
+            <a:tailEnd type="none" w="med" len="med"/>
+          </a:ln>
+          <a:effectLst/>
+        </p:spPr>
+        <p:style>
+          <a:lnRef idx="1">
+            <a:schemeClr val="accent2"/>
+          </a:lnRef>
+          <a:fillRef idx="3">
+            <a:schemeClr val="accent2"/>
+          </a:fillRef>
+          <a:effectRef idx="2">
+            <a:schemeClr val="accent2"/>
+          </a:effectRef>
+          <a:fontRef idx="minor">
+            <a:schemeClr val="lt1"/>
+          </a:fontRef>
+        </p:style>
+        <p:txBody>
+          <a:bodyPr vert="horz" wrap="square" lIns="91436" tIns="822960" rIns="91436" bIns="45718" numCol="1" rtlCol="0" anchor="t" anchorCtr="0" compatLnSpc="1">
+            <a:prstTxWarp prst="textNoShape">
+              <a:avLst/>
+            </a:prstTxWarp>
+          </a:bodyPr>
+          <a:lstStyle/>
           <a:p>
-            <a:pPr marL="514350" indent="-514350">
-              <a:buAutoNum type="arabicPeriod"/>
+            <a:pPr algn="ctr" defTabSz="914099" fontAlgn="base">
+              <a:spcBef>
+                <a:spcPct val="0"/>
+              </a:spcBef>
+              <a:spcAft>
+                <a:spcPct val="0"/>
+              </a:spcAft>
             </a:pPr>
             <a:r>
-              <a:rPr lang="en-US" dirty="0">
+              <a:rPr lang="en-US" sz="2400" dirty="0" smtClean="0">
                 <a:solidFill>
-                  <a:schemeClr val="tx1">
-                    <a:alpha val="99000"/>
-                  </a:schemeClr>
+                  <a:schemeClr val="bg1"/>
                 </a:solidFill>
+                <a:latin typeface="+mj-lt"/>
               </a:rPr>
-              <a:t>Light up on the OS</a:t>
+              <a:t>Apps that are high quality</a:t>
             </a:r>
+            <a:endParaRPr lang="en-US" sz="2400" dirty="0" smtClean="0">
+              <a:solidFill>
+                <a:schemeClr val="bg1"/>
+              </a:solidFill>
+              <a:latin typeface="+mj-lt"/>
+            </a:endParaRPr>
           </a:p>
+        </p:txBody>
+      </p:sp>
+      <p:sp>
+        <p:nvSpPr>
+          <p:cNvPr id="7" name="Rectangle 6"/>
+          <p:cNvSpPr/>
+          <p:nvPr/>
+        </p:nvSpPr>
+        <p:spPr bwMode="auto">
+          <a:xfrm>
+            <a:off x="3087460" y="4637695"/>
+            <a:ext cx="6480570" cy="838200"/>
+          </a:xfrm>
+          <a:prstGeom prst="rect">
+            <a:avLst/>
+          </a:prstGeom>
+          <a:solidFill>
+            <a:schemeClr val="accent5"/>
+          </a:solidFill>
+          <a:ln>
+            <a:noFill/>
+            <a:headEnd type="none" w="med" len="med"/>
+            <a:tailEnd type="none" w="med" len="med"/>
+          </a:ln>
+          <a:effectLst/>
+        </p:spPr>
+        <p:style>
+          <a:lnRef idx="1">
+            <a:schemeClr val="accent2"/>
+          </a:lnRef>
+          <a:fillRef idx="3">
+            <a:schemeClr val="accent2"/>
+          </a:fillRef>
+          <a:effectRef idx="2">
+            <a:schemeClr val="accent2"/>
+          </a:effectRef>
+          <a:fontRef idx="minor">
+            <a:schemeClr val="lt1"/>
+          </a:fontRef>
+        </p:style>
+        <p:txBody>
+          <a:bodyPr vert="horz" wrap="square" lIns="91436" tIns="45718" rIns="91436" bIns="45718" numCol="1" rtlCol="0" anchor="ctr" anchorCtr="0" compatLnSpc="1">
+            <a:prstTxWarp prst="textNoShape">
+              <a:avLst/>
+            </a:prstTxWarp>
+          </a:bodyPr>
+          <a:lstStyle/>
           <a:p>
-            <a:pPr marL="514350" indent="-514350">
-              <a:buAutoNum type="arabicPeriod"/>
+            <a:pPr algn="ctr" defTabSz="914099" fontAlgn="base">
+              <a:spcBef>
+                <a:spcPct val="0"/>
+              </a:spcBef>
+              <a:spcAft>
+                <a:spcPct val="0"/>
+              </a:spcAft>
             </a:pPr>
             <a:r>
-              <a:rPr lang="en-US" dirty="0">
+              <a:rPr lang="en-US" sz="2400" dirty="0" smtClean="0">
                 <a:solidFill>
-                  <a:schemeClr val="tx1">
-                    <a:alpha val="99000"/>
-                  </a:schemeClr>
+                  <a:schemeClr val="bg1"/>
                 </a:solidFill>
+                <a:latin typeface="+mj-lt"/>
               </a:rPr>
-              <a:t>Mix and match your languages</a:t>
+              <a:t>WinRT and the Metro style SDK</a:t>
             </a:r>
-          </a:p>
-          <a:p>
-            <a:pPr marL="514350" indent="-514350">
-              <a:buAutoNum type="arabicPeriod"/>
-            </a:pPr>
-            <a:r>
-              <a:rPr lang="en-US" dirty="0">
-                <a:solidFill>
-                  <a:schemeClr val="tx1">
-                    <a:alpha val="99000"/>
-                  </a:schemeClr>
-                </a:solidFill>
-              </a:rPr>
-              <a:t>When bad things happen</a:t>
-            </a:r>
-          </a:p>
-          <a:p>
-            <a:pPr marL="514350" indent="-514350">
-              <a:buAutoNum type="arabicPeriod"/>
-            </a:pPr>
-            <a:r>
-              <a:rPr lang="en-US" dirty="0">
-                <a:solidFill>
-                  <a:schemeClr val="tx1">
-                    <a:alpha val="99000"/>
-                  </a:schemeClr>
-                </a:solidFill>
-              </a:rPr>
-              <a:t>Use what others know</a:t>
-            </a:r>
-          </a:p>
-          <a:p>
-            <a:pPr marL="514350" indent="-514350">
-              <a:buAutoNum type="arabicPeriod"/>
-            </a:pPr>
-            <a:r>
-              <a:rPr lang="en-US" dirty="0">
-                <a:solidFill>
-                  <a:schemeClr val="tx1">
-                    <a:alpha val="99000"/>
-                  </a:schemeClr>
-                </a:solidFill>
-              </a:rPr>
-              <a:t>Getting it right</a:t>
-            </a:r>
-          </a:p>
-          <a:p>
-            <a:pPr marL="514350" indent="-514350">
-              <a:buAutoNum type="arabicPeriod"/>
-            </a:pPr>
-            <a:r>
-              <a:rPr lang="en-US" dirty="0">
-                <a:solidFill>
-                  <a:schemeClr val="tx1">
-                    <a:alpha val="99000"/>
-                  </a:schemeClr>
-                </a:solidFill>
-              </a:rPr>
-              <a:t>Ship it</a:t>
-            </a:r>
-            <a:r>
-              <a:rPr lang="en-US" dirty="0" smtClean="0">
-                <a:solidFill>
-                  <a:schemeClr val="tx1">
-                    <a:alpha val="99000"/>
-                  </a:schemeClr>
-                </a:solidFill>
-              </a:rPr>
-              <a:t>!</a:t>
-            </a:r>
-            <a:endParaRPr lang="en-US" dirty="0">
+            <a:endParaRPr lang="en-US" sz="2400" dirty="0" smtClean="0">
               <a:solidFill>
-                <a:schemeClr val="tx1">
-                  <a:alpha val="99000"/>
-                </a:schemeClr>
+                <a:schemeClr val="bg1"/>
               </a:solidFill>
+              <a:latin typeface="+mj-lt"/>
             </a:endParaRPr>
           </a:p>
         </p:txBody>
@@ -21940,7 +24014,7 @@
     </p:spTree>
     <p:extLst>
       <p:ext uri="{BB962C8B-B14F-4D97-AF65-F5344CB8AC3E}">
-        <p14:creationId xmlns:p14="http://schemas.microsoft.com/office/powerpoint/2010/main" val="3215709153"/>
+        <p14:creationId xmlns:p14="http://schemas.microsoft.com/office/powerpoint/2010/main" val="2233991162"/>
       </p:ext>
     </p:extLst>
   </p:cSld>
@@ -21953,429 +24027,14 @@
   <p:timing>
     <p:tnLst>
       <p:par>
-        <p:cTn id="1" dur="indefinite" restart="never" nodeType="tmRoot">
-          <p:childTnLst>
-            <p:seq concurrent="1" nextAc="seek">
-              <p:cTn id="2" dur="indefinite" nodeType="mainSeq">
-                <p:childTnLst>
-                  <p:par>
-                    <p:cTn id="3" fill="hold">
-                      <p:stCondLst>
-                        <p:cond delay="indefinite"/>
-                      </p:stCondLst>
-                      <p:childTnLst>
-                        <p:par>
-                          <p:cTn id="4" fill="hold">
-                            <p:stCondLst>
-                              <p:cond delay="0"/>
-                            </p:stCondLst>
-                            <p:childTnLst>
-                              <p:par>
-                                <p:cTn id="5" presetID="1" presetClass="entr" presetSubtype="0" fill="hold" nodeType="clickEffect">
-                                  <p:stCondLst>
-                                    <p:cond delay="0"/>
-                                  </p:stCondLst>
-                                  <p:childTnLst>
-                                    <p:set>
-                                      <p:cBhvr>
-                                        <p:cTn id="6" dur="1" fill="hold">
-                                          <p:stCondLst>
-                                            <p:cond delay="0"/>
-                                          </p:stCondLst>
-                                        </p:cTn>
-                                        <p:tgtEl>
-                                          <p:spTgt spid="4">
-                                            <p:txEl>
-                                              <p:pRg st="0" end="0"/>
-                                            </p:txEl>
-                                          </p:spTgt>
-                                        </p:tgtEl>
-                                        <p:attrNameLst>
-                                          <p:attrName>style.visibility</p:attrName>
-                                        </p:attrNameLst>
-                                      </p:cBhvr>
-                                      <p:to>
-                                        <p:strVal val="visible"/>
-                                      </p:to>
-                                    </p:set>
-                                  </p:childTnLst>
-                                </p:cTn>
-                              </p:par>
-                            </p:childTnLst>
-                          </p:cTn>
-                        </p:par>
-                      </p:childTnLst>
-                    </p:cTn>
-                  </p:par>
-                  <p:par>
-                    <p:cTn id="7" fill="hold">
-                      <p:stCondLst>
-                        <p:cond delay="indefinite"/>
-                      </p:stCondLst>
-                      <p:childTnLst>
-                        <p:par>
-                          <p:cTn id="8" fill="hold">
-                            <p:stCondLst>
-                              <p:cond delay="0"/>
-                            </p:stCondLst>
-                            <p:childTnLst>
-                              <p:par>
-                                <p:cTn id="9" presetID="1" presetClass="entr" presetSubtype="0" fill="hold" nodeType="clickEffect">
-                                  <p:stCondLst>
-                                    <p:cond delay="0"/>
-                                  </p:stCondLst>
-                                  <p:childTnLst>
-                                    <p:set>
-                                      <p:cBhvr>
-                                        <p:cTn id="10" dur="1" fill="hold">
-                                          <p:stCondLst>
-                                            <p:cond delay="0"/>
-                                          </p:stCondLst>
-                                        </p:cTn>
-                                        <p:tgtEl>
-                                          <p:spTgt spid="4">
-                                            <p:txEl>
-                                              <p:pRg st="1" end="1"/>
-                                            </p:txEl>
-                                          </p:spTgt>
-                                        </p:tgtEl>
-                                        <p:attrNameLst>
-                                          <p:attrName>style.visibility</p:attrName>
-                                        </p:attrNameLst>
-                                      </p:cBhvr>
-                                      <p:to>
-                                        <p:strVal val="visible"/>
-                                      </p:to>
-                                    </p:set>
-                                  </p:childTnLst>
-                                </p:cTn>
-                              </p:par>
-                            </p:childTnLst>
-                          </p:cTn>
-                        </p:par>
-                      </p:childTnLst>
-                    </p:cTn>
-                  </p:par>
-                  <p:par>
-                    <p:cTn id="11" fill="hold">
-                      <p:stCondLst>
-                        <p:cond delay="indefinite"/>
-                      </p:stCondLst>
-                      <p:childTnLst>
-                        <p:par>
-                          <p:cTn id="12" fill="hold">
-                            <p:stCondLst>
-                              <p:cond delay="0"/>
-                            </p:stCondLst>
-                            <p:childTnLst>
-                              <p:par>
-                                <p:cTn id="13" presetID="1" presetClass="entr" presetSubtype="0" fill="hold" nodeType="clickEffect">
-                                  <p:stCondLst>
-                                    <p:cond delay="0"/>
-                                  </p:stCondLst>
-                                  <p:childTnLst>
-                                    <p:set>
-                                      <p:cBhvr>
-                                        <p:cTn id="14" dur="1" fill="hold">
-                                          <p:stCondLst>
-                                            <p:cond delay="0"/>
-                                          </p:stCondLst>
-                                        </p:cTn>
-                                        <p:tgtEl>
-                                          <p:spTgt spid="4">
-                                            <p:txEl>
-                                              <p:pRg st="2" end="2"/>
-                                            </p:txEl>
-                                          </p:spTgt>
-                                        </p:tgtEl>
-                                        <p:attrNameLst>
-                                          <p:attrName>style.visibility</p:attrName>
-                                        </p:attrNameLst>
-                                      </p:cBhvr>
-                                      <p:to>
-                                        <p:strVal val="visible"/>
-                                      </p:to>
-                                    </p:set>
-                                  </p:childTnLst>
-                                </p:cTn>
-                              </p:par>
-                            </p:childTnLst>
-                          </p:cTn>
-                        </p:par>
-                      </p:childTnLst>
-                    </p:cTn>
-                  </p:par>
-                  <p:par>
-                    <p:cTn id="15" fill="hold">
-                      <p:stCondLst>
-                        <p:cond delay="indefinite"/>
-                      </p:stCondLst>
-                      <p:childTnLst>
-                        <p:par>
-                          <p:cTn id="16" fill="hold">
-                            <p:stCondLst>
-                              <p:cond delay="0"/>
-                            </p:stCondLst>
-                            <p:childTnLst>
-                              <p:par>
-                                <p:cTn id="17" presetID="1" presetClass="entr" presetSubtype="0" fill="hold" nodeType="clickEffect">
-                                  <p:stCondLst>
-                                    <p:cond delay="0"/>
-                                  </p:stCondLst>
-                                  <p:childTnLst>
-                                    <p:set>
-                                      <p:cBhvr>
-                                        <p:cTn id="18" dur="1" fill="hold">
-                                          <p:stCondLst>
-                                            <p:cond delay="0"/>
-                                          </p:stCondLst>
-                                        </p:cTn>
-                                        <p:tgtEl>
-                                          <p:spTgt spid="4">
-                                            <p:txEl>
-                                              <p:pRg st="3" end="3"/>
-                                            </p:txEl>
-                                          </p:spTgt>
-                                        </p:tgtEl>
-                                        <p:attrNameLst>
-                                          <p:attrName>style.visibility</p:attrName>
-                                        </p:attrNameLst>
-                                      </p:cBhvr>
-                                      <p:to>
-                                        <p:strVal val="visible"/>
-                                      </p:to>
-                                    </p:set>
-                                  </p:childTnLst>
-                                </p:cTn>
-                              </p:par>
-                            </p:childTnLst>
-                          </p:cTn>
-                        </p:par>
-                      </p:childTnLst>
-                    </p:cTn>
-                  </p:par>
-                  <p:par>
-                    <p:cTn id="19" fill="hold">
-                      <p:stCondLst>
-                        <p:cond delay="indefinite"/>
-                      </p:stCondLst>
-                      <p:childTnLst>
-                        <p:par>
-                          <p:cTn id="20" fill="hold">
-                            <p:stCondLst>
-                              <p:cond delay="0"/>
-                            </p:stCondLst>
-                            <p:childTnLst>
-                              <p:par>
-                                <p:cTn id="21" presetID="1" presetClass="entr" presetSubtype="0" fill="hold" nodeType="clickEffect">
-                                  <p:stCondLst>
-                                    <p:cond delay="0"/>
-                                  </p:stCondLst>
-                                  <p:childTnLst>
-                                    <p:set>
-                                      <p:cBhvr>
-                                        <p:cTn id="22" dur="1" fill="hold">
-                                          <p:stCondLst>
-                                            <p:cond delay="0"/>
-                                          </p:stCondLst>
-                                        </p:cTn>
-                                        <p:tgtEl>
-                                          <p:spTgt spid="4">
-                                            <p:txEl>
-                                              <p:pRg st="4" end="4"/>
-                                            </p:txEl>
-                                          </p:spTgt>
-                                        </p:tgtEl>
-                                        <p:attrNameLst>
-                                          <p:attrName>style.visibility</p:attrName>
-                                        </p:attrNameLst>
-                                      </p:cBhvr>
-                                      <p:to>
-                                        <p:strVal val="visible"/>
-                                      </p:to>
-                                    </p:set>
-                                  </p:childTnLst>
-                                </p:cTn>
-                              </p:par>
-                            </p:childTnLst>
-                          </p:cTn>
-                        </p:par>
-                      </p:childTnLst>
-                    </p:cTn>
-                  </p:par>
-                  <p:par>
-                    <p:cTn id="23" fill="hold">
-                      <p:stCondLst>
-                        <p:cond delay="indefinite"/>
-                      </p:stCondLst>
-                      <p:childTnLst>
-                        <p:par>
-                          <p:cTn id="24" fill="hold">
-                            <p:stCondLst>
-                              <p:cond delay="0"/>
-                            </p:stCondLst>
-                            <p:childTnLst>
-                              <p:par>
-                                <p:cTn id="25" presetID="1" presetClass="entr" presetSubtype="0" fill="hold" nodeType="clickEffect">
-                                  <p:stCondLst>
-                                    <p:cond delay="0"/>
-                                  </p:stCondLst>
-                                  <p:childTnLst>
-                                    <p:set>
-                                      <p:cBhvr>
-                                        <p:cTn id="26" dur="1" fill="hold">
-                                          <p:stCondLst>
-                                            <p:cond delay="0"/>
-                                          </p:stCondLst>
-                                        </p:cTn>
-                                        <p:tgtEl>
-                                          <p:spTgt spid="4">
-                                            <p:txEl>
-                                              <p:pRg st="5" end="5"/>
-                                            </p:txEl>
-                                          </p:spTgt>
-                                        </p:tgtEl>
-                                        <p:attrNameLst>
-                                          <p:attrName>style.visibility</p:attrName>
-                                        </p:attrNameLst>
-                                      </p:cBhvr>
-                                      <p:to>
-                                        <p:strVal val="visible"/>
-                                      </p:to>
-                                    </p:set>
-                                  </p:childTnLst>
-                                </p:cTn>
-                              </p:par>
-                            </p:childTnLst>
-                          </p:cTn>
-                        </p:par>
-                      </p:childTnLst>
-                    </p:cTn>
-                  </p:par>
-                  <p:par>
-                    <p:cTn id="27" fill="hold">
-                      <p:stCondLst>
-                        <p:cond delay="indefinite"/>
-                      </p:stCondLst>
-                      <p:childTnLst>
-                        <p:par>
-                          <p:cTn id="28" fill="hold">
-                            <p:stCondLst>
-                              <p:cond delay="0"/>
-                            </p:stCondLst>
-                            <p:childTnLst>
-                              <p:par>
-                                <p:cTn id="29" presetID="1" presetClass="entr" presetSubtype="0" fill="hold" nodeType="clickEffect">
-                                  <p:stCondLst>
-                                    <p:cond delay="0"/>
-                                  </p:stCondLst>
-                                  <p:childTnLst>
-                                    <p:set>
-                                      <p:cBhvr>
-                                        <p:cTn id="30" dur="1" fill="hold">
-                                          <p:stCondLst>
-                                            <p:cond delay="0"/>
-                                          </p:stCondLst>
-                                        </p:cTn>
-                                        <p:tgtEl>
-                                          <p:spTgt spid="4">
-                                            <p:txEl>
-                                              <p:pRg st="6" end="6"/>
-                                            </p:txEl>
-                                          </p:spTgt>
-                                        </p:tgtEl>
-                                        <p:attrNameLst>
-                                          <p:attrName>style.visibility</p:attrName>
-                                        </p:attrNameLst>
-                                      </p:cBhvr>
-                                      <p:to>
-                                        <p:strVal val="visible"/>
-                                      </p:to>
-                                    </p:set>
-                                  </p:childTnLst>
-                                </p:cTn>
-                              </p:par>
-                            </p:childTnLst>
-                          </p:cTn>
-                        </p:par>
-                      </p:childTnLst>
-                    </p:cTn>
-                  </p:par>
-                  <p:par>
-                    <p:cTn id="31" fill="hold">
-                      <p:stCondLst>
-                        <p:cond delay="indefinite"/>
-                      </p:stCondLst>
-                      <p:childTnLst>
-                        <p:par>
-                          <p:cTn id="32" fill="hold">
-                            <p:stCondLst>
-                              <p:cond delay="0"/>
-                            </p:stCondLst>
-                            <p:childTnLst>
-                              <p:par>
-                                <p:cTn id="33" presetID="1" presetClass="entr" presetSubtype="0" fill="hold" nodeType="clickEffect">
-                                  <p:stCondLst>
-                                    <p:cond delay="0"/>
-                                  </p:stCondLst>
-                                  <p:childTnLst>
-                                    <p:set>
-                                      <p:cBhvr>
-                                        <p:cTn id="34" dur="1" fill="hold">
-                                          <p:stCondLst>
-                                            <p:cond delay="0"/>
-                                          </p:stCondLst>
-                                        </p:cTn>
-                                        <p:tgtEl>
-                                          <p:spTgt spid="4">
-                                            <p:txEl>
-                                              <p:pRg st="7" end="7"/>
-                                            </p:txEl>
-                                          </p:spTgt>
-                                        </p:tgtEl>
-                                        <p:attrNameLst>
-                                          <p:attrName>style.visibility</p:attrName>
-                                        </p:attrNameLst>
-                                      </p:cBhvr>
-                                      <p:to>
-                                        <p:strVal val="visible"/>
-                                      </p:to>
-                                    </p:set>
-                                  </p:childTnLst>
-                                </p:cTn>
-                              </p:par>
-                            </p:childTnLst>
-                          </p:cTn>
-                        </p:par>
-                      </p:childTnLst>
-                    </p:cTn>
-                  </p:par>
-                </p:childTnLst>
-              </p:cTn>
-              <p:prevCondLst>
-                <p:cond evt="onPrev" delay="0">
-                  <p:tgtEl>
-                    <p:sldTgt/>
-                  </p:tgtEl>
-                </p:cond>
-              </p:prevCondLst>
-              <p:nextCondLst>
-                <p:cond evt="onNext" delay="0">
-                  <p:tgtEl>
-                    <p:sldTgt/>
-                  </p:tgtEl>
-                </p:cond>
-              </p:nextCondLst>
-            </p:seq>
-          </p:childTnLst>
-        </p:cTn>
+        <p:cTn id="1" dur="indefinite" restart="never" nodeType="tmRoot"/>
       </p:par>
     </p:tnLst>
   </p:timing>
 </p:sld>
 </file>
 
-<file path=ppt/slides/slide15.xml><?xml version="1.0" encoding="utf-8"?>
+<file path=ppt/slides/slide18.xml><?xml version="1.0" encoding="utf-8"?>
 <p:sld xmlns:a="http://schemas.openxmlformats.org/drawingml/2006/main" xmlns:r="http://schemas.openxmlformats.org/officeDocument/2006/relationships" xmlns:p="http://schemas.openxmlformats.org/presentationml/2006/main">
   <p:cSld>
     <p:spTree>
@@ -23371,7 +25030,7 @@
 </p:sld>
 </file>
 
-<file path=ppt/slides/slide16.xml><?xml version="1.0" encoding="utf-8"?>
+<file path=ppt/slides/slide19.xml><?xml version="1.0" encoding="utf-8"?>
 <p:sld xmlns:a="http://schemas.openxmlformats.org/drawingml/2006/main" xmlns:r="http://schemas.openxmlformats.org/officeDocument/2006/relationships" xmlns:p="http://schemas.openxmlformats.org/presentationml/2006/main">
   <p:cSld>
     <p:spTree>
@@ -24966,7 +26625,171 @@
 </p:sld>
 </file>
 
-<file path=ppt/slides/slide17.xml><?xml version="1.0" encoding="utf-8"?>
+<file path=ppt/slides/slide2.xml><?xml version="1.0" encoding="utf-8"?>
+<p:sld xmlns:a="http://schemas.openxmlformats.org/drawingml/2006/main" xmlns:r="http://schemas.openxmlformats.org/officeDocument/2006/relationships" xmlns:p="http://schemas.openxmlformats.org/presentationml/2006/main">
+  <p:cSld>
+    <p:spTree>
+      <p:nvGrpSpPr>
+        <p:cNvPr id="1" name=""/>
+        <p:cNvGrpSpPr/>
+        <p:nvPr/>
+      </p:nvGrpSpPr>
+      <p:grpSpPr>
+        <a:xfrm>
+          <a:off x="0" y="0"/>
+          <a:ext cx="0" cy="0"/>
+          <a:chOff x="0" y="0"/>
+          <a:chExt cx="0" cy="0"/>
+        </a:xfrm>
+      </p:grpSpPr>
+      <p:sp>
+        <p:nvSpPr>
+          <p:cNvPr id="2" name="Title 1"/>
+          <p:cNvSpPr>
+            <a:spLocks noGrp="1"/>
+          </p:cNvSpPr>
+          <p:nvPr>
+            <p:ph type="ctrTitle"/>
+          </p:nvPr>
+        </p:nvSpPr>
+        <p:spPr/>
+        <p:txBody>
+          <a:bodyPr/>
+          <a:lstStyle/>
+          <a:p>
+            <a:r>
+              <a:rPr lang="en-US" sz="3600" dirty="0"/>
+              <a:t>Using Windows Runtime and SDK to build Metro style </a:t>
+            </a:r>
+            <a:r>
+              <a:rPr lang="en-US" sz="3600" dirty="0" smtClean="0"/>
+              <a:t>apps</a:t>
+            </a:r>
+            <a:endParaRPr lang="en-US" sz="3600" dirty="0"/>
+          </a:p>
+        </p:txBody>
+      </p:sp>
+      <p:sp>
+        <p:nvSpPr>
+          <p:cNvPr id="3" name="Subtitle 2"/>
+          <p:cNvSpPr>
+            <a:spLocks noGrp="1"/>
+          </p:cNvSpPr>
+          <p:nvPr>
+            <p:ph type="subTitle" idx="1"/>
+          </p:nvPr>
+        </p:nvSpPr>
+        <p:spPr/>
+        <p:txBody>
+          <a:bodyPr/>
+          <a:lstStyle/>
+          <a:p>
+            <a:r>
+              <a:rPr lang="en-US" dirty="0" smtClean="0"/>
+              <a:t>John Lam</a:t>
+            </a:r>
+          </a:p>
+          <a:p>
+            <a:r>
+              <a:rPr lang="en-US" dirty="0" smtClean="0"/>
+              <a:t>Principal Program Manager Lead</a:t>
+            </a:r>
+          </a:p>
+          <a:p>
+            <a:r>
+              <a:rPr lang="en-US" dirty="0" smtClean="0"/>
+              <a:t>Microsoft Corporation</a:t>
+            </a:r>
+            <a:endParaRPr lang="en-US" dirty="0"/>
+          </a:p>
+        </p:txBody>
+      </p:sp>
+      <p:sp useBgFill="1">
+        <p:nvSpPr>
+          <p:cNvPr id="4" name="MASK bottom"/>
+          <p:cNvSpPr/>
+          <p:nvPr/>
+        </p:nvSpPr>
+        <p:spPr bwMode="auto">
+          <a:xfrm>
+            <a:off x="3884612" y="6019800"/>
+            <a:ext cx="8304213" cy="838200"/>
+          </a:xfrm>
+          <a:prstGeom prst="rect">
+            <a:avLst/>
+          </a:prstGeom>
+          <a:ln>
+            <a:noFill/>
+            <a:headEnd type="none" w="med" len="med"/>
+            <a:tailEnd type="none" w="med" len="med"/>
+          </a:ln>
+          <a:effectLst/>
+        </p:spPr>
+        <p:style>
+          <a:lnRef idx="1">
+            <a:schemeClr val="accent2"/>
+          </a:lnRef>
+          <a:fillRef idx="3">
+            <a:schemeClr val="accent2"/>
+          </a:fillRef>
+          <a:effectRef idx="2">
+            <a:schemeClr val="accent2"/>
+          </a:effectRef>
+          <a:fontRef idx="minor">
+            <a:schemeClr val="lt1"/>
+          </a:fontRef>
+        </p:style>
+        <p:txBody>
+          <a:bodyPr vert="horz" wrap="square" lIns="91436" tIns="45718" rIns="91436" bIns="45718" numCol="1" rtlCol="0" anchor="ctr" anchorCtr="0" compatLnSpc="1">
+            <a:prstTxWarp prst="textNoShape">
+              <a:avLst/>
+            </a:prstTxWarp>
+          </a:bodyPr>
+          <a:lstStyle/>
+          <a:p>
+            <a:pPr algn="ctr" defTabSz="914099" fontAlgn="base">
+              <a:spcBef>
+                <a:spcPct val="0"/>
+              </a:spcBef>
+              <a:spcAft>
+                <a:spcPct val="0"/>
+              </a:spcAft>
+            </a:pPr>
+            <a:endParaRPr lang="en-US" sz="2200" dirty="0" smtClean="0">
+              <a:gradFill>
+                <a:gsLst>
+                  <a:gs pos="0">
+                    <a:srgbClr val="FFFFFF"/>
+                  </a:gs>
+                  <a:gs pos="100000">
+                    <a:srgbClr val="FFFFFF"/>
+                  </a:gs>
+                </a:gsLst>
+                <a:lin ang="5400000" scaled="0"/>
+              </a:gradFill>
+            </a:endParaRPr>
+          </a:p>
+        </p:txBody>
+      </p:sp>
+    </p:spTree>
+  </p:cSld>
+  <p:clrMapOvr>
+    <a:masterClrMapping/>
+  </p:clrMapOvr>
+  <p:transition spd="slow">
+    <p:fade/>
+  </p:transition>
+  <p:timing>
+    <p:tnLst>
+      <p:par>
+        <p:cTn id="1" dur="indefinite" restart="never" nodeType="tmRoot"/>
+      </p:par>
+    </p:tnLst>
+  </p:timing>
+</p:sld>
+</file>
+
+<file path=ppt/slides/slide20.xml><?xml version="1.0" encoding="utf-8"?>
 <p:sld xmlns:a="http://schemas.openxmlformats.org/drawingml/2006/main" xmlns:r="http://schemas.openxmlformats.org/officeDocument/2006/relationships" xmlns:p="http://schemas.openxmlformats.org/presentationml/2006/main">
   <p:cSld>
     <p:spTree>
@@ -27151,7 +28974,7 @@
 </p:sld>
 </file>
 
-<file path=ppt/slides/slide18.xml><?xml version="1.0" encoding="utf-8"?>
+<file path=ppt/slides/slide21.xml><?xml version="1.0" encoding="utf-8"?>
 <p:sld xmlns:a="http://schemas.openxmlformats.org/drawingml/2006/main" xmlns:r="http://schemas.openxmlformats.org/officeDocument/2006/relationships" xmlns:p="http://schemas.openxmlformats.org/presentationml/2006/main" showMasterSp="0">
   <p:cSld>
     <p:spTree>
@@ -29070,7 +30893,7 @@
 </p:sld>
 </file>
 
-<file path=ppt/slides/slide19.xml><?xml version="1.0" encoding="utf-8"?>
+<file path=ppt/slides/slide22.xml><?xml version="1.0" encoding="utf-8"?>
 <p:sld xmlns:a="http://schemas.openxmlformats.org/drawingml/2006/main" xmlns:r="http://schemas.openxmlformats.org/officeDocument/2006/relationships" xmlns:p="http://schemas.openxmlformats.org/presentationml/2006/main">
   <p:cSld>
     <p:spTree>
@@ -29629,171 +31452,7 @@
 </p:sld>
 </file>
 
-<file path=ppt/slides/slide2.xml><?xml version="1.0" encoding="utf-8"?>
-<p:sld xmlns:a="http://schemas.openxmlformats.org/drawingml/2006/main" xmlns:r="http://schemas.openxmlformats.org/officeDocument/2006/relationships" xmlns:p="http://schemas.openxmlformats.org/presentationml/2006/main">
-  <p:cSld>
-    <p:spTree>
-      <p:nvGrpSpPr>
-        <p:cNvPr id="1" name=""/>
-        <p:cNvGrpSpPr/>
-        <p:nvPr/>
-      </p:nvGrpSpPr>
-      <p:grpSpPr>
-        <a:xfrm>
-          <a:off x="0" y="0"/>
-          <a:ext cx="0" cy="0"/>
-          <a:chOff x="0" y="0"/>
-          <a:chExt cx="0" cy="0"/>
-        </a:xfrm>
-      </p:grpSpPr>
-      <p:sp>
-        <p:nvSpPr>
-          <p:cNvPr id="2" name="Title 1"/>
-          <p:cNvSpPr>
-            <a:spLocks noGrp="1"/>
-          </p:cNvSpPr>
-          <p:nvPr>
-            <p:ph type="ctrTitle"/>
-          </p:nvPr>
-        </p:nvSpPr>
-        <p:spPr/>
-        <p:txBody>
-          <a:bodyPr/>
-          <a:lstStyle/>
-          <a:p>
-            <a:r>
-              <a:rPr lang="en-US" sz="3600" dirty="0"/>
-              <a:t>Using Windows Runtime and SDK to build Metro style </a:t>
-            </a:r>
-            <a:r>
-              <a:rPr lang="en-US" sz="3600" dirty="0" smtClean="0"/>
-              <a:t>apps</a:t>
-            </a:r>
-            <a:endParaRPr lang="en-US" sz="3600" dirty="0"/>
-          </a:p>
-        </p:txBody>
-      </p:sp>
-      <p:sp>
-        <p:nvSpPr>
-          <p:cNvPr id="3" name="Subtitle 2"/>
-          <p:cNvSpPr>
-            <a:spLocks noGrp="1"/>
-          </p:cNvSpPr>
-          <p:nvPr>
-            <p:ph type="subTitle" idx="1"/>
-          </p:nvPr>
-        </p:nvSpPr>
-        <p:spPr/>
-        <p:txBody>
-          <a:bodyPr/>
-          <a:lstStyle/>
-          <a:p>
-            <a:r>
-              <a:rPr lang="en-US" dirty="0" smtClean="0"/>
-              <a:t>John Lam</a:t>
-            </a:r>
-          </a:p>
-          <a:p>
-            <a:r>
-              <a:rPr lang="en-US" dirty="0" smtClean="0"/>
-              <a:t>Principal Program Manager Lead</a:t>
-            </a:r>
-          </a:p>
-          <a:p>
-            <a:r>
-              <a:rPr lang="en-US" dirty="0" smtClean="0"/>
-              <a:t>Microsoft Corporation</a:t>
-            </a:r>
-            <a:endParaRPr lang="en-US" dirty="0"/>
-          </a:p>
-        </p:txBody>
-      </p:sp>
-      <p:sp useBgFill="1">
-        <p:nvSpPr>
-          <p:cNvPr id="4" name="MASK bottom"/>
-          <p:cNvSpPr/>
-          <p:nvPr/>
-        </p:nvSpPr>
-        <p:spPr bwMode="auto">
-          <a:xfrm>
-            <a:off x="3884612" y="6019800"/>
-            <a:ext cx="8304213" cy="838200"/>
-          </a:xfrm>
-          <a:prstGeom prst="rect">
-            <a:avLst/>
-          </a:prstGeom>
-          <a:ln>
-            <a:noFill/>
-            <a:headEnd type="none" w="med" len="med"/>
-            <a:tailEnd type="none" w="med" len="med"/>
-          </a:ln>
-          <a:effectLst/>
-        </p:spPr>
-        <p:style>
-          <a:lnRef idx="1">
-            <a:schemeClr val="accent2"/>
-          </a:lnRef>
-          <a:fillRef idx="3">
-            <a:schemeClr val="accent2"/>
-          </a:fillRef>
-          <a:effectRef idx="2">
-            <a:schemeClr val="accent2"/>
-          </a:effectRef>
-          <a:fontRef idx="minor">
-            <a:schemeClr val="lt1"/>
-          </a:fontRef>
-        </p:style>
-        <p:txBody>
-          <a:bodyPr vert="horz" wrap="square" lIns="91436" tIns="45718" rIns="91436" bIns="45718" numCol="1" rtlCol="0" anchor="ctr" anchorCtr="0" compatLnSpc="1">
-            <a:prstTxWarp prst="textNoShape">
-              <a:avLst/>
-            </a:prstTxWarp>
-          </a:bodyPr>
-          <a:lstStyle/>
-          <a:p>
-            <a:pPr algn="ctr" defTabSz="914099" fontAlgn="base">
-              <a:spcBef>
-                <a:spcPct val="0"/>
-              </a:spcBef>
-              <a:spcAft>
-                <a:spcPct val="0"/>
-              </a:spcAft>
-            </a:pPr>
-            <a:endParaRPr lang="en-US" sz="2200" dirty="0" smtClean="0">
-              <a:gradFill>
-                <a:gsLst>
-                  <a:gs pos="0">
-                    <a:srgbClr val="FFFFFF"/>
-                  </a:gs>
-                  <a:gs pos="100000">
-                    <a:srgbClr val="FFFFFF"/>
-                  </a:gs>
-                </a:gsLst>
-                <a:lin ang="5400000" scaled="0"/>
-              </a:gradFill>
-            </a:endParaRPr>
-          </a:p>
-        </p:txBody>
-      </p:sp>
-    </p:spTree>
-  </p:cSld>
-  <p:clrMapOvr>
-    <a:masterClrMapping/>
-  </p:clrMapOvr>
-  <p:transition spd="slow">
-    <p:fade/>
-  </p:transition>
-  <p:timing>
-    <p:tnLst>
-      <p:par>
-        <p:cTn id="1" dur="indefinite" restart="never" nodeType="tmRoot"/>
-      </p:par>
-    </p:tnLst>
-  </p:timing>
-</p:sld>
-</file>
-
-<file path=ppt/slides/slide20.xml><?xml version="1.0" encoding="utf-8"?>
+<file path=ppt/slides/slide23.xml><?xml version="1.0" encoding="utf-8"?>
 <p:sld xmlns:a="http://schemas.openxmlformats.org/drawingml/2006/main" xmlns:r="http://schemas.openxmlformats.org/officeDocument/2006/relationships" xmlns:p="http://schemas.openxmlformats.org/presentationml/2006/main" showMasterSp="0">
   <p:cSld>
     <p:spTree>
@@ -32467,12 +34126,70 @@
 </file>
 
 <file path=customXml/item1.xml><?xml version="1.0" encoding="utf-8"?>
-<?mso-contentType ?>
-<FormTemplates xmlns="http://schemas.microsoft.com/sharepoint/v3/contenttype/forms">
-  <Display>DocumentLibraryForm</Display>
-  <Edit>DocumentLibraryForm</Edit>
-  <New>DocumentLibraryForm</New>
-</FormTemplates>
+<p:properties xmlns:p="http://schemas.microsoft.com/office/2006/metadata/properties" xmlns:xsi="http://www.w3.org/2001/XMLSchema-instance" xmlns:pc="http://schemas.microsoft.com/office/infopath/2007/PartnerControls">
+  <documentManagement>
+    <TrackTaxHTField0 xmlns="2295e2e7-0eeb-498e-8716-217bb2ee6ee3">
+      <Terms xmlns="http://schemas.microsoft.com/office/infopath/2007/PartnerControls"/>
+    </TrackTaxHTField0>
+    <CampaignTaxHTField0 xmlns="2295e2e7-0eeb-498e-8716-217bb2ee6ee3">
+      <Terms xmlns="http://schemas.microsoft.com/office/infopath/2007/PartnerControls"/>
+    </CampaignTaxHTField0>
+    <Event_x0020_End_x0020_Date xmlns="2295e2e7-0eeb-498e-8716-217bb2ee6ee3">2012-06-29T17:00:00+10:00</Event_x0020_End_x0020_Date>
+    <Event_x0020_Start_x0020_Date xmlns="2295e2e7-0eeb-498e-8716-217bb2ee6ee3">2012-06-26T17:00:00+10:00</Event_x0020_Start_x0020_Date>
+    <MS_x0020_Speaker xmlns="2295e2e7-0eeb-498e-8716-217bb2ee6ee3">
+      <UserInfo>
+        <DisplayName/>
+        <AccountId xsi:nil="true"/>
+        <AccountType/>
+      </UserInfo>
+    </MS_x0020_Speaker>
+    <External_x0020_Speaker xmlns="2295e2e7-0eeb-498e-8716-217bb2ee6ee3" xsi:nil="true"/>
+    <Session_x0020_Code xmlns="2295e2e7-0eeb-498e-8716-217bb2ee6ee3" xsi:nil="true"/>
+    <ProductTaxHTField0 xmlns="2295e2e7-0eeb-498e-8716-217bb2ee6ee3">
+      <Terms xmlns="http://schemas.microsoft.com/office/infopath/2007/PartnerControls"/>
+    </ProductTaxHTField0>
+    <Presentation_x0020_Date xmlns="2295e2e7-0eeb-498e-8716-217bb2ee6ee3" xsi:nil="true"/>
+    <Event_x0020_LocationTaxHTField0 xmlns="2295e2e7-0eeb-498e-8716-217bb2ee6ee3">
+      <Terms xmlns="http://schemas.microsoft.com/office/infopath/2007/PartnerControls">
+        <TermInfo xmlns="http://schemas.microsoft.com/office/infopath/2007/PartnerControls">
+          <TermName xmlns="http://schemas.microsoft.com/office/infopath/2007/PartnerControls">Orlando</TermName>
+          <TermId xmlns="http://schemas.microsoft.com/office/infopath/2007/PartnerControls">99ded043-d247-43a1-9b7a-028ecd66d1eb</TermId>
+        </TermInfo>
+      </Terms>
+    </Event_x0020_LocationTaxHTField0>
+    <Event1TaxHTField0 xmlns="2295e2e7-0eeb-498e-8716-217bb2ee6ee3">
+      <Terms xmlns="http://schemas.microsoft.com/office/infopath/2007/PartnerControls">
+        <TermInfo xmlns="http://schemas.microsoft.com/office/infopath/2007/PartnerControls">
+          <TermName xmlns="http://schemas.microsoft.com/office/infopath/2007/PartnerControls">TechEd</TermName>
+          <TermId xmlns="http://schemas.microsoft.com/office/infopath/2007/PartnerControls">ac8fad57-eb30-43a8-b5bd-05dcf2cf2246</TermId>
+        </TermInfo>
+      </Terms>
+    </Event1TaxHTField0>
+    <AudienceTaxHTField0 xmlns="8b529f77-48ab-4581-b468-93f09345b8aa">
+      <Terms xmlns="http://schemas.microsoft.com/office/infopath/2007/PartnerControls"/>
+    </AudienceTaxHTField0>
+    <MS_x0020_Content_x0020_Owner xmlns="2295e2e7-0eeb-498e-8716-217bb2ee6ee3">
+      <UserInfo>
+        <DisplayName/>
+        <AccountId xsi:nil="true"/>
+        <AccountType/>
+      </UserInfo>
+    </MS_x0020_Content_x0020_Owner>
+    <TaxCatchAll xmlns="2295e2e7-0eeb-498e-8716-217bb2ee6ee3">
+      <Value>126</Value>
+      <Value>232</Value>
+      <Value>231</Value>
+    </TaxCatchAll>
+    <Event_x0020_VenueTaxHTField0 xmlns="2295e2e7-0eeb-498e-8716-217bb2ee6ee3">
+      <Terms xmlns="http://schemas.microsoft.com/office/infopath/2007/PartnerControls">
+        <TermInfo xmlns="http://schemas.microsoft.com/office/infopath/2007/PartnerControls">
+          <TermName xmlns="http://schemas.microsoft.com/office/infopath/2007/PartnerControls">Orange County Convention Center Orlando, FL</TermName>
+          <TermId xmlns="http://schemas.microsoft.com/office/infopath/2007/PartnerControls">bd993e89-aa48-4695-84e0-3b53e88b1a79</TermId>
+        </TermInfo>
+      </Terms>
+    </Event_x0020_VenueTaxHTField0>
+  </documentManagement>
+</p:properties>
 </file>
 
 <file path=customXml/item2.xml><?xml version="1.0" encoding="utf-8"?>
@@ -32755,76 +34472,27 @@
 </file>
 
 <file path=customXml/item3.xml><?xml version="1.0" encoding="utf-8"?>
-<p:properties xmlns:p="http://schemas.microsoft.com/office/2006/metadata/properties" xmlns:xsi="http://www.w3.org/2001/XMLSchema-instance" xmlns:pc="http://schemas.microsoft.com/office/infopath/2007/PartnerControls">
-  <documentManagement>
-    <TrackTaxHTField0 xmlns="2295e2e7-0eeb-498e-8716-217bb2ee6ee3">
-      <Terms xmlns="http://schemas.microsoft.com/office/infopath/2007/PartnerControls"/>
-    </TrackTaxHTField0>
-    <CampaignTaxHTField0 xmlns="2295e2e7-0eeb-498e-8716-217bb2ee6ee3">
-      <Terms xmlns="http://schemas.microsoft.com/office/infopath/2007/PartnerControls"/>
-    </CampaignTaxHTField0>
-    <Event_x0020_End_x0020_Date xmlns="2295e2e7-0eeb-498e-8716-217bb2ee6ee3">2012-06-29T17:00:00+10:00</Event_x0020_End_x0020_Date>
-    <Event_x0020_Start_x0020_Date xmlns="2295e2e7-0eeb-498e-8716-217bb2ee6ee3">2012-06-26T17:00:00+10:00</Event_x0020_Start_x0020_Date>
-    <MS_x0020_Speaker xmlns="2295e2e7-0eeb-498e-8716-217bb2ee6ee3">
-      <UserInfo>
-        <DisplayName/>
-        <AccountId xsi:nil="true"/>
-        <AccountType/>
-      </UserInfo>
-    </MS_x0020_Speaker>
-    <External_x0020_Speaker xmlns="2295e2e7-0eeb-498e-8716-217bb2ee6ee3" xsi:nil="true"/>
-    <Session_x0020_Code xmlns="2295e2e7-0eeb-498e-8716-217bb2ee6ee3" xsi:nil="true"/>
-    <ProductTaxHTField0 xmlns="2295e2e7-0eeb-498e-8716-217bb2ee6ee3">
-      <Terms xmlns="http://schemas.microsoft.com/office/infopath/2007/PartnerControls"/>
-    </ProductTaxHTField0>
-    <Presentation_x0020_Date xmlns="2295e2e7-0eeb-498e-8716-217bb2ee6ee3" xsi:nil="true"/>
-    <Event_x0020_LocationTaxHTField0 xmlns="2295e2e7-0eeb-498e-8716-217bb2ee6ee3">
-      <Terms xmlns="http://schemas.microsoft.com/office/infopath/2007/PartnerControls">
-        <TermInfo xmlns="http://schemas.microsoft.com/office/infopath/2007/PartnerControls">
-          <TermName xmlns="http://schemas.microsoft.com/office/infopath/2007/PartnerControls">Orlando</TermName>
-          <TermId xmlns="http://schemas.microsoft.com/office/infopath/2007/PartnerControls">99ded043-d247-43a1-9b7a-028ecd66d1eb</TermId>
-        </TermInfo>
-      </Terms>
-    </Event_x0020_LocationTaxHTField0>
-    <Event1TaxHTField0 xmlns="2295e2e7-0eeb-498e-8716-217bb2ee6ee3">
-      <Terms xmlns="http://schemas.microsoft.com/office/infopath/2007/PartnerControls">
-        <TermInfo xmlns="http://schemas.microsoft.com/office/infopath/2007/PartnerControls">
-          <TermName xmlns="http://schemas.microsoft.com/office/infopath/2007/PartnerControls">TechEd</TermName>
-          <TermId xmlns="http://schemas.microsoft.com/office/infopath/2007/PartnerControls">ac8fad57-eb30-43a8-b5bd-05dcf2cf2246</TermId>
-        </TermInfo>
-      </Terms>
-    </Event1TaxHTField0>
-    <AudienceTaxHTField0 xmlns="8b529f77-48ab-4581-b468-93f09345b8aa">
-      <Terms xmlns="http://schemas.microsoft.com/office/infopath/2007/PartnerControls"/>
-    </AudienceTaxHTField0>
-    <MS_x0020_Content_x0020_Owner xmlns="2295e2e7-0eeb-498e-8716-217bb2ee6ee3">
-      <UserInfo>
-        <DisplayName/>
-        <AccountId xsi:nil="true"/>
-        <AccountType/>
-      </UserInfo>
-    </MS_x0020_Content_x0020_Owner>
-    <TaxCatchAll xmlns="2295e2e7-0eeb-498e-8716-217bb2ee6ee3">
-      <Value>126</Value>
-      <Value>232</Value>
-      <Value>231</Value>
-    </TaxCatchAll>
-    <Event_x0020_VenueTaxHTField0 xmlns="2295e2e7-0eeb-498e-8716-217bb2ee6ee3">
-      <Terms xmlns="http://schemas.microsoft.com/office/infopath/2007/PartnerControls">
-        <TermInfo xmlns="http://schemas.microsoft.com/office/infopath/2007/PartnerControls">
-          <TermName xmlns="http://schemas.microsoft.com/office/infopath/2007/PartnerControls">Orange County Convention Center Orlando, FL</TermName>
-          <TermId xmlns="http://schemas.microsoft.com/office/infopath/2007/PartnerControls">bd993e89-aa48-4695-84e0-3b53e88b1a79</TermId>
-        </TermInfo>
-      </Terms>
-    </Event_x0020_VenueTaxHTField0>
-  </documentManagement>
-</p:properties>
+<?mso-contentType ?>
+<FormTemplates xmlns="http://schemas.microsoft.com/sharepoint/v3/contenttype/forms">
+  <Display>DocumentLibraryForm</Display>
+  <Edit>DocumentLibraryForm</Edit>
+  <New>DocumentLibraryForm</New>
+</FormTemplates>
 </file>
 
 <file path=customXml/itemProps1.xml><?xml version="1.0" encoding="utf-8"?>
-<ds:datastoreItem xmlns:ds="http://schemas.openxmlformats.org/officeDocument/2006/customXml" ds:itemID="{EF1FE425-EA36-4D8C-A967-84CE3BED24D2}">
+<ds:datastoreItem xmlns:ds="http://schemas.openxmlformats.org/officeDocument/2006/customXml" ds:itemID="{76D92E10-3D8B-4831-9584-7BC82972C8E2}">
   <ds:schemaRefs>
-    <ds:schemaRef ds:uri="http://schemas.microsoft.com/sharepoint/v3/contenttype/forms"/>
+    <ds:schemaRef ds:uri="http://schemas.microsoft.com/office/2006/documentManagement/types"/>
+    <ds:schemaRef ds:uri="http://purl.org/dc/terms/"/>
+    <ds:schemaRef ds:uri="http://schemas.microsoft.com/office/2006/metadata/properties"/>
+    <ds:schemaRef ds:uri="http://schemas.openxmlformats.org/package/2006/metadata/core-properties"/>
+    <ds:schemaRef ds:uri="http://www.w3.org/XML/1998/namespace"/>
+    <ds:schemaRef ds:uri="http://schemas.microsoft.com/office/infopath/2007/PartnerControls"/>
+    <ds:schemaRef ds:uri="http://purl.org/dc/elements/1.1/"/>
+    <ds:schemaRef ds:uri="8b529f77-48ab-4581-b468-93f09345b8aa"/>
+    <ds:schemaRef ds:uri="2295e2e7-0eeb-498e-8716-217bb2ee6ee3"/>
+    <ds:schemaRef ds:uri="http://purl.org/dc/dcmitype/"/>
   </ds:schemaRefs>
 </ds:datastoreItem>
 </file>
@@ -32849,18 +34517,9 @@
 </file>
 
 <file path=customXml/itemProps3.xml><?xml version="1.0" encoding="utf-8"?>
-<ds:datastoreItem xmlns:ds="http://schemas.openxmlformats.org/officeDocument/2006/customXml" ds:itemID="{76D92E10-3D8B-4831-9584-7BC82972C8E2}">
+<ds:datastoreItem xmlns:ds="http://schemas.openxmlformats.org/officeDocument/2006/customXml" ds:itemID="{EF1FE425-EA36-4D8C-A967-84CE3BED24D2}">
   <ds:schemaRefs>
-    <ds:schemaRef ds:uri="http://schemas.microsoft.com/office/2006/documentManagement/types"/>
-    <ds:schemaRef ds:uri="http://purl.org/dc/terms/"/>
-    <ds:schemaRef ds:uri="http://schemas.microsoft.com/office/2006/metadata/properties"/>
-    <ds:schemaRef ds:uri="http://schemas.openxmlformats.org/package/2006/metadata/core-properties"/>
-    <ds:schemaRef ds:uri="http://www.w3.org/XML/1998/namespace"/>
-    <ds:schemaRef ds:uri="http://schemas.microsoft.com/office/infopath/2007/PartnerControls"/>
-    <ds:schemaRef ds:uri="http://purl.org/dc/elements/1.1/"/>
-    <ds:schemaRef ds:uri="8b529f77-48ab-4581-b468-93f09345b8aa"/>
-    <ds:schemaRef ds:uri="2295e2e7-0eeb-498e-8716-217bb2ee6ee3"/>
-    <ds:schemaRef ds:uri="http://purl.org/dc/dcmitype/"/>
+    <ds:schemaRef ds:uri="http://schemas.microsoft.com/sharepoint/v3/contenttype/forms"/>
   </ds:schemaRefs>
 </ds:datastoreItem>
 </file>
</xml_diff>

<commit_message>
Tweaked final slide deck
</commit_message>
<xml_diff>
--- a/slides/DEV350 Using Windows Runtime and SDK to build Metro style Apps.pptx
+++ b/slides/DEV350 Using Windows Runtime and SDK to build Metro style Apps.pptx
@@ -28,7 +28,7 @@
     <p:sldId id="341" r:id="rId19"/>
     <p:sldId id="342" r:id="rId20"/>
     <p:sldId id="266" r:id="rId21"/>
-    <p:sldId id="335" r:id="rId22"/>
+    <p:sldId id="343" r:id="rId22"/>
     <p:sldId id="311" r:id="rId23"/>
     <p:sldId id="312" r:id="rId24"/>
     <p:sldId id="313" r:id="rId25"/>
@@ -3924,7 +3924,7 @@
             <a:fld id="{81331B57-0BE5-4F82-AA58-76F53EFF3ADA}" type="datetime8">
               <a:rPr lang="en-US" smtClean="0"/>
               <a:pPr/>
-              <a:t>6/7/2012 10:48 AM</a:t>
+              <a:t>6/7/2012 11:56 AM</a:t>
             </a:fld>
             <a:endParaRPr lang="en-US" dirty="0"/>
           </a:p>
@@ -4124,7 +4124,7 @@
             <a:fld id="{81331B57-0BE5-4F82-AA58-76F53EFF3ADA}" type="datetime8">
               <a:rPr lang="en-US" smtClean="0"/>
               <a:pPr/>
-              <a:t>6/7/2012 10:48 AM</a:t>
+              <a:t>6/7/2012 11:56 AM</a:t>
             </a:fld>
             <a:endParaRPr lang="en-US" dirty="0"/>
           </a:p>
@@ -4324,7 +4324,7 @@
             <a:fld id="{81331B57-0BE5-4F82-AA58-76F53EFF3ADA}" type="datetime8">
               <a:rPr lang="en-US" smtClean="0"/>
               <a:pPr/>
-              <a:t>6/7/2012 10:48 AM</a:t>
+              <a:t>6/7/2012 11:56 AM</a:t>
             </a:fld>
             <a:endParaRPr lang="en-US"/>
           </a:p>
@@ -4996,7 +4996,7 @@
             <a:fld id="{81331B57-0BE5-4F82-AA58-76F53EFF3ADA}" type="datetime8">
               <a:rPr lang="en-US" smtClean="0"/>
               <a:pPr/>
-              <a:t>6/7/2012 10:48 AM</a:t>
+              <a:t>6/7/2012 11:56 AM</a:t>
             </a:fld>
             <a:endParaRPr lang="en-US"/>
           </a:p>
@@ -20794,6 +20794,13 @@
   <p:transition>
     <p:fade/>
   </p:transition>
+  <p:timing>
+    <p:tnLst>
+      <p:par>
+        <p:cTn id="1" dur="indefinite" restart="never" nodeType="tmRoot"/>
+      </p:par>
+    </p:tnLst>
+  </p:timing>
 </p:sld>
 </file>
 
@@ -21001,7 +21008,7 @@
                 </a:gradFill>
                 <a:latin typeface="+mj-lt"/>
               </a:rPr>
-              <a:t>Apps that are easy to create</a:t>
+              <a:t>Easily create apps</a:t>
             </a:r>
             <a:endParaRPr lang="en-US" sz="2400" dirty="0" smtClean="0">
               <a:gradFill>
@@ -21079,15 +21086,13 @@
                 <a:solidFill>
                   <a:schemeClr val="bg1"/>
                 </a:solidFill>
-                <a:latin typeface="+mj-lt"/>
               </a:rPr>
-              <a:t>Apps that are deeply integrated</a:t>
+              <a:t>Rich apps that use all of the OS</a:t>
             </a:r>
-            <a:endParaRPr lang="en-US" sz="2400" dirty="0" smtClean="0">
+            <a:endParaRPr lang="en-US" sz="2400" dirty="0">
               <a:solidFill>
                 <a:schemeClr val="bg1"/>
               </a:solidFill>
-              <a:latin typeface="+mj-lt"/>
             </a:endParaRPr>
           </a:p>
         </p:txBody>
@@ -21153,7 +21158,7 @@
                 </a:solidFill>
                 <a:latin typeface="+mj-lt"/>
               </a:rPr>
-              <a:t>Apps that are high quality</a:t>
+              <a:t>High quality apps</a:t>
             </a:r>
             <a:endParaRPr lang="en-US" sz="2400" dirty="0" smtClean="0">
               <a:solidFill>
@@ -21227,12 +21232,6 @@
               </a:rPr>
               <a:t>WinRT and the Metro style SDK</a:t>
             </a:r>
-            <a:endParaRPr lang="en-US" sz="2400" dirty="0" smtClean="0">
-              <a:solidFill>
-                <a:schemeClr val="bg1"/>
-              </a:solidFill>
-              <a:latin typeface="+mj-lt"/>
-            </a:endParaRPr>
           </a:p>
         </p:txBody>
       </p:sp>
@@ -21577,7 +21576,7 @@
                 </a:gradFill>
                 <a:latin typeface="+mj-lt"/>
               </a:rPr>
-              <a:t>Apps that are easy to create</a:t>
+              <a:t>Easily create apps</a:t>
             </a:r>
             <a:endParaRPr lang="en-US" sz="2400" dirty="0" smtClean="0">
               <a:gradFill>
@@ -21799,7 +21798,7 @@
             <a:p>
               <a:pPr algn="ctr" defTabSz="914099"/>
               <a:r>
-                <a:rPr lang="en-US" sz="2200" dirty="0">
+                <a:rPr lang="en-US" sz="2200" u="sng" dirty="0">
                   <a:solidFill>
                     <a:srgbClr val="FFFFFF">
                       <a:alpha val="98824"/>
@@ -21862,7 +21861,7 @@
             <a:p>
               <a:pPr algn="ctr" defTabSz="914099"/>
               <a:r>
-                <a:rPr lang="en-US" sz="2200" dirty="0">
+                <a:rPr lang="en-US" sz="2200" u="sng" dirty="0">
                   <a:solidFill>
                     <a:srgbClr val="FFFFFF">
                       <a:alpha val="98824"/>
@@ -21925,7 +21924,7 @@
             <a:p>
               <a:pPr algn="ctr" defTabSz="914099"/>
               <a:r>
-                <a:rPr lang="en-US" sz="2200" dirty="0">
+                <a:rPr lang="en-US" sz="2200" u="sng" dirty="0">
                   <a:solidFill>
                     <a:srgbClr val="FFFFFF">
                       <a:alpha val="98824"/>
@@ -21937,16 +21936,6 @@
                 </a:rPr>
                 <a:t>C++/DirectX</a:t>
               </a:r>
-              <a:endParaRPr lang="en-US" sz="2200" dirty="0">
-                <a:solidFill>
-                  <a:srgbClr val="FFFFFF">
-                    <a:alpha val="98824"/>
-                  </a:srgbClr>
-                </a:solidFill>
-                <a:latin typeface="Segoe UI" pitchFamily="34" charset="0"/>
-                <a:ea typeface="Segoe UI" pitchFamily="34" charset="0"/>
-                <a:cs typeface="Segoe UI" pitchFamily="34" charset="0"/>
-              </a:endParaRPr>
             </a:p>
           </p:txBody>
         </p:sp>
@@ -22488,19 +22477,17 @@
               </a:spcAft>
             </a:pPr>
             <a:r>
-              <a:rPr lang="en-US" sz="2400" dirty="0" smtClean="0">
+              <a:rPr lang="en-US" sz="2400" dirty="0">
                 <a:solidFill>
                   <a:schemeClr val="bg1"/>
                 </a:solidFill>
-                <a:latin typeface="+mj-lt"/>
               </a:rPr>
-              <a:t>Apps that are deeply integrated</a:t>
+              <a:t>Rich apps that use all of the OS</a:t>
             </a:r>
-            <a:endParaRPr lang="en-US" sz="2400" dirty="0" smtClean="0">
+            <a:endParaRPr lang="en-US" sz="2400" dirty="0">
               <a:solidFill>
                 <a:schemeClr val="bg1"/>
               </a:solidFill>
-              <a:latin typeface="+mj-lt"/>
             </a:endParaRPr>
           </a:p>
         </p:txBody>
@@ -23296,13 +23283,13 @@
               </a:spcAft>
             </a:pPr>
             <a:r>
-              <a:rPr lang="en-US" sz="2400" dirty="0" smtClean="0">
+              <a:rPr lang="en-US" sz="2400" smtClean="0">
                 <a:solidFill>
                   <a:schemeClr val="bg1"/>
                 </a:solidFill>
                 <a:latin typeface="+mj-lt"/>
               </a:rPr>
-              <a:t>Apps that are high quality</a:t>
+              <a:t>High quality apps</a:t>
             </a:r>
             <a:endParaRPr lang="en-US" sz="2400" dirty="0" smtClean="0">
               <a:solidFill>
@@ -23776,7 +23763,7 @@
                 </a:gradFill>
                 <a:latin typeface="+mj-lt"/>
               </a:rPr>
-              <a:t>Apps that are easy to create</a:t>
+              <a:t>Easily create apps</a:t>
             </a:r>
             <a:endParaRPr lang="en-US" sz="2400" dirty="0" smtClean="0">
               <a:gradFill>
@@ -23854,15 +23841,13 @@
                 <a:solidFill>
                   <a:schemeClr val="bg1"/>
                 </a:solidFill>
-                <a:latin typeface="+mj-lt"/>
               </a:rPr>
-              <a:t>Apps that are deeply integrated</a:t>
+              <a:t>Rich apps that use all of the OS</a:t>
             </a:r>
-            <a:endParaRPr lang="en-US" sz="2400" dirty="0" smtClean="0">
+            <a:endParaRPr lang="en-US" sz="2400" dirty="0">
               <a:solidFill>
                 <a:schemeClr val="bg1"/>
               </a:solidFill>
-              <a:latin typeface="+mj-lt"/>
             </a:endParaRPr>
           </a:p>
         </p:txBody>
@@ -23928,7 +23913,7 @@
                 </a:solidFill>
                 <a:latin typeface="+mj-lt"/>
               </a:rPr>
-              <a:t>Apps that are high quality</a:t>
+              <a:t>High quality apps</a:t>
             </a:r>
             <a:endParaRPr lang="en-US" sz="2400" dirty="0" smtClean="0">
               <a:solidFill>
@@ -24002,19 +23987,13 @@
               </a:rPr>
               <a:t>WinRT and the Metro style SDK</a:t>
             </a:r>
-            <a:endParaRPr lang="en-US" sz="2400" dirty="0" smtClean="0">
-              <a:solidFill>
-                <a:schemeClr val="bg1"/>
-              </a:solidFill>
-              <a:latin typeface="+mj-lt"/>
-            </a:endParaRPr>
           </a:p>
         </p:txBody>
       </p:sp>
     </p:spTree>
     <p:extLst>
       <p:ext uri="{BB962C8B-B14F-4D97-AF65-F5344CB8AC3E}">
-        <p14:creationId xmlns:p14="http://schemas.microsoft.com/office/powerpoint/2010/main" val="2233991162"/>
+        <p14:creationId xmlns:p14="http://schemas.microsoft.com/office/powerpoint/2010/main" val="4190164459"/>
       </p:ext>
     </p:extLst>
   </p:cSld>
@@ -24027,9 +24006,218 @@
   <p:timing>
     <p:tnLst>
       <p:par>
-        <p:cTn id="1" dur="indefinite" restart="never" nodeType="tmRoot"/>
+        <p:cTn id="1" dur="indefinite" restart="never" nodeType="tmRoot">
+          <p:childTnLst>
+            <p:seq concurrent="1" nextAc="seek">
+              <p:cTn id="2" dur="indefinite" nodeType="mainSeq">
+                <p:childTnLst>
+                  <p:par>
+                    <p:cTn id="3" fill="hold">
+                      <p:stCondLst>
+                        <p:cond delay="indefinite"/>
+                      </p:stCondLst>
+                      <p:childTnLst>
+                        <p:par>
+                          <p:cTn id="4" fill="hold">
+                            <p:stCondLst>
+                              <p:cond delay="0"/>
+                            </p:stCondLst>
+                            <p:childTnLst>
+                              <p:par>
+                                <p:cTn id="5" presetID="1" presetClass="entr" presetSubtype="0" fill="hold" grpId="0" nodeType="clickEffect">
+                                  <p:stCondLst>
+                                    <p:cond delay="0"/>
+                                  </p:stCondLst>
+                                  <p:childTnLst>
+                                    <p:set>
+                                      <p:cBhvr>
+                                        <p:cTn id="6" dur="1" fill="hold">
+                                          <p:stCondLst>
+                                            <p:cond delay="0"/>
+                                          </p:stCondLst>
+                                        </p:cTn>
+                                        <p:tgtEl>
+                                          <p:spTgt spid="14"/>
+                                        </p:tgtEl>
+                                        <p:attrNameLst>
+                                          <p:attrName>style.visibility</p:attrName>
+                                        </p:attrNameLst>
+                                      </p:cBhvr>
+                                      <p:to>
+                                        <p:strVal val="visible"/>
+                                      </p:to>
+                                    </p:set>
+                                  </p:childTnLst>
+                                </p:cTn>
+                              </p:par>
+                            </p:childTnLst>
+                          </p:cTn>
+                        </p:par>
+                      </p:childTnLst>
+                    </p:cTn>
+                  </p:par>
+                  <p:par>
+                    <p:cTn id="7" fill="hold">
+                      <p:stCondLst>
+                        <p:cond delay="indefinite"/>
+                      </p:stCondLst>
+                      <p:childTnLst>
+                        <p:par>
+                          <p:cTn id="8" fill="hold">
+                            <p:stCondLst>
+                              <p:cond delay="0"/>
+                            </p:stCondLst>
+                            <p:childTnLst>
+                              <p:par>
+                                <p:cTn id="9" presetID="1" presetClass="entr" presetSubtype="0" fill="hold" grpId="0" nodeType="clickEffect">
+                                  <p:stCondLst>
+                                    <p:cond delay="0"/>
+                                  </p:stCondLst>
+                                  <p:childTnLst>
+                                    <p:set>
+                                      <p:cBhvr>
+                                        <p:cTn id="10" dur="1" fill="hold">
+                                          <p:stCondLst>
+                                            <p:cond delay="0"/>
+                                          </p:stCondLst>
+                                        </p:cTn>
+                                        <p:tgtEl>
+                                          <p:spTgt spid="35"/>
+                                        </p:tgtEl>
+                                        <p:attrNameLst>
+                                          <p:attrName>style.visibility</p:attrName>
+                                        </p:attrNameLst>
+                                      </p:cBhvr>
+                                      <p:to>
+                                        <p:strVal val="visible"/>
+                                      </p:to>
+                                    </p:set>
+                                  </p:childTnLst>
+                                </p:cTn>
+                              </p:par>
+                            </p:childTnLst>
+                          </p:cTn>
+                        </p:par>
+                      </p:childTnLst>
+                    </p:cTn>
+                  </p:par>
+                  <p:par>
+                    <p:cTn id="11" fill="hold">
+                      <p:stCondLst>
+                        <p:cond delay="indefinite"/>
+                      </p:stCondLst>
+                      <p:childTnLst>
+                        <p:par>
+                          <p:cTn id="12" fill="hold">
+                            <p:stCondLst>
+                              <p:cond delay="0"/>
+                            </p:stCondLst>
+                            <p:childTnLst>
+                              <p:par>
+                                <p:cTn id="13" presetID="1" presetClass="entr" presetSubtype="0" fill="hold" grpId="0" nodeType="clickEffect">
+                                  <p:stCondLst>
+                                    <p:cond delay="0"/>
+                                  </p:stCondLst>
+                                  <p:childTnLst>
+                                    <p:set>
+                                      <p:cBhvr>
+                                        <p:cTn id="14" dur="1" fill="hold">
+                                          <p:stCondLst>
+                                            <p:cond delay="0"/>
+                                          </p:stCondLst>
+                                        </p:cTn>
+                                        <p:tgtEl>
+                                          <p:spTgt spid="36"/>
+                                        </p:tgtEl>
+                                        <p:attrNameLst>
+                                          <p:attrName>style.visibility</p:attrName>
+                                        </p:attrNameLst>
+                                      </p:cBhvr>
+                                      <p:to>
+                                        <p:strVal val="visible"/>
+                                      </p:to>
+                                    </p:set>
+                                  </p:childTnLst>
+                                </p:cTn>
+                              </p:par>
+                            </p:childTnLst>
+                          </p:cTn>
+                        </p:par>
+                      </p:childTnLst>
+                    </p:cTn>
+                  </p:par>
+                  <p:par>
+                    <p:cTn id="15" fill="hold">
+                      <p:stCondLst>
+                        <p:cond delay="indefinite"/>
+                      </p:stCondLst>
+                      <p:childTnLst>
+                        <p:par>
+                          <p:cTn id="16" fill="hold">
+                            <p:stCondLst>
+                              <p:cond delay="0"/>
+                            </p:stCondLst>
+                            <p:childTnLst>
+                              <p:par>
+                                <p:cTn id="17" presetID="1" presetClass="entr" presetSubtype="0" fill="hold" grpId="0" nodeType="clickEffect">
+                                  <p:stCondLst>
+                                    <p:cond delay="0"/>
+                                  </p:stCondLst>
+                                  <p:childTnLst>
+                                    <p:set>
+                                      <p:cBhvr>
+                                        <p:cTn id="18" dur="1" fill="hold">
+                                          <p:stCondLst>
+                                            <p:cond delay="0"/>
+                                          </p:stCondLst>
+                                        </p:cTn>
+                                        <p:tgtEl>
+                                          <p:spTgt spid="7"/>
+                                        </p:tgtEl>
+                                        <p:attrNameLst>
+                                          <p:attrName>style.visibility</p:attrName>
+                                        </p:attrNameLst>
+                                      </p:cBhvr>
+                                      <p:to>
+                                        <p:strVal val="visible"/>
+                                      </p:to>
+                                    </p:set>
+                                  </p:childTnLst>
+                                </p:cTn>
+                              </p:par>
+                            </p:childTnLst>
+                          </p:cTn>
+                        </p:par>
+                      </p:childTnLst>
+                    </p:cTn>
+                  </p:par>
+                </p:childTnLst>
+              </p:cTn>
+              <p:prevCondLst>
+                <p:cond evt="onPrev" delay="0">
+                  <p:tgtEl>
+                    <p:sldTgt/>
+                  </p:tgtEl>
+                </p:cond>
+              </p:prevCondLst>
+              <p:nextCondLst>
+                <p:cond evt="onNext" delay="0">
+                  <p:tgtEl>
+                    <p:sldTgt/>
+                  </p:tgtEl>
+                </p:cond>
+              </p:nextCondLst>
+            </p:seq>
+          </p:childTnLst>
+        </p:cTn>
       </p:par>
     </p:tnLst>
+    <p:bldLst>
+      <p:bldP spid="14" grpId="0" animBg="1"/>
+      <p:bldP spid="35" grpId="0" animBg="1"/>
+      <p:bldP spid="36" grpId="0" animBg="1"/>
+      <p:bldP spid="7" grpId="0" animBg="1"/>
+    </p:bldLst>
   </p:timing>
 </p:sld>
 </file>
@@ -32623,6 +32811,13 @@
   <p:transition>
     <p:fade/>
   </p:transition>
+  <p:timing>
+    <p:tnLst>
+      <p:par>
+        <p:cTn id="1" dur="indefinite" restart="never" nodeType="tmRoot"/>
+      </p:par>
+    </p:tnLst>
+  </p:timing>
 </p:sld>
 </file>
 
@@ -32781,6 +32976,13 @@
   <p:transition>
     <p:fade/>
   </p:transition>
+  <p:timing>
+    <p:tnLst>
+      <p:par>
+        <p:cTn id="1" dur="indefinite" restart="never" nodeType="tmRoot"/>
+      </p:par>
+    </p:tnLst>
+  </p:timing>
 </p:sld>
 </file>
 
@@ -32945,6 +33147,13 @@
   <p:transition>
     <p:fade/>
   </p:transition>
+  <p:timing>
+    <p:tnLst>
+      <p:par>
+        <p:cTn id="1" dur="indefinite" restart="never" nodeType="tmRoot"/>
+      </p:par>
+    </p:tnLst>
+  </p:timing>
 </p:sld>
 </file>
 
@@ -34126,70 +34335,12 @@
 </file>
 
 <file path=customXml/item1.xml><?xml version="1.0" encoding="utf-8"?>
-<p:properties xmlns:p="http://schemas.microsoft.com/office/2006/metadata/properties" xmlns:xsi="http://www.w3.org/2001/XMLSchema-instance" xmlns:pc="http://schemas.microsoft.com/office/infopath/2007/PartnerControls">
-  <documentManagement>
-    <TrackTaxHTField0 xmlns="2295e2e7-0eeb-498e-8716-217bb2ee6ee3">
-      <Terms xmlns="http://schemas.microsoft.com/office/infopath/2007/PartnerControls"/>
-    </TrackTaxHTField0>
-    <CampaignTaxHTField0 xmlns="2295e2e7-0eeb-498e-8716-217bb2ee6ee3">
-      <Terms xmlns="http://schemas.microsoft.com/office/infopath/2007/PartnerControls"/>
-    </CampaignTaxHTField0>
-    <Event_x0020_End_x0020_Date xmlns="2295e2e7-0eeb-498e-8716-217bb2ee6ee3">2012-06-29T17:00:00+10:00</Event_x0020_End_x0020_Date>
-    <Event_x0020_Start_x0020_Date xmlns="2295e2e7-0eeb-498e-8716-217bb2ee6ee3">2012-06-26T17:00:00+10:00</Event_x0020_Start_x0020_Date>
-    <MS_x0020_Speaker xmlns="2295e2e7-0eeb-498e-8716-217bb2ee6ee3">
-      <UserInfo>
-        <DisplayName/>
-        <AccountId xsi:nil="true"/>
-        <AccountType/>
-      </UserInfo>
-    </MS_x0020_Speaker>
-    <External_x0020_Speaker xmlns="2295e2e7-0eeb-498e-8716-217bb2ee6ee3" xsi:nil="true"/>
-    <Session_x0020_Code xmlns="2295e2e7-0eeb-498e-8716-217bb2ee6ee3" xsi:nil="true"/>
-    <ProductTaxHTField0 xmlns="2295e2e7-0eeb-498e-8716-217bb2ee6ee3">
-      <Terms xmlns="http://schemas.microsoft.com/office/infopath/2007/PartnerControls"/>
-    </ProductTaxHTField0>
-    <Presentation_x0020_Date xmlns="2295e2e7-0eeb-498e-8716-217bb2ee6ee3" xsi:nil="true"/>
-    <Event_x0020_LocationTaxHTField0 xmlns="2295e2e7-0eeb-498e-8716-217bb2ee6ee3">
-      <Terms xmlns="http://schemas.microsoft.com/office/infopath/2007/PartnerControls">
-        <TermInfo xmlns="http://schemas.microsoft.com/office/infopath/2007/PartnerControls">
-          <TermName xmlns="http://schemas.microsoft.com/office/infopath/2007/PartnerControls">Orlando</TermName>
-          <TermId xmlns="http://schemas.microsoft.com/office/infopath/2007/PartnerControls">99ded043-d247-43a1-9b7a-028ecd66d1eb</TermId>
-        </TermInfo>
-      </Terms>
-    </Event_x0020_LocationTaxHTField0>
-    <Event1TaxHTField0 xmlns="2295e2e7-0eeb-498e-8716-217bb2ee6ee3">
-      <Terms xmlns="http://schemas.microsoft.com/office/infopath/2007/PartnerControls">
-        <TermInfo xmlns="http://schemas.microsoft.com/office/infopath/2007/PartnerControls">
-          <TermName xmlns="http://schemas.microsoft.com/office/infopath/2007/PartnerControls">TechEd</TermName>
-          <TermId xmlns="http://schemas.microsoft.com/office/infopath/2007/PartnerControls">ac8fad57-eb30-43a8-b5bd-05dcf2cf2246</TermId>
-        </TermInfo>
-      </Terms>
-    </Event1TaxHTField0>
-    <AudienceTaxHTField0 xmlns="8b529f77-48ab-4581-b468-93f09345b8aa">
-      <Terms xmlns="http://schemas.microsoft.com/office/infopath/2007/PartnerControls"/>
-    </AudienceTaxHTField0>
-    <MS_x0020_Content_x0020_Owner xmlns="2295e2e7-0eeb-498e-8716-217bb2ee6ee3">
-      <UserInfo>
-        <DisplayName/>
-        <AccountId xsi:nil="true"/>
-        <AccountType/>
-      </UserInfo>
-    </MS_x0020_Content_x0020_Owner>
-    <TaxCatchAll xmlns="2295e2e7-0eeb-498e-8716-217bb2ee6ee3">
-      <Value>126</Value>
-      <Value>232</Value>
-      <Value>231</Value>
-    </TaxCatchAll>
-    <Event_x0020_VenueTaxHTField0 xmlns="2295e2e7-0eeb-498e-8716-217bb2ee6ee3">
-      <Terms xmlns="http://schemas.microsoft.com/office/infopath/2007/PartnerControls">
-        <TermInfo xmlns="http://schemas.microsoft.com/office/infopath/2007/PartnerControls">
-          <TermName xmlns="http://schemas.microsoft.com/office/infopath/2007/PartnerControls">Orange County Convention Center Orlando, FL</TermName>
-          <TermId xmlns="http://schemas.microsoft.com/office/infopath/2007/PartnerControls">bd993e89-aa48-4695-84e0-3b53e88b1a79</TermId>
-        </TermInfo>
-      </Terms>
-    </Event_x0020_VenueTaxHTField0>
-  </documentManagement>
-</p:properties>
+<?mso-contentType ?>
+<FormTemplates xmlns="http://schemas.microsoft.com/sharepoint/v3/contenttype/forms">
+  <Display>DocumentLibraryForm</Display>
+  <Edit>DocumentLibraryForm</Edit>
+  <New>DocumentLibraryForm</New>
+</FormTemplates>
 </file>
 
 <file path=customXml/item2.xml><?xml version="1.0" encoding="utf-8"?>
@@ -34472,27 +34623,76 @@
 </file>
 
 <file path=customXml/item3.xml><?xml version="1.0" encoding="utf-8"?>
-<?mso-contentType ?>
-<FormTemplates xmlns="http://schemas.microsoft.com/sharepoint/v3/contenttype/forms">
-  <Display>DocumentLibraryForm</Display>
-  <Edit>DocumentLibraryForm</Edit>
-  <New>DocumentLibraryForm</New>
-</FormTemplates>
+<p:properties xmlns:p="http://schemas.microsoft.com/office/2006/metadata/properties" xmlns:xsi="http://www.w3.org/2001/XMLSchema-instance" xmlns:pc="http://schemas.microsoft.com/office/infopath/2007/PartnerControls">
+  <documentManagement>
+    <TrackTaxHTField0 xmlns="2295e2e7-0eeb-498e-8716-217bb2ee6ee3">
+      <Terms xmlns="http://schemas.microsoft.com/office/infopath/2007/PartnerControls"/>
+    </TrackTaxHTField0>
+    <CampaignTaxHTField0 xmlns="2295e2e7-0eeb-498e-8716-217bb2ee6ee3">
+      <Terms xmlns="http://schemas.microsoft.com/office/infopath/2007/PartnerControls"/>
+    </CampaignTaxHTField0>
+    <Event_x0020_End_x0020_Date xmlns="2295e2e7-0eeb-498e-8716-217bb2ee6ee3">2012-06-29T17:00:00+10:00</Event_x0020_End_x0020_Date>
+    <Event_x0020_Start_x0020_Date xmlns="2295e2e7-0eeb-498e-8716-217bb2ee6ee3">2012-06-26T17:00:00+10:00</Event_x0020_Start_x0020_Date>
+    <MS_x0020_Speaker xmlns="2295e2e7-0eeb-498e-8716-217bb2ee6ee3">
+      <UserInfo>
+        <DisplayName/>
+        <AccountId xsi:nil="true"/>
+        <AccountType/>
+      </UserInfo>
+    </MS_x0020_Speaker>
+    <External_x0020_Speaker xmlns="2295e2e7-0eeb-498e-8716-217bb2ee6ee3" xsi:nil="true"/>
+    <Session_x0020_Code xmlns="2295e2e7-0eeb-498e-8716-217bb2ee6ee3" xsi:nil="true"/>
+    <ProductTaxHTField0 xmlns="2295e2e7-0eeb-498e-8716-217bb2ee6ee3">
+      <Terms xmlns="http://schemas.microsoft.com/office/infopath/2007/PartnerControls"/>
+    </ProductTaxHTField0>
+    <Presentation_x0020_Date xmlns="2295e2e7-0eeb-498e-8716-217bb2ee6ee3" xsi:nil="true"/>
+    <Event_x0020_LocationTaxHTField0 xmlns="2295e2e7-0eeb-498e-8716-217bb2ee6ee3">
+      <Terms xmlns="http://schemas.microsoft.com/office/infopath/2007/PartnerControls">
+        <TermInfo xmlns="http://schemas.microsoft.com/office/infopath/2007/PartnerControls">
+          <TermName xmlns="http://schemas.microsoft.com/office/infopath/2007/PartnerControls">Orlando</TermName>
+          <TermId xmlns="http://schemas.microsoft.com/office/infopath/2007/PartnerControls">99ded043-d247-43a1-9b7a-028ecd66d1eb</TermId>
+        </TermInfo>
+      </Terms>
+    </Event_x0020_LocationTaxHTField0>
+    <Event1TaxHTField0 xmlns="2295e2e7-0eeb-498e-8716-217bb2ee6ee3">
+      <Terms xmlns="http://schemas.microsoft.com/office/infopath/2007/PartnerControls">
+        <TermInfo xmlns="http://schemas.microsoft.com/office/infopath/2007/PartnerControls">
+          <TermName xmlns="http://schemas.microsoft.com/office/infopath/2007/PartnerControls">TechEd</TermName>
+          <TermId xmlns="http://schemas.microsoft.com/office/infopath/2007/PartnerControls">ac8fad57-eb30-43a8-b5bd-05dcf2cf2246</TermId>
+        </TermInfo>
+      </Terms>
+    </Event1TaxHTField0>
+    <AudienceTaxHTField0 xmlns="8b529f77-48ab-4581-b468-93f09345b8aa">
+      <Terms xmlns="http://schemas.microsoft.com/office/infopath/2007/PartnerControls"/>
+    </AudienceTaxHTField0>
+    <MS_x0020_Content_x0020_Owner xmlns="2295e2e7-0eeb-498e-8716-217bb2ee6ee3">
+      <UserInfo>
+        <DisplayName/>
+        <AccountId xsi:nil="true"/>
+        <AccountType/>
+      </UserInfo>
+    </MS_x0020_Content_x0020_Owner>
+    <TaxCatchAll xmlns="2295e2e7-0eeb-498e-8716-217bb2ee6ee3">
+      <Value>126</Value>
+      <Value>232</Value>
+      <Value>231</Value>
+    </TaxCatchAll>
+    <Event_x0020_VenueTaxHTField0 xmlns="2295e2e7-0eeb-498e-8716-217bb2ee6ee3">
+      <Terms xmlns="http://schemas.microsoft.com/office/infopath/2007/PartnerControls">
+        <TermInfo xmlns="http://schemas.microsoft.com/office/infopath/2007/PartnerControls">
+          <TermName xmlns="http://schemas.microsoft.com/office/infopath/2007/PartnerControls">Orange County Convention Center Orlando, FL</TermName>
+          <TermId xmlns="http://schemas.microsoft.com/office/infopath/2007/PartnerControls">bd993e89-aa48-4695-84e0-3b53e88b1a79</TermId>
+        </TermInfo>
+      </Terms>
+    </Event_x0020_VenueTaxHTField0>
+  </documentManagement>
+</p:properties>
 </file>
 
 <file path=customXml/itemProps1.xml><?xml version="1.0" encoding="utf-8"?>
-<ds:datastoreItem xmlns:ds="http://schemas.openxmlformats.org/officeDocument/2006/customXml" ds:itemID="{76D92E10-3D8B-4831-9584-7BC82972C8E2}">
+<ds:datastoreItem xmlns:ds="http://schemas.openxmlformats.org/officeDocument/2006/customXml" ds:itemID="{EF1FE425-EA36-4D8C-A967-84CE3BED24D2}">
   <ds:schemaRefs>
-    <ds:schemaRef ds:uri="http://schemas.microsoft.com/office/2006/documentManagement/types"/>
-    <ds:schemaRef ds:uri="http://purl.org/dc/terms/"/>
-    <ds:schemaRef ds:uri="http://schemas.microsoft.com/office/2006/metadata/properties"/>
-    <ds:schemaRef ds:uri="http://schemas.openxmlformats.org/package/2006/metadata/core-properties"/>
-    <ds:schemaRef ds:uri="http://www.w3.org/XML/1998/namespace"/>
-    <ds:schemaRef ds:uri="http://schemas.microsoft.com/office/infopath/2007/PartnerControls"/>
-    <ds:schemaRef ds:uri="http://purl.org/dc/elements/1.1/"/>
-    <ds:schemaRef ds:uri="8b529f77-48ab-4581-b468-93f09345b8aa"/>
-    <ds:schemaRef ds:uri="2295e2e7-0eeb-498e-8716-217bb2ee6ee3"/>
-    <ds:schemaRef ds:uri="http://purl.org/dc/dcmitype/"/>
+    <ds:schemaRef ds:uri="http://schemas.microsoft.com/sharepoint/v3/contenttype/forms"/>
   </ds:schemaRefs>
 </ds:datastoreItem>
 </file>
@@ -34517,9 +34717,18 @@
 </file>
 
 <file path=customXml/itemProps3.xml><?xml version="1.0" encoding="utf-8"?>
-<ds:datastoreItem xmlns:ds="http://schemas.openxmlformats.org/officeDocument/2006/customXml" ds:itemID="{EF1FE425-EA36-4D8C-A967-84CE3BED24D2}">
+<ds:datastoreItem xmlns:ds="http://schemas.openxmlformats.org/officeDocument/2006/customXml" ds:itemID="{76D92E10-3D8B-4831-9584-7BC82972C8E2}">
   <ds:schemaRefs>
-    <ds:schemaRef ds:uri="http://schemas.microsoft.com/sharepoint/v3/contenttype/forms"/>
+    <ds:schemaRef ds:uri="http://schemas.microsoft.com/office/2006/documentManagement/types"/>
+    <ds:schemaRef ds:uri="http://purl.org/dc/terms/"/>
+    <ds:schemaRef ds:uri="http://schemas.microsoft.com/office/2006/metadata/properties"/>
+    <ds:schemaRef ds:uri="http://schemas.openxmlformats.org/package/2006/metadata/core-properties"/>
+    <ds:schemaRef ds:uri="http://www.w3.org/XML/1998/namespace"/>
+    <ds:schemaRef ds:uri="http://schemas.microsoft.com/office/infopath/2007/PartnerControls"/>
+    <ds:schemaRef ds:uri="http://purl.org/dc/elements/1.1/"/>
+    <ds:schemaRef ds:uri="8b529f77-48ab-4581-b468-93f09345b8aa"/>
+    <ds:schemaRef ds:uri="2295e2e7-0eeb-498e-8716-217bb2ee6ee3"/>
+    <ds:schemaRef ds:uri="http://purl.org/dc/dcmitype/"/>
   </ds:schemaRefs>
 </ds:datastoreItem>
 </file>
</xml_diff>

<commit_message>
Tweaked slides a bit more.
</commit_message>
<xml_diff>
--- a/slides/DEV350 Using Windows Runtime and SDK to build Metro style Apps.pptx
+++ b/slides/DEV350 Using Windows Runtime and SDK to build Metro style Apps.pptx
@@ -28,7 +28,7 @@
     <p:sldId id="341" r:id="rId19"/>
     <p:sldId id="342" r:id="rId20"/>
     <p:sldId id="266" r:id="rId21"/>
-    <p:sldId id="343" r:id="rId22"/>
+    <p:sldId id="345" r:id="rId22"/>
     <p:sldId id="311" r:id="rId23"/>
     <p:sldId id="312" r:id="rId24"/>
     <p:sldId id="313" r:id="rId25"/>
@@ -943,11 +943,7 @@
         <a:p>
           <a:r>
             <a:rPr lang="en-US" dirty="0" smtClean="0"/>
-            <a:t>JavaScript </a:t>
-          </a:r>
-          <a:r>
-            <a:rPr lang="en-US" smtClean="0"/>
-            <a:t>[Chakra]</a:t>
+            <a:t>JavaScript</a:t>
           </a:r>
           <a:endParaRPr lang="en-US" dirty="0"/>
         </a:p>
@@ -1493,11 +1489,7 @@
           </a:pPr>
           <a:r>
             <a:rPr lang="en-US" sz="1700" kern="1200" dirty="0" smtClean="0"/>
-            <a:t>JavaScript </a:t>
-          </a:r>
-          <a:r>
-            <a:rPr lang="en-US" sz="1700" kern="1200" smtClean="0"/>
-            <a:t>[Chakra]</a:t>
+            <a:t>JavaScript</a:t>
           </a:r>
           <a:endParaRPr lang="en-US" sz="1700" kern="1200" dirty="0"/>
         </a:p>
@@ -3225,7 +3217,7 @@
                 <a:latin typeface="Segoe UI" pitchFamily="34" charset="0"/>
               </a:rPr>
               <a:pPr/>
-              <a:t>6/7/2012</a:t>
+              <a:t>6/8/2012</a:t>
             </a:fld>
             <a:endParaRPr lang="en-US" dirty="0">
               <a:solidFill>
@@ -3475,7 +3467,7 @@
             <a:fld id="{7C3FBCD4-166E-446F-AF18-7D4A0CF9AEF6}" type="datetimeFigureOut">
               <a:rPr lang="en-US" smtClean="0"/>
               <a:pPr/>
-              <a:t>6/7/2012</a:t>
+              <a:t>6/8/2012</a:t>
             </a:fld>
             <a:endParaRPr lang="en-US" dirty="0"/>
           </a:p>
@@ -3924,7 +3916,7 @@
             <a:fld id="{81331B57-0BE5-4F82-AA58-76F53EFF3ADA}" type="datetime8">
               <a:rPr lang="en-US" smtClean="0"/>
               <a:pPr/>
-              <a:t>6/7/2012 11:56 AM</a:t>
+              <a:t>6/8/2012 12:22 PM</a:t>
             </a:fld>
             <a:endParaRPr lang="en-US" dirty="0"/>
           </a:p>
@@ -4124,7 +4116,7 @@
             <a:fld id="{81331B57-0BE5-4F82-AA58-76F53EFF3ADA}" type="datetime8">
               <a:rPr lang="en-US" smtClean="0"/>
               <a:pPr/>
-              <a:t>6/7/2012 11:56 AM</a:t>
+              <a:t>6/8/2012 12:22 PM</a:t>
             </a:fld>
             <a:endParaRPr lang="en-US" dirty="0"/>
           </a:p>
@@ -4324,7 +4316,7 @@
             <a:fld id="{81331B57-0BE5-4F82-AA58-76F53EFF3ADA}" type="datetime8">
               <a:rPr lang="en-US" smtClean="0"/>
               <a:pPr/>
-              <a:t>6/7/2012 11:56 AM</a:t>
+              <a:t>6/8/2012 12:22 PM</a:t>
             </a:fld>
             <a:endParaRPr lang="en-US"/>
           </a:p>
@@ -4996,7 +4988,7 @@
             <a:fld id="{81331B57-0BE5-4F82-AA58-76F53EFF3ADA}" type="datetime8">
               <a:rPr lang="en-US" smtClean="0"/>
               <a:pPr/>
-              <a:t>6/7/2012 11:56 AM</a:t>
+              <a:t>6/8/2012 12:22 PM</a:t>
             </a:fld>
             <a:endParaRPr lang="en-US"/>
           </a:p>
@@ -20766,7 +20758,7 @@
           <p:nvPr>
             <p:extLst>
               <p:ext uri="{D42A27DB-BD31-4B8C-83A1-F6EECF244321}">
-                <p14:modId xmlns:p14="http://schemas.microsoft.com/office/powerpoint/2010/main" val="918110536"/>
+                <p14:modId xmlns:p14="http://schemas.microsoft.com/office/powerpoint/2010/main" val="2089385679"/>
               </p:ext>
             </p:extLst>
           </p:nvPr>
@@ -20978,7 +20970,7 @@
           </a:fontRef>
         </p:style>
         <p:txBody>
-          <a:bodyPr vert="horz" wrap="square" lIns="91436" tIns="822960" rIns="91436" bIns="45718" numCol="1" rtlCol="0" anchor="t" anchorCtr="0" compatLnSpc="1">
+          <a:bodyPr vert="horz" wrap="square" lIns="91436" tIns="548640" rIns="91436" bIns="45718" numCol="1" rtlCol="0" anchor="t" anchorCtr="0" compatLnSpc="1">
             <a:prstTxWarp prst="textNoShape">
               <a:avLst/>
             </a:prstTxWarp>
@@ -21010,20 +21002,6 @@
               </a:rPr>
               <a:t>Easily create apps</a:t>
             </a:r>
-            <a:endParaRPr lang="en-US" sz="2400" dirty="0" smtClean="0">
-              <a:gradFill>
-                <a:gsLst>
-                  <a:gs pos="0">
-                    <a:schemeClr val="tx1"/>
-                  </a:gs>
-                  <a:gs pos="100000">
-                    <a:schemeClr val="tx1"/>
-                  </a:gs>
-                </a:gsLst>
-                <a:lin ang="5400000" scaled="0"/>
-              </a:gradFill>
-              <a:latin typeface="+mj-lt"/>
-            </a:endParaRPr>
           </a:p>
         </p:txBody>
       </p:sp>
@@ -21066,7 +21044,7 @@
           </a:fontRef>
         </p:style>
         <p:txBody>
-          <a:bodyPr vert="horz" wrap="square" lIns="91436" tIns="822960" rIns="91436" bIns="45718" numCol="1" rtlCol="0" anchor="t" anchorCtr="0" compatLnSpc="1">
+          <a:bodyPr vert="horz" wrap="square" lIns="91436" tIns="548640" rIns="91436" bIns="45718" numCol="1" rtlCol="0" anchor="t" anchorCtr="0" compatLnSpc="1">
             <a:prstTxWarp prst="textNoShape">
               <a:avLst/>
             </a:prstTxWarp>
@@ -21087,7 +21065,23 @@
                   <a:schemeClr val="bg1"/>
                 </a:solidFill>
               </a:rPr>
-              <a:t>Rich apps that use all of the OS</a:t>
+              <a:t>Apps </a:t>
+            </a:r>
+            <a:r>
+              <a:rPr lang="en-US" sz="2400" dirty="0" smtClean="0">
+                <a:solidFill>
+                  <a:schemeClr val="bg1"/>
+                </a:solidFill>
+              </a:rPr>
+              <a:t>that use all </a:t>
+            </a:r>
+            <a:r>
+              <a:rPr lang="en-US" sz="2400" dirty="0" smtClean="0">
+                <a:solidFill>
+                  <a:schemeClr val="bg1"/>
+                </a:solidFill>
+              </a:rPr>
+              <a:t>the richness of Windows</a:t>
             </a:r>
             <a:endParaRPr lang="en-US" sz="2400" dirty="0">
               <a:solidFill>
@@ -21136,7 +21130,7 @@
           </a:fontRef>
         </p:style>
         <p:txBody>
-          <a:bodyPr vert="horz" wrap="square" lIns="91436" tIns="822960" rIns="91436" bIns="45718" numCol="1" rtlCol="0" anchor="t" anchorCtr="0" compatLnSpc="1">
+          <a:bodyPr vert="horz" wrap="square" lIns="91436" tIns="548640" rIns="91436" bIns="45718" numCol="1" rtlCol="0" anchor="t" anchorCtr="0" compatLnSpc="1">
             <a:prstTxWarp prst="textNoShape">
               <a:avLst/>
             </a:prstTxWarp>
@@ -21160,12 +21154,6 @@
               </a:rPr>
               <a:t>High quality apps</a:t>
             </a:r>
-            <a:endParaRPr lang="en-US" sz="2400" dirty="0" smtClean="0">
-              <a:solidFill>
-                <a:schemeClr val="bg1"/>
-              </a:solidFill>
-              <a:latin typeface="+mj-lt"/>
-            </a:endParaRPr>
           </a:p>
         </p:txBody>
       </p:sp>
@@ -21578,20 +21566,6 @@
               </a:rPr>
               <a:t>Easily create apps</a:t>
             </a:r>
-            <a:endParaRPr lang="en-US" sz="2400" dirty="0" smtClean="0">
-              <a:gradFill>
-                <a:gsLst>
-                  <a:gs pos="0">
-                    <a:schemeClr val="tx1"/>
-                  </a:gs>
-                  <a:gs pos="100000">
-                    <a:schemeClr val="tx1"/>
-                  </a:gs>
-                </a:gsLst>
-                <a:lin ang="5400000" scaled="0"/>
-              </a:gradFill>
-              <a:latin typeface="+mj-lt"/>
-            </a:endParaRPr>
           </a:p>
         </p:txBody>
       </p:sp>
@@ -21738,15 +21712,15 @@
       </p:grpSp>
       <p:grpSp>
         <p:nvGrpSpPr>
-          <p:cNvPr id="11" name="Group 10"/>
+          <p:cNvPr id="13" name="Group 12"/>
           <p:cNvGrpSpPr/>
           <p:nvPr/>
         </p:nvGrpSpPr>
         <p:grpSpPr>
           <a:xfrm>
-            <a:off x="8034901" y="1124744"/>
+            <a:off x="8031174" y="1124744"/>
             <a:ext cx="3244087" cy="2767599"/>
-            <a:chOff x="8034901" y="1124744"/>
+            <a:chOff x="8031174" y="1124744"/>
             <a:chExt cx="3244087" cy="2767599"/>
           </a:xfrm>
         </p:grpSpPr>
@@ -21758,7 +21732,7 @@
           </p:nvSpPr>
           <p:spPr bwMode="auto">
             <a:xfrm>
-              <a:off x="8038627" y="1124744"/>
+              <a:off x="8031174" y="2132856"/>
               <a:ext cx="3240361" cy="767858"/>
             </a:xfrm>
             <a:prstGeom prst="rect">
@@ -21821,7 +21795,7 @@
           </p:nvSpPr>
           <p:spPr bwMode="auto">
             <a:xfrm>
-              <a:off x="8038628" y="2125282"/>
+              <a:off x="8031174" y="1124744"/>
               <a:ext cx="3240360" cy="767858"/>
             </a:xfrm>
             <a:prstGeom prst="rect">
@@ -21884,7 +21858,7 @@
           </p:nvSpPr>
           <p:spPr bwMode="auto">
             <a:xfrm>
-              <a:off x="8034901" y="3112370"/>
+              <a:off x="8031174" y="3112370"/>
               <a:ext cx="3244087" cy="779973"/>
             </a:xfrm>
             <a:prstGeom prst="rect">
@@ -22290,7 +22264,7 @@
                                           </p:stCondLst>
                                         </p:cTn>
                                         <p:tgtEl>
-                                          <p:spTgt spid="11"/>
+                                          <p:spTgt spid="13"/>
                                         </p:tgtEl>
                                         <p:attrNameLst>
                                           <p:attrName>style.visibility</p:attrName>
@@ -22461,7 +22435,7 @@
           </a:fontRef>
         </p:style>
         <p:txBody>
-          <a:bodyPr vert="horz" wrap="square" lIns="91436" tIns="822960" rIns="91436" bIns="45718" numCol="1" rtlCol="0" anchor="t" anchorCtr="0" compatLnSpc="1">
+          <a:bodyPr vert="horz" wrap="square" lIns="91436" tIns="548640" rIns="91436" bIns="45718" numCol="1" rtlCol="0" anchor="t" anchorCtr="0" compatLnSpc="1">
             <a:prstTxWarp prst="textNoShape">
               <a:avLst/>
             </a:prstTxWarp>
@@ -22482,7 +22456,7 @@
                   <a:schemeClr val="bg1"/>
                 </a:solidFill>
               </a:rPr>
-              <a:t>Rich apps that use all of the OS</a:t>
+              <a:t>Apps that use all the richness of Windows</a:t>
             </a:r>
             <a:endParaRPr lang="en-US" sz="2400" dirty="0">
               <a:solidFill>
@@ -23733,7 +23707,7 @@
           </a:fontRef>
         </p:style>
         <p:txBody>
-          <a:bodyPr vert="horz" wrap="square" lIns="91436" tIns="822960" rIns="91436" bIns="45718" numCol="1" rtlCol="0" anchor="t" anchorCtr="0" compatLnSpc="1">
+          <a:bodyPr vert="horz" wrap="square" lIns="91436" tIns="548640" rIns="91436" bIns="45718" numCol="1" rtlCol="0" anchor="t" anchorCtr="0" compatLnSpc="1">
             <a:prstTxWarp prst="textNoShape">
               <a:avLst/>
             </a:prstTxWarp>
@@ -23765,20 +23739,6 @@
               </a:rPr>
               <a:t>Easily create apps</a:t>
             </a:r>
-            <a:endParaRPr lang="en-US" sz="2400" dirty="0" smtClean="0">
-              <a:gradFill>
-                <a:gsLst>
-                  <a:gs pos="0">
-                    <a:schemeClr val="tx1"/>
-                  </a:gs>
-                  <a:gs pos="100000">
-                    <a:schemeClr val="tx1"/>
-                  </a:gs>
-                </a:gsLst>
-                <a:lin ang="5400000" scaled="0"/>
-              </a:gradFill>
-              <a:latin typeface="+mj-lt"/>
-            </a:endParaRPr>
           </a:p>
         </p:txBody>
       </p:sp>
@@ -23821,7 +23781,7 @@
           </a:fontRef>
         </p:style>
         <p:txBody>
-          <a:bodyPr vert="horz" wrap="square" lIns="91436" tIns="822960" rIns="91436" bIns="45718" numCol="1" rtlCol="0" anchor="t" anchorCtr="0" compatLnSpc="1">
+          <a:bodyPr vert="horz" wrap="square" lIns="91436" tIns="548640" rIns="91436" bIns="45718" numCol="1" rtlCol="0" anchor="t" anchorCtr="0" compatLnSpc="1">
             <a:prstTxWarp prst="textNoShape">
               <a:avLst/>
             </a:prstTxWarp>
@@ -23842,7 +23802,23 @@
                   <a:schemeClr val="bg1"/>
                 </a:solidFill>
               </a:rPr>
-              <a:t>Rich apps that use all of the OS</a:t>
+              <a:t>Apps </a:t>
+            </a:r>
+            <a:r>
+              <a:rPr lang="en-US" sz="2400" dirty="0" smtClean="0">
+                <a:solidFill>
+                  <a:schemeClr val="bg1"/>
+                </a:solidFill>
+              </a:rPr>
+              <a:t>that use all </a:t>
+            </a:r>
+            <a:r>
+              <a:rPr lang="en-US" sz="2400" dirty="0" smtClean="0">
+                <a:solidFill>
+                  <a:schemeClr val="bg1"/>
+                </a:solidFill>
+              </a:rPr>
+              <a:t>the richness of Windows</a:t>
             </a:r>
             <a:endParaRPr lang="en-US" sz="2400" dirty="0">
               <a:solidFill>
@@ -23891,7 +23867,7 @@
           </a:fontRef>
         </p:style>
         <p:txBody>
-          <a:bodyPr vert="horz" wrap="square" lIns="91436" tIns="822960" rIns="91436" bIns="45718" numCol="1" rtlCol="0" anchor="t" anchorCtr="0" compatLnSpc="1">
+          <a:bodyPr vert="horz" wrap="square" lIns="91436" tIns="548640" rIns="91436" bIns="45718" numCol="1" rtlCol="0" anchor="t" anchorCtr="0" compatLnSpc="1">
             <a:prstTxWarp prst="textNoShape">
               <a:avLst/>
             </a:prstTxWarp>
@@ -23915,12 +23891,6 @@
               </a:rPr>
               <a:t>High quality apps</a:t>
             </a:r>
-            <a:endParaRPr lang="en-US" sz="2400" dirty="0" smtClean="0">
-              <a:solidFill>
-                <a:schemeClr val="bg1"/>
-              </a:solidFill>
-              <a:latin typeface="+mj-lt"/>
-            </a:endParaRPr>
           </a:p>
         </p:txBody>
       </p:sp>
@@ -23993,7 +23963,7 @@
     </p:spTree>
     <p:extLst>
       <p:ext uri="{BB962C8B-B14F-4D97-AF65-F5344CB8AC3E}">
-        <p14:creationId xmlns:p14="http://schemas.microsoft.com/office/powerpoint/2010/main" val="4190164459"/>
+        <p14:creationId xmlns:p14="http://schemas.microsoft.com/office/powerpoint/2010/main" val="372174365"/>
       </p:ext>
     </p:extLst>
   </p:cSld>
@@ -34335,12 +34305,70 @@
 </file>
 
 <file path=customXml/item1.xml><?xml version="1.0" encoding="utf-8"?>
-<?mso-contentType ?>
-<FormTemplates xmlns="http://schemas.microsoft.com/sharepoint/v3/contenttype/forms">
-  <Display>DocumentLibraryForm</Display>
-  <Edit>DocumentLibraryForm</Edit>
-  <New>DocumentLibraryForm</New>
-</FormTemplates>
+<p:properties xmlns:p="http://schemas.microsoft.com/office/2006/metadata/properties" xmlns:xsi="http://www.w3.org/2001/XMLSchema-instance" xmlns:pc="http://schemas.microsoft.com/office/infopath/2007/PartnerControls">
+  <documentManagement>
+    <TrackTaxHTField0 xmlns="2295e2e7-0eeb-498e-8716-217bb2ee6ee3">
+      <Terms xmlns="http://schemas.microsoft.com/office/infopath/2007/PartnerControls"/>
+    </TrackTaxHTField0>
+    <CampaignTaxHTField0 xmlns="2295e2e7-0eeb-498e-8716-217bb2ee6ee3">
+      <Terms xmlns="http://schemas.microsoft.com/office/infopath/2007/PartnerControls"/>
+    </CampaignTaxHTField0>
+    <Event_x0020_End_x0020_Date xmlns="2295e2e7-0eeb-498e-8716-217bb2ee6ee3">2012-06-29T17:00:00+10:00</Event_x0020_End_x0020_Date>
+    <Event_x0020_Start_x0020_Date xmlns="2295e2e7-0eeb-498e-8716-217bb2ee6ee3">2012-06-26T17:00:00+10:00</Event_x0020_Start_x0020_Date>
+    <MS_x0020_Speaker xmlns="2295e2e7-0eeb-498e-8716-217bb2ee6ee3">
+      <UserInfo>
+        <DisplayName/>
+        <AccountId xsi:nil="true"/>
+        <AccountType/>
+      </UserInfo>
+    </MS_x0020_Speaker>
+    <External_x0020_Speaker xmlns="2295e2e7-0eeb-498e-8716-217bb2ee6ee3" xsi:nil="true"/>
+    <Session_x0020_Code xmlns="2295e2e7-0eeb-498e-8716-217bb2ee6ee3" xsi:nil="true"/>
+    <ProductTaxHTField0 xmlns="2295e2e7-0eeb-498e-8716-217bb2ee6ee3">
+      <Terms xmlns="http://schemas.microsoft.com/office/infopath/2007/PartnerControls"/>
+    </ProductTaxHTField0>
+    <Presentation_x0020_Date xmlns="2295e2e7-0eeb-498e-8716-217bb2ee6ee3" xsi:nil="true"/>
+    <Event_x0020_LocationTaxHTField0 xmlns="2295e2e7-0eeb-498e-8716-217bb2ee6ee3">
+      <Terms xmlns="http://schemas.microsoft.com/office/infopath/2007/PartnerControls">
+        <TermInfo xmlns="http://schemas.microsoft.com/office/infopath/2007/PartnerControls">
+          <TermName xmlns="http://schemas.microsoft.com/office/infopath/2007/PartnerControls">Orlando</TermName>
+          <TermId xmlns="http://schemas.microsoft.com/office/infopath/2007/PartnerControls">99ded043-d247-43a1-9b7a-028ecd66d1eb</TermId>
+        </TermInfo>
+      </Terms>
+    </Event_x0020_LocationTaxHTField0>
+    <Event1TaxHTField0 xmlns="2295e2e7-0eeb-498e-8716-217bb2ee6ee3">
+      <Terms xmlns="http://schemas.microsoft.com/office/infopath/2007/PartnerControls">
+        <TermInfo xmlns="http://schemas.microsoft.com/office/infopath/2007/PartnerControls">
+          <TermName xmlns="http://schemas.microsoft.com/office/infopath/2007/PartnerControls">TechEd</TermName>
+          <TermId xmlns="http://schemas.microsoft.com/office/infopath/2007/PartnerControls">ac8fad57-eb30-43a8-b5bd-05dcf2cf2246</TermId>
+        </TermInfo>
+      </Terms>
+    </Event1TaxHTField0>
+    <AudienceTaxHTField0 xmlns="8b529f77-48ab-4581-b468-93f09345b8aa">
+      <Terms xmlns="http://schemas.microsoft.com/office/infopath/2007/PartnerControls"/>
+    </AudienceTaxHTField0>
+    <MS_x0020_Content_x0020_Owner xmlns="2295e2e7-0eeb-498e-8716-217bb2ee6ee3">
+      <UserInfo>
+        <DisplayName/>
+        <AccountId xsi:nil="true"/>
+        <AccountType/>
+      </UserInfo>
+    </MS_x0020_Content_x0020_Owner>
+    <TaxCatchAll xmlns="2295e2e7-0eeb-498e-8716-217bb2ee6ee3">
+      <Value>126</Value>
+      <Value>232</Value>
+      <Value>231</Value>
+    </TaxCatchAll>
+    <Event_x0020_VenueTaxHTField0 xmlns="2295e2e7-0eeb-498e-8716-217bb2ee6ee3">
+      <Terms xmlns="http://schemas.microsoft.com/office/infopath/2007/PartnerControls">
+        <TermInfo xmlns="http://schemas.microsoft.com/office/infopath/2007/PartnerControls">
+          <TermName xmlns="http://schemas.microsoft.com/office/infopath/2007/PartnerControls">Orange County Convention Center Orlando, FL</TermName>
+          <TermId xmlns="http://schemas.microsoft.com/office/infopath/2007/PartnerControls">bd993e89-aa48-4695-84e0-3b53e88b1a79</TermId>
+        </TermInfo>
+      </Terms>
+    </Event_x0020_VenueTaxHTField0>
+  </documentManagement>
+</p:properties>
 </file>
 
 <file path=customXml/item2.xml><?xml version="1.0" encoding="utf-8"?>
@@ -34623,76 +34651,27 @@
 </file>
 
 <file path=customXml/item3.xml><?xml version="1.0" encoding="utf-8"?>
-<p:properties xmlns:p="http://schemas.microsoft.com/office/2006/metadata/properties" xmlns:xsi="http://www.w3.org/2001/XMLSchema-instance" xmlns:pc="http://schemas.microsoft.com/office/infopath/2007/PartnerControls">
-  <documentManagement>
-    <TrackTaxHTField0 xmlns="2295e2e7-0eeb-498e-8716-217bb2ee6ee3">
-      <Terms xmlns="http://schemas.microsoft.com/office/infopath/2007/PartnerControls"/>
-    </TrackTaxHTField0>
-    <CampaignTaxHTField0 xmlns="2295e2e7-0eeb-498e-8716-217bb2ee6ee3">
-      <Terms xmlns="http://schemas.microsoft.com/office/infopath/2007/PartnerControls"/>
-    </CampaignTaxHTField0>
-    <Event_x0020_End_x0020_Date xmlns="2295e2e7-0eeb-498e-8716-217bb2ee6ee3">2012-06-29T17:00:00+10:00</Event_x0020_End_x0020_Date>
-    <Event_x0020_Start_x0020_Date xmlns="2295e2e7-0eeb-498e-8716-217bb2ee6ee3">2012-06-26T17:00:00+10:00</Event_x0020_Start_x0020_Date>
-    <MS_x0020_Speaker xmlns="2295e2e7-0eeb-498e-8716-217bb2ee6ee3">
-      <UserInfo>
-        <DisplayName/>
-        <AccountId xsi:nil="true"/>
-        <AccountType/>
-      </UserInfo>
-    </MS_x0020_Speaker>
-    <External_x0020_Speaker xmlns="2295e2e7-0eeb-498e-8716-217bb2ee6ee3" xsi:nil="true"/>
-    <Session_x0020_Code xmlns="2295e2e7-0eeb-498e-8716-217bb2ee6ee3" xsi:nil="true"/>
-    <ProductTaxHTField0 xmlns="2295e2e7-0eeb-498e-8716-217bb2ee6ee3">
-      <Terms xmlns="http://schemas.microsoft.com/office/infopath/2007/PartnerControls"/>
-    </ProductTaxHTField0>
-    <Presentation_x0020_Date xmlns="2295e2e7-0eeb-498e-8716-217bb2ee6ee3" xsi:nil="true"/>
-    <Event_x0020_LocationTaxHTField0 xmlns="2295e2e7-0eeb-498e-8716-217bb2ee6ee3">
-      <Terms xmlns="http://schemas.microsoft.com/office/infopath/2007/PartnerControls">
-        <TermInfo xmlns="http://schemas.microsoft.com/office/infopath/2007/PartnerControls">
-          <TermName xmlns="http://schemas.microsoft.com/office/infopath/2007/PartnerControls">Orlando</TermName>
-          <TermId xmlns="http://schemas.microsoft.com/office/infopath/2007/PartnerControls">99ded043-d247-43a1-9b7a-028ecd66d1eb</TermId>
-        </TermInfo>
-      </Terms>
-    </Event_x0020_LocationTaxHTField0>
-    <Event1TaxHTField0 xmlns="2295e2e7-0eeb-498e-8716-217bb2ee6ee3">
-      <Terms xmlns="http://schemas.microsoft.com/office/infopath/2007/PartnerControls">
-        <TermInfo xmlns="http://schemas.microsoft.com/office/infopath/2007/PartnerControls">
-          <TermName xmlns="http://schemas.microsoft.com/office/infopath/2007/PartnerControls">TechEd</TermName>
-          <TermId xmlns="http://schemas.microsoft.com/office/infopath/2007/PartnerControls">ac8fad57-eb30-43a8-b5bd-05dcf2cf2246</TermId>
-        </TermInfo>
-      </Terms>
-    </Event1TaxHTField0>
-    <AudienceTaxHTField0 xmlns="8b529f77-48ab-4581-b468-93f09345b8aa">
-      <Terms xmlns="http://schemas.microsoft.com/office/infopath/2007/PartnerControls"/>
-    </AudienceTaxHTField0>
-    <MS_x0020_Content_x0020_Owner xmlns="2295e2e7-0eeb-498e-8716-217bb2ee6ee3">
-      <UserInfo>
-        <DisplayName/>
-        <AccountId xsi:nil="true"/>
-        <AccountType/>
-      </UserInfo>
-    </MS_x0020_Content_x0020_Owner>
-    <TaxCatchAll xmlns="2295e2e7-0eeb-498e-8716-217bb2ee6ee3">
-      <Value>126</Value>
-      <Value>232</Value>
-      <Value>231</Value>
-    </TaxCatchAll>
-    <Event_x0020_VenueTaxHTField0 xmlns="2295e2e7-0eeb-498e-8716-217bb2ee6ee3">
-      <Terms xmlns="http://schemas.microsoft.com/office/infopath/2007/PartnerControls">
-        <TermInfo xmlns="http://schemas.microsoft.com/office/infopath/2007/PartnerControls">
-          <TermName xmlns="http://schemas.microsoft.com/office/infopath/2007/PartnerControls">Orange County Convention Center Orlando, FL</TermName>
-          <TermId xmlns="http://schemas.microsoft.com/office/infopath/2007/PartnerControls">bd993e89-aa48-4695-84e0-3b53e88b1a79</TermId>
-        </TermInfo>
-      </Terms>
-    </Event_x0020_VenueTaxHTField0>
-  </documentManagement>
-</p:properties>
+<?mso-contentType ?>
+<FormTemplates xmlns="http://schemas.microsoft.com/sharepoint/v3/contenttype/forms">
+  <Display>DocumentLibraryForm</Display>
+  <Edit>DocumentLibraryForm</Edit>
+  <New>DocumentLibraryForm</New>
+</FormTemplates>
 </file>
 
 <file path=customXml/itemProps1.xml><?xml version="1.0" encoding="utf-8"?>
-<ds:datastoreItem xmlns:ds="http://schemas.openxmlformats.org/officeDocument/2006/customXml" ds:itemID="{EF1FE425-EA36-4D8C-A967-84CE3BED24D2}">
+<ds:datastoreItem xmlns:ds="http://schemas.openxmlformats.org/officeDocument/2006/customXml" ds:itemID="{76D92E10-3D8B-4831-9584-7BC82972C8E2}">
   <ds:schemaRefs>
-    <ds:schemaRef ds:uri="http://schemas.microsoft.com/sharepoint/v3/contenttype/forms"/>
+    <ds:schemaRef ds:uri="http://schemas.microsoft.com/office/2006/documentManagement/types"/>
+    <ds:schemaRef ds:uri="http://purl.org/dc/terms/"/>
+    <ds:schemaRef ds:uri="http://schemas.microsoft.com/office/2006/metadata/properties"/>
+    <ds:schemaRef ds:uri="http://schemas.openxmlformats.org/package/2006/metadata/core-properties"/>
+    <ds:schemaRef ds:uri="http://www.w3.org/XML/1998/namespace"/>
+    <ds:schemaRef ds:uri="http://schemas.microsoft.com/office/infopath/2007/PartnerControls"/>
+    <ds:schemaRef ds:uri="http://purl.org/dc/elements/1.1/"/>
+    <ds:schemaRef ds:uri="8b529f77-48ab-4581-b468-93f09345b8aa"/>
+    <ds:schemaRef ds:uri="2295e2e7-0eeb-498e-8716-217bb2ee6ee3"/>
+    <ds:schemaRef ds:uri="http://purl.org/dc/dcmitype/"/>
   </ds:schemaRefs>
 </ds:datastoreItem>
 </file>
@@ -34717,18 +34696,9 @@
 </file>
 
 <file path=customXml/itemProps3.xml><?xml version="1.0" encoding="utf-8"?>
-<ds:datastoreItem xmlns:ds="http://schemas.openxmlformats.org/officeDocument/2006/customXml" ds:itemID="{76D92E10-3D8B-4831-9584-7BC82972C8E2}">
+<ds:datastoreItem xmlns:ds="http://schemas.openxmlformats.org/officeDocument/2006/customXml" ds:itemID="{EF1FE425-EA36-4D8C-A967-84CE3BED24D2}">
   <ds:schemaRefs>
-    <ds:schemaRef ds:uri="http://schemas.microsoft.com/office/2006/documentManagement/types"/>
-    <ds:schemaRef ds:uri="http://purl.org/dc/terms/"/>
-    <ds:schemaRef ds:uri="http://schemas.microsoft.com/office/2006/metadata/properties"/>
-    <ds:schemaRef ds:uri="http://schemas.openxmlformats.org/package/2006/metadata/core-properties"/>
-    <ds:schemaRef ds:uri="http://www.w3.org/XML/1998/namespace"/>
-    <ds:schemaRef ds:uri="http://schemas.microsoft.com/office/infopath/2007/PartnerControls"/>
-    <ds:schemaRef ds:uri="http://purl.org/dc/elements/1.1/"/>
-    <ds:schemaRef ds:uri="8b529f77-48ab-4581-b468-93f09345b8aa"/>
-    <ds:schemaRef ds:uri="2295e2e7-0eeb-498e-8716-217bb2ee6ee3"/>
-    <ds:schemaRef ds:uri="http://purl.org/dc/dcmitype/"/>
+    <ds:schemaRef ds:uri="http://schemas.microsoft.com/sharepoint/v3/contenttype/forms"/>
   </ds:schemaRefs>
 </ds:datastoreItem>
 </file>
</xml_diff>

<commit_message>
updated and cleaned up the doc and the code fragments for the zip addition
</commit_message>
<xml_diff>
--- a/slides/DEV350 Using Windows Runtime and SDK to build Metro style Apps.pptx
+++ b/slides/DEV350 Using Windows Runtime and SDK to build Metro style Apps.pptx
@@ -28,7 +28,7 @@
     <p:sldId id="341" r:id="rId19"/>
     <p:sldId id="342" r:id="rId20"/>
     <p:sldId id="266" r:id="rId21"/>
-    <p:sldId id="345" r:id="rId22"/>
+    <p:sldId id="343" r:id="rId22"/>
     <p:sldId id="311" r:id="rId23"/>
     <p:sldId id="312" r:id="rId24"/>
     <p:sldId id="313" r:id="rId25"/>
@@ -943,7 +943,11 @@
         <a:p>
           <a:r>
             <a:rPr lang="en-US" dirty="0" smtClean="0"/>
-            <a:t>JavaScript</a:t>
+            <a:t>JavaScript </a:t>
+          </a:r>
+          <a:r>
+            <a:rPr lang="en-US" smtClean="0"/>
+            <a:t>[Chakra]</a:t>
           </a:r>
           <a:endParaRPr lang="en-US" dirty="0"/>
         </a:p>
@@ -1489,7 +1493,11 @@
           </a:pPr>
           <a:r>
             <a:rPr lang="en-US" sz="1700" kern="1200" dirty="0" smtClean="0"/>
-            <a:t>JavaScript</a:t>
+            <a:t>JavaScript </a:t>
+          </a:r>
+          <a:r>
+            <a:rPr lang="en-US" sz="1700" kern="1200" smtClean="0"/>
+            <a:t>[Chakra]</a:t>
           </a:r>
           <a:endParaRPr lang="en-US" sz="1700" kern="1200" dirty="0"/>
         </a:p>
@@ -3217,7 +3225,7 @@
                 <a:latin typeface="Segoe UI" pitchFamily="34" charset="0"/>
               </a:rPr>
               <a:pPr/>
-              <a:t>6/8/2012</a:t>
+              <a:t>6/11/2012</a:t>
             </a:fld>
             <a:endParaRPr lang="en-US" dirty="0">
               <a:solidFill>
@@ -3467,7 +3475,7 @@
             <a:fld id="{7C3FBCD4-166E-446F-AF18-7D4A0CF9AEF6}" type="datetimeFigureOut">
               <a:rPr lang="en-US" smtClean="0"/>
               <a:pPr/>
-              <a:t>6/8/2012</a:t>
+              <a:t>6/11/2012</a:t>
             </a:fld>
             <a:endParaRPr lang="en-US" dirty="0"/>
           </a:p>
@@ -3916,7 +3924,7 @@
             <a:fld id="{81331B57-0BE5-4F82-AA58-76F53EFF3ADA}" type="datetime8">
               <a:rPr lang="en-US" smtClean="0"/>
               <a:pPr/>
-              <a:t>6/8/2012 12:22 PM</a:t>
+              <a:t>6/11/2012 2:10 PM</a:t>
             </a:fld>
             <a:endParaRPr lang="en-US" dirty="0"/>
           </a:p>
@@ -4116,7 +4124,7 @@
             <a:fld id="{81331B57-0BE5-4F82-AA58-76F53EFF3ADA}" type="datetime8">
               <a:rPr lang="en-US" smtClean="0"/>
               <a:pPr/>
-              <a:t>6/8/2012 12:22 PM</a:t>
+              <a:t>6/11/2012 2:10 PM</a:t>
             </a:fld>
             <a:endParaRPr lang="en-US" dirty="0"/>
           </a:p>
@@ -4316,7 +4324,7 @@
             <a:fld id="{81331B57-0BE5-4F82-AA58-76F53EFF3ADA}" type="datetime8">
               <a:rPr lang="en-US" smtClean="0"/>
               <a:pPr/>
-              <a:t>6/8/2012 12:22 PM</a:t>
+              <a:t>6/11/2012 2:10 PM</a:t>
             </a:fld>
             <a:endParaRPr lang="en-US"/>
           </a:p>
@@ -4988,7 +4996,7 @@
             <a:fld id="{81331B57-0BE5-4F82-AA58-76F53EFF3ADA}" type="datetime8">
               <a:rPr lang="en-US" smtClean="0"/>
               <a:pPr/>
-              <a:t>6/8/2012 12:22 PM</a:t>
+              <a:t>6/11/2012 2:10 PM</a:t>
             </a:fld>
             <a:endParaRPr lang="en-US"/>
           </a:p>
@@ -20758,7 +20766,7 @@
           <p:nvPr>
             <p:extLst>
               <p:ext uri="{D42A27DB-BD31-4B8C-83A1-F6EECF244321}">
-                <p14:modId xmlns:p14="http://schemas.microsoft.com/office/powerpoint/2010/main" val="2089385679"/>
+                <p14:modId xmlns:p14="http://schemas.microsoft.com/office/powerpoint/2010/main" val="918110536"/>
               </p:ext>
             </p:extLst>
           </p:nvPr>
@@ -20970,7 +20978,7 @@
           </a:fontRef>
         </p:style>
         <p:txBody>
-          <a:bodyPr vert="horz" wrap="square" lIns="91436" tIns="548640" rIns="91436" bIns="45718" numCol="1" rtlCol="0" anchor="t" anchorCtr="0" compatLnSpc="1">
+          <a:bodyPr vert="horz" wrap="square" lIns="91436" tIns="822960" rIns="91436" bIns="45718" numCol="1" rtlCol="0" anchor="t" anchorCtr="0" compatLnSpc="1">
             <a:prstTxWarp prst="textNoShape">
               <a:avLst/>
             </a:prstTxWarp>
@@ -21044,7 +21052,7 @@
           </a:fontRef>
         </p:style>
         <p:txBody>
-          <a:bodyPr vert="horz" wrap="square" lIns="91436" tIns="548640" rIns="91436" bIns="45718" numCol="1" rtlCol="0" anchor="t" anchorCtr="0" compatLnSpc="1">
+          <a:bodyPr vert="horz" wrap="square" lIns="91436" tIns="822960" rIns="91436" bIns="45718" numCol="1" rtlCol="0" anchor="t" anchorCtr="0" compatLnSpc="1">
             <a:prstTxWarp prst="textNoShape">
               <a:avLst/>
             </a:prstTxWarp>
@@ -21065,7 +21073,7 @@
                   <a:schemeClr val="bg1"/>
                 </a:solidFill>
               </a:rPr>
-              <a:t>Apps </a:t>
+              <a:t>Rich apps that use all of </a:t>
             </a:r>
             <a:r>
               <a:rPr lang="en-US" sz="2400" dirty="0" smtClean="0">
@@ -21073,15 +21081,7 @@
                   <a:schemeClr val="bg1"/>
                 </a:solidFill>
               </a:rPr>
-              <a:t>that use all </a:t>
-            </a:r>
-            <a:r>
-              <a:rPr lang="en-US" sz="2400" dirty="0" smtClean="0">
-                <a:solidFill>
-                  <a:schemeClr val="bg1"/>
-                </a:solidFill>
-              </a:rPr>
-              <a:t>the richness of Windows</a:t>
+              <a:t>Windows</a:t>
             </a:r>
             <a:endParaRPr lang="en-US" sz="2400" dirty="0">
               <a:solidFill>
@@ -21130,7 +21130,7 @@
           </a:fontRef>
         </p:style>
         <p:txBody>
-          <a:bodyPr vert="horz" wrap="square" lIns="91436" tIns="548640" rIns="91436" bIns="45718" numCol="1" rtlCol="0" anchor="t" anchorCtr="0" compatLnSpc="1">
+          <a:bodyPr vert="horz" wrap="square" lIns="91436" tIns="822960" rIns="91436" bIns="45718" numCol="1" rtlCol="0" anchor="t" anchorCtr="0" compatLnSpc="1">
             <a:prstTxWarp prst="textNoShape">
               <a:avLst/>
             </a:prstTxWarp>
@@ -21712,15 +21712,15 @@
       </p:grpSp>
       <p:grpSp>
         <p:nvGrpSpPr>
-          <p:cNvPr id="13" name="Group 12"/>
+          <p:cNvPr id="11" name="Group 10"/>
           <p:cNvGrpSpPr/>
           <p:nvPr/>
         </p:nvGrpSpPr>
         <p:grpSpPr>
           <a:xfrm>
-            <a:off x="8031174" y="1124744"/>
+            <a:off x="8034901" y="1124744"/>
             <a:ext cx="3244087" cy="2767599"/>
-            <a:chOff x="8031174" y="1124744"/>
+            <a:chOff x="8034901" y="1124744"/>
             <a:chExt cx="3244087" cy="2767599"/>
           </a:xfrm>
         </p:grpSpPr>
@@ -21732,7 +21732,7 @@
           </p:nvSpPr>
           <p:spPr bwMode="auto">
             <a:xfrm>
-              <a:off x="8031174" y="2132856"/>
+              <a:off x="8038627" y="1124744"/>
               <a:ext cx="3240361" cy="767858"/>
             </a:xfrm>
             <a:prstGeom prst="rect">
@@ -21795,7 +21795,7 @@
           </p:nvSpPr>
           <p:spPr bwMode="auto">
             <a:xfrm>
-              <a:off x="8031174" y="1124744"/>
+              <a:off x="8038628" y="2125282"/>
               <a:ext cx="3240360" cy="767858"/>
             </a:xfrm>
             <a:prstGeom prst="rect">
@@ -21858,7 +21858,7 @@
           </p:nvSpPr>
           <p:spPr bwMode="auto">
             <a:xfrm>
-              <a:off x="8031174" y="3112370"/>
+              <a:off x="8034901" y="3112370"/>
               <a:ext cx="3244087" cy="779973"/>
             </a:xfrm>
             <a:prstGeom prst="rect">
@@ -22264,7 +22264,7 @@
                                           </p:stCondLst>
                                         </p:cTn>
                                         <p:tgtEl>
-                                          <p:spTgt spid="13"/>
+                                          <p:spTgt spid="11"/>
                                         </p:tgtEl>
                                         <p:attrNameLst>
                                           <p:attrName>style.visibility</p:attrName>
@@ -22435,7 +22435,7 @@
           </a:fontRef>
         </p:style>
         <p:txBody>
-          <a:bodyPr vert="horz" wrap="square" lIns="91436" tIns="548640" rIns="91436" bIns="45718" numCol="1" rtlCol="0" anchor="t" anchorCtr="0" compatLnSpc="1">
+          <a:bodyPr vert="horz" wrap="square" lIns="91436" tIns="822960" rIns="91436" bIns="45718" numCol="1" rtlCol="0" anchor="t" anchorCtr="0" compatLnSpc="1">
             <a:prstTxWarp prst="textNoShape">
               <a:avLst/>
             </a:prstTxWarp>
@@ -22456,7 +22456,15 @@
                   <a:schemeClr val="bg1"/>
                 </a:solidFill>
               </a:rPr>
-              <a:t>Apps that use all the richness of Windows</a:t>
+              <a:t>Rich apps that use all of </a:t>
+            </a:r>
+            <a:r>
+              <a:rPr lang="en-US" sz="2400" dirty="0" smtClean="0">
+                <a:solidFill>
+                  <a:schemeClr val="bg1"/>
+                </a:solidFill>
+              </a:rPr>
+              <a:t>Windows</a:t>
             </a:r>
             <a:endParaRPr lang="en-US" sz="2400" dirty="0">
               <a:solidFill>
@@ -23707,7 +23715,7 @@
           </a:fontRef>
         </p:style>
         <p:txBody>
-          <a:bodyPr vert="horz" wrap="square" lIns="91436" tIns="548640" rIns="91436" bIns="45718" numCol="1" rtlCol="0" anchor="t" anchorCtr="0" compatLnSpc="1">
+          <a:bodyPr vert="horz" wrap="square" lIns="91436" tIns="822960" rIns="91436" bIns="45718" numCol="1" rtlCol="0" anchor="t" anchorCtr="0" compatLnSpc="1">
             <a:prstTxWarp prst="textNoShape">
               <a:avLst/>
             </a:prstTxWarp>
@@ -23781,7 +23789,7 @@
           </a:fontRef>
         </p:style>
         <p:txBody>
-          <a:bodyPr vert="horz" wrap="square" lIns="91436" tIns="548640" rIns="91436" bIns="45718" numCol="1" rtlCol="0" anchor="t" anchorCtr="0" compatLnSpc="1">
+          <a:bodyPr vert="horz" wrap="square" lIns="91436" tIns="822960" rIns="91436" bIns="45718" numCol="1" rtlCol="0" anchor="t" anchorCtr="0" compatLnSpc="1">
             <a:prstTxWarp prst="textNoShape">
               <a:avLst/>
             </a:prstTxWarp>
@@ -23802,7 +23810,7 @@
                   <a:schemeClr val="bg1"/>
                 </a:solidFill>
               </a:rPr>
-              <a:t>Apps </a:t>
+              <a:t>Rich apps that use all of </a:t>
             </a:r>
             <a:r>
               <a:rPr lang="en-US" sz="2400" dirty="0" smtClean="0">
@@ -23810,15 +23818,7 @@
                   <a:schemeClr val="bg1"/>
                 </a:solidFill>
               </a:rPr>
-              <a:t>that use all </a:t>
-            </a:r>
-            <a:r>
-              <a:rPr lang="en-US" sz="2400" dirty="0" smtClean="0">
-                <a:solidFill>
-                  <a:schemeClr val="bg1"/>
-                </a:solidFill>
-              </a:rPr>
-              <a:t>the richness of Windows</a:t>
+              <a:t>Windows</a:t>
             </a:r>
             <a:endParaRPr lang="en-US" sz="2400" dirty="0">
               <a:solidFill>
@@ -23867,7 +23867,7 @@
           </a:fontRef>
         </p:style>
         <p:txBody>
-          <a:bodyPr vert="horz" wrap="square" lIns="91436" tIns="548640" rIns="91436" bIns="45718" numCol="1" rtlCol="0" anchor="t" anchorCtr="0" compatLnSpc="1">
+          <a:bodyPr vert="horz" wrap="square" lIns="91436" tIns="822960" rIns="91436" bIns="45718" numCol="1" rtlCol="0" anchor="t" anchorCtr="0" compatLnSpc="1">
             <a:prstTxWarp prst="textNoShape">
               <a:avLst/>
             </a:prstTxWarp>
@@ -23963,7 +23963,7 @@
     </p:spTree>
     <p:extLst>
       <p:ext uri="{BB962C8B-B14F-4D97-AF65-F5344CB8AC3E}">
-        <p14:creationId xmlns:p14="http://schemas.microsoft.com/office/powerpoint/2010/main" val="372174365"/>
+        <p14:creationId xmlns:p14="http://schemas.microsoft.com/office/powerpoint/2010/main" val="4190164459"/>
       </p:ext>
     </p:extLst>
   </p:cSld>
@@ -25606,7 +25606,7 @@
                   </a:schemeClr>
                 </a:solidFill>
               </a:rPr>
-              <a:t>Resource 1</a:t>
+              <a:t>Download the PDF for this talk!</a:t>
             </a:r>
             <a:endParaRPr lang="en-US" sz="2400" dirty="0">
               <a:solidFill>
@@ -25836,147 +25836,6 @@
               <a:ea typeface="Segoe UI" pitchFamily="34" charset="0"/>
               <a:cs typeface="Segoe UI" pitchFamily="34" charset="0"/>
             </a:endParaRPr>
-          </a:p>
-        </p:txBody>
-      </p:sp>
-      <p:sp>
-        <p:nvSpPr>
-          <p:cNvPr id="12" name="Rectangle 11"/>
-          <p:cNvSpPr/>
-          <p:nvPr/>
-        </p:nvSpPr>
-        <p:spPr bwMode="auto">
-          <a:xfrm>
-            <a:off x="9218612" y="115512"/>
-            <a:ext cx="2854754" cy="2462213"/>
-          </a:xfrm>
-          <a:prstGeom prst="rect">
-            <a:avLst/>
-          </a:prstGeom>
-          <a:solidFill>
-            <a:schemeClr val="accent5"/>
-          </a:solidFill>
-          <a:ln>
-            <a:noFill/>
-            <a:headEnd type="none" w="med" len="med"/>
-            <a:tailEnd type="none" w="med" len="med"/>
-          </a:ln>
-          <a:effectLst/>
-          <a:scene3d>
-            <a:camera prst="orthographicFront" fov="0">
-              <a:rot lat="0" lon="0" rev="0"/>
-            </a:camera>
-            <a:lightRig rig="soft" dir="tl">
-              <a:rot lat="0" lon="0" rev="20000000"/>
-            </a:lightRig>
-          </a:scene3d>
-          <a:sp3d prstMaterial="matte"/>
-        </p:spPr>
-        <p:style>
-          <a:lnRef idx="0">
-            <a:schemeClr val="accent2"/>
-          </a:lnRef>
-          <a:fillRef idx="3">
-            <a:schemeClr val="accent2"/>
-          </a:fillRef>
-          <a:effectRef idx="3">
-            <a:schemeClr val="accent2"/>
-          </a:effectRef>
-          <a:fontRef idx="minor">
-            <a:schemeClr val="lt1"/>
-          </a:fontRef>
-        </p:style>
-        <p:txBody>
-          <a:bodyPr vert="horz" wrap="square" lIns="91436" tIns="137160" rIns="91436" bIns="137160" numCol="1" rtlCol="0" anchor="t" anchorCtr="0" compatLnSpc="1">
-            <a:prstTxWarp prst="textNoShape">
-              <a:avLst/>
-            </a:prstTxWarp>
-            <a:spAutoFit/>
-          </a:bodyPr>
-          <a:lstStyle/>
-          <a:p>
-            <a:pPr defTabSz="914099" fontAlgn="base">
-              <a:spcBef>
-                <a:spcPct val="0"/>
-              </a:spcBef>
-              <a:spcAft>
-                <a:spcPct val="0"/>
-              </a:spcAft>
-            </a:pPr>
-            <a:r>
-              <a:rPr lang="en-US" sz="2800" b="1" dirty="0">
-                <a:solidFill>
-                  <a:schemeClr val="tx1">
-                    <a:alpha val="99000"/>
-                  </a:schemeClr>
-                </a:solidFill>
-              </a:rPr>
-              <a:t>Required Slide </a:t>
-            </a:r>
-            <a:endParaRPr lang="en-US" sz="2800" b="1" dirty="0" smtClean="0">
-              <a:solidFill>
-                <a:schemeClr val="tx1">
-                  <a:alpha val="99000"/>
-                </a:schemeClr>
-              </a:solidFill>
-            </a:endParaRPr>
-          </a:p>
-          <a:p>
-            <a:pPr lvl="0" defTabSz="914099" fontAlgn="base">
-              <a:spcBef>
-                <a:spcPct val="0"/>
-              </a:spcBef>
-              <a:spcAft>
-                <a:spcPct val="0"/>
-              </a:spcAft>
-            </a:pPr>
-            <a:r>
-              <a:rPr lang="en-US" sz="1200" dirty="0">
-                <a:solidFill>
-                  <a:srgbClr val="FFFFFF">
-                    <a:alpha val="99000"/>
-                  </a:srgbClr>
-                </a:solidFill>
-              </a:rPr>
-              <a:t>*delete this box when your slide is finalized</a:t>
-            </a:r>
-          </a:p>
-          <a:p>
-            <a:pPr defTabSz="914099" fontAlgn="base">
-              <a:spcBef>
-                <a:spcPct val="0"/>
-              </a:spcBef>
-              <a:spcAft>
-                <a:spcPct val="0"/>
-              </a:spcAft>
-            </a:pPr>
-            <a:endParaRPr lang="en-US" dirty="0">
-              <a:solidFill>
-                <a:schemeClr val="tx1">
-                  <a:alpha val="99000"/>
-                </a:schemeClr>
-              </a:solidFill>
-            </a:endParaRPr>
-          </a:p>
-          <a:p>
-            <a:pPr defTabSz="914099" fontAlgn="base">
-              <a:spcBef>
-                <a:spcPct val="0"/>
-              </a:spcBef>
-              <a:spcAft>
-                <a:spcPct val="0"/>
-              </a:spcAft>
-            </a:pPr>
-            <a:r>
-              <a:rPr lang="en-US" dirty="0">
-                <a:solidFill>
-                  <a:schemeClr val="tx1">
-                    <a:alpha val="99000"/>
-                  </a:schemeClr>
-                </a:solidFill>
-              </a:rPr>
-              <a:t>Track PMs will supply the content for this slide, which will be inserted during the final scrub. </a:t>
-            </a:r>
           </a:p>
         </p:txBody>
       </p:sp>
@@ -34305,70 +34164,12 @@
 </file>
 
 <file path=customXml/item1.xml><?xml version="1.0" encoding="utf-8"?>
-<p:properties xmlns:p="http://schemas.microsoft.com/office/2006/metadata/properties" xmlns:xsi="http://www.w3.org/2001/XMLSchema-instance" xmlns:pc="http://schemas.microsoft.com/office/infopath/2007/PartnerControls">
-  <documentManagement>
-    <TrackTaxHTField0 xmlns="2295e2e7-0eeb-498e-8716-217bb2ee6ee3">
-      <Terms xmlns="http://schemas.microsoft.com/office/infopath/2007/PartnerControls"/>
-    </TrackTaxHTField0>
-    <CampaignTaxHTField0 xmlns="2295e2e7-0eeb-498e-8716-217bb2ee6ee3">
-      <Terms xmlns="http://schemas.microsoft.com/office/infopath/2007/PartnerControls"/>
-    </CampaignTaxHTField0>
-    <Event_x0020_End_x0020_Date xmlns="2295e2e7-0eeb-498e-8716-217bb2ee6ee3">2012-06-29T17:00:00+10:00</Event_x0020_End_x0020_Date>
-    <Event_x0020_Start_x0020_Date xmlns="2295e2e7-0eeb-498e-8716-217bb2ee6ee3">2012-06-26T17:00:00+10:00</Event_x0020_Start_x0020_Date>
-    <MS_x0020_Speaker xmlns="2295e2e7-0eeb-498e-8716-217bb2ee6ee3">
-      <UserInfo>
-        <DisplayName/>
-        <AccountId xsi:nil="true"/>
-        <AccountType/>
-      </UserInfo>
-    </MS_x0020_Speaker>
-    <External_x0020_Speaker xmlns="2295e2e7-0eeb-498e-8716-217bb2ee6ee3" xsi:nil="true"/>
-    <Session_x0020_Code xmlns="2295e2e7-0eeb-498e-8716-217bb2ee6ee3" xsi:nil="true"/>
-    <ProductTaxHTField0 xmlns="2295e2e7-0eeb-498e-8716-217bb2ee6ee3">
-      <Terms xmlns="http://schemas.microsoft.com/office/infopath/2007/PartnerControls"/>
-    </ProductTaxHTField0>
-    <Presentation_x0020_Date xmlns="2295e2e7-0eeb-498e-8716-217bb2ee6ee3" xsi:nil="true"/>
-    <Event_x0020_LocationTaxHTField0 xmlns="2295e2e7-0eeb-498e-8716-217bb2ee6ee3">
-      <Terms xmlns="http://schemas.microsoft.com/office/infopath/2007/PartnerControls">
-        <TermInfo xmlns="http://schemas.microsoft.com/office/infopath/2007/PartnerControls">
-          <TermName xmlns="http://schemas.microsoft.com/office/infopath/2007/PartnerControls">Orlando</TermName>
-          <TermId xmlns="http://schemas.microsoft.com/office/infopath/2007/PartnerControls">99ded043-d247-43a1-9b7a-028ecd66d1eb</TermId>
-        </TermInfo>
-      </Terms>
-    </Event_x0020_LocationTaxHTField0>
-    <Event1TaxHTField0 xmlns="2295e2e7-0eeb-498e-8716-217bb2ee6ee3">
-      <Terms xmlns="http://schemas.microsoft.com/office/infopath/2007/PartnerControls">
-        <TermInfo xmlns="http://schemas.microsoft.com/office/infopath/2007/PartnerControls">
-          <TermName xmlns="http://schemas.microsoft.com/office/infopath/2007/PartnerControls">TechEd</TermName>
-          <TermId xmlns="http://schemas.microsoft.com/office/infopath/2007/PartnerControls">ac8fad57-eb30-43a8-b5bd-05dcf2cf2246</TermId>
-        </TermInfo>
-      </Terms>
-    </Event1TaxHTField0>
-    <AudienceTaxHTField0 xmlns="8b529f77-48ab-4581-b468-93f09345b8aa">
-      <Terms xmlns="http://schemas.microsoft.com/office/infopath/2007/PartnerControls"/>
-    </AudienceTaxHTField0>
-    <MS_x0020_Content_x0020_Owner xmlns="2295e2e7-0eeb-498e-8716-217bb2ee6ee3">
-      <UserInfo>
-        <DisplayName/>
-        <AccountId xsi:nil="true"/>
-        <AccountType/>
-      </UserInfo>
-    </MS_x0020_Content_x0020_Owner>
-    <TaxCatchAll xmlns="2295e2e7-0eeb-498e-8716-217bb2ee6ee3">
-      <Value>126</Value>
-      <Value>232</Value>
-      <Value>231</Value>
-    </TaxCatchAll>
-    <Event_x0020_VenueTaxHTField0 xmlns="2295e2e7-0eeb-498e-8716-217bb2ee6ee3">
-      <Terms xmlns="http://schemas.microsoft.com/office/infopath/2007/PartnerControls">
-        <TermInfo xmlns="http://schemas.microsoft.com/office/infopath/2007/PartnerControls">
-          <TermName xmlns="http://schemas.microsoft.com/office/infopath/2007/PartnerControls">Orange County Convention Center Orlando, FL</TermName>
-          <TermId xmlns="http://schemas.microsoft.com/office/infopath/2007/PartnerControls">bd993e89-aa48-4695-84e0-3b53e88b1a79</TermId>
-        </TermInfo>
-      </Terms>
-    </Event_x0020_VenueTaxHTField0>
-  </documentManagement>
-</p:properties>
+<?mso-contentType ?>
+<FormTemplates xmlns="http://schemas.microsoft.com/sharepoint/v3/contenttype/forms">
+  <Display>DocumentLibraryForm</Display>
+  <Edit>DocumentLibraryForm</Edit>
+  <New>DocumentLibraryForm</New>
+</FormTemplates>
 </file>
 
 <file path=customXml/item2.xml><?xml version="1.0" encoding="utf-8"?>
@@ -34651,27 +34452,76 @@
 </file>
 
 <file path=customXml/item3.xml><?xml version="1.0" encoding="utf-8"?>
-<?mso-contentType ?>
-<FormTemplates xmlns="http://schemas.microsoft.com/sharepoint/v3/contenttype/forms">
-  <Display>DocumentLibraryForm</Display>
-  <Edit>DocumentLibraryForm</Edit>
-  <New>DocumentLibraryForm</New>
-</FormTemplates>
+<p:properties xmlns:p="http://schemas.microsoft.com/office/2006/metadata/properties" xmlns:xsi="http://www.w3.org/2001/XMLSchema-instance" xmlns:pc="http://schemas.microsoft.com/office/infopath/2007/PartnerControls">
+  <documentManagement>
+    <TrackTaxHTField0 xmlns="2295e2e7-0eeb-498e-8716-217bb2ee6ee3">
+      <Terms xmlns="http://schemas.microsoft.com/office/infopath/2007/PartnerControls"/>
+    </TrackTaxHTField0>
+    <CampaignTaxHTField0 xmlns="2295e2e7-0eeb-498e-8716-217bb2ee6ee3">
+      <Terms xmlns="http://schemas.microsoft.com/office/infopath/2007/PartnerControls"/>
+    </CampaignTaxHTField0>
+    <Event_x0020_End_x0020_Date xmlns="2295e2e7-0eeb-498e-8716-217bb2ee6ee3">2012-06-29T17:00:00+10:00</Event_x0020_End_x0020_Date>
+    <Event_x0020_Start_x0020_Date xmlns="2295e2e7-0eeb-498e-8716-217bb2ee6ee3">2012-06-26T17:00:00+10:00</Event_x0020_Start_x0020_Date>
+    <MS_x0020_Speaker xmlns="2295e2e7-0eeb-498e-8716-217bb2ee6ee3">
+      <UserInfo>
+        <DisplayName/>
+        <AccountId xsi:nil="true"/>
+        <AccountType/>
+      </UserInfo>
+    </MS_x0020_Speaker>
+    <External_x0020_Speaker xmlns="2295e2e7-0eeb-498e-8716-217bb2ee6ee3" xsi:nil="true"/>
+    <Session_x0020_Code xmlns="2295e2e7-0eeb-498e-8716-217bb2ee6ee3" xsi:nil="true"/>
+    <ProductTaxHTField0 xmlns="2295e2e7-0eeb-498e-8716-217bb2ee6ee3">
+      <Terms xmlns="http://schemas.microsoft.com/office/infopath/2007/PartnerControls"/>
+    </ProductTaxHTField0>
+    <Presentation_x0020_Date xmlns="2295e2e7-0eeb-498e-8716-217bb2ee6ee3" xsi:nil="true"/>
+    <Event_x0020_LocationTaxHTField0 xmlns="2295e2e7-0eeb-498e-8716-217bb2ee6ee3">
+      <Terms xmlns="http://schemas.microsoft.com/office/infopath/2007/PartnerControls">
+        <TermInfo xmlns="http://schemas.microsoft.com/office/infopath/2007/PartnerControls">
+          <TermName xmlns="http://schemas.microsoft.com/office/infopath/2007/PartnerControls">Orlando</TermName>
+          <TermId xmlns="http://schemas.microsoft.com/office/infopath/2007/PartnerControls">99ded043-d247-43a1-9b7a-028ecd66d1eb</TermId>
+        </TermInfo>
+      </Terms>
+    </Event_x0020_LocationTaxHTField0>
+    <Event1TaxHTField0 xmlns="2295e2e7-0eeb-498e-8716-217bb2ee6ee3">
+      <Terms xmlns="http://schemas.microsoft.com/office/infopath/2007/PartnerControls">
+        <TermInfo xmlns="http://schemas.microsoft.com/office/infopath/2007/PartnerControls">
+          <TermName xmlns="http://schemas.microsoft.com/office/infopath/2007/PartnerControls">TechEd</TermName>
+          <TermId xmlns="http://schemas.microsoft.com/office/infopath/2007/PartnerControls">ac8fad57-eb30-43a8-b5bd-05dcf2cf2246</TermId>
+        </TermInfo>
+      </Terms>
+    </Event1TaxHTField0>
+    <AudienceTaxHTField0 xmlns="8b529f77-48ab-4581-b468-93f09345b8aa">
+      <Terms xmlns="http://schemas.microsoft.com/office/infopath/2007/PartnerControls"/>
+    </AudienceTaxHTField0>
+    <MS_x0020_Content_x0020_Owner xmlns="2295e2e7-0eeb-498e-8716-217bb2ee6ee3">
+      <UserInfo>
+        <DisplayName/>
+        <AccountId xsi:nil="true"/>
+        <AccountType/>
+      </UserInfo>
+    </MS_x0020_Content_x0020_Owner>
+    <TaxCatchAll xmlns="2295e2e7-0eeb-498e-8716-217bb2ee6ee3">
+      <Value>126</Value>
+      <Value>232</Value>
+      <Value>231</Value>
+    </TaxCatchAll>
+    <Event_x0020_VenueTaxHTField0 xmlns="2295e2e7-0eeb-498e-8716-217bb2ee6ee3">
+      <Terms xmlns="http://schemas.microsoft.com/office/infopath/2007/PartnerControls">
+        <TermInfo xmlns="http://schemas.microsoft.com/office/infopath/2007/PartnerControls">
+          <TermName xmlns="http://schemas.microsoft.com/office/infopath/2007/PartnerControls">Orange County Convention Center Orlando, FL</TermName>
+          <TermId xmlns="http://schemas.microsoft.com/office/infopath/2007/PartnerControls">bd993e89-aa48-4695-84e0-3b53e88b1a79</TermId>
+        </TermInfo>
+      </Terms>
+    </Event_x0020_VenueTaxHTField0>
+  </documentManagement>
+</p:properties>
 </file>
 
 <file path=customXml/itemProps1.xml><?xml version="1.0" encoding="utf-8"?>
-<ds:datastoreItem xmlns:ds="http://schemas.openxmlformats.org/officeDocument/2006/customXml" ds:itemID="{76D92E10-3D8B-4831-9584-7BC82972C8E2}">
+<ds:datastoreItem xmlns:ds="http://schemas.openxmlformats.org/officeDocument/2006/customXml" ds:itemID="{EF1FE425-EA36-4D8C-A967-84CE3BED24D2}">
   <ds:schemaRefs>
-    <ds:schemaRef ds:uri="http://schemas.microsoft.com/office/2006/documentManagement/types"/>
-    <ds:schemaRef ds:uri="http://purl.org/dc/terms/"/>
-    <ds:schemaRef ds:uri="http://schemas.microsoft.com/office/2006/metadata/properties"/>
-    <ds:schemaRef ds:uri="http://schemas.openxmlformats.org/package/2006/metadata/core-properties"/>
-    <ds:schemaRef ds:uri="http://www.w3.org/XML/1998/namespace"/>
-    <ds:schemaRef ds:uri="http://schemas.microsoft.com/office/infopath/2007/PartnerControls"/>
-    <ds:schemaRef ds:uri="http://purl.org/dc/elements/1.1/"/>
-    <ds:schemaRef ds:uri="8b529f77-48ab-4581-b468-93f09345b8aa"/>
-    <ds:schemaRef ds:uri="2295e2e7-0eeb-498e-8716-217bb2ee6ee3"/>
-    <ds:schemaRef ds:uri="http://purl.org/dc/dcmitype/"/>
+    <ds:schemaRef ds:uri="http://schemas.microsoft.com/sharepoint/v3/contenttype/forms"/>
   </ds:schemaRefs>
 </ds:datastoreItem>
 </file>
@@ -34696,9 +34546,18 @@
 </file>
 
 <file path=customXml/itemProps3.xml><?xml version="1.0" encoding="utf-8"?>
-<ds:datastoreItem xmlns:ds="http://schemas.openxmlformats.org/officeDocument/2006/customXml" ds:itemID="{EF1FE425-EA36-4D8C-A967-84CE3BED24D2}">
+<ds:datastoreItem xmlns:ds="http://schemas.openxmlformats.org/officeDocument/2006/customXml" ds:itemID="{76D92E10-3D8B-4831-9584-7BC82972C8E2}">
   <ds:schemaRefs>
-    <ds:schemaRef ds:uri="http://schemas.microsoft.com/sharepoint/v3/contenttype/forms"/>
+    <ds:schemaRef ds:uri="http://schemas.microsoft.com/office/2006/documentManagement/types"/>
+    <ds:schemaRef ds:uri="http://purl.org/dc/terms/"/>
+    <ds:schemaRef ds:uri="http://schemas.microsoft.com/office/2006/metadata/properties"/>
+    <ds:schemaRef ds:uri="http://schemas.openxmlformats.org/package/2006/metadata/core-properties"/>
+    <ds:schemaRef ds:uri="http://www.w3.org/XML/1998/namespace"/>
+    <ds:schemaRef ds:uri="http://schemas.microsoft.com/office/infopath/2007/PartnerControls"/>
+    <ds:schemaRef ds:uri="http://purl.org/dc/elements/1.1/"/>
+    <ds:schemaRef ds:uri="8b529f77-48ab-4581-b468-93f09345b8aa"/>
+    <ds:schemaRef ds:uri="2295e2e7-0eeb-498e-8716-217bb2ee6ee3"/>
+    <ds:schemaRef ds:uri="http://purl.org/dc/dcmitype/"/>
   </ds:schemaRefs>
 </ds:datastoreItem>
 </file>
</xml_diff>